<commit_message>
updated ch 0 slides
</commit_message>
<xml_diff>
--- a/slides/ch0_apa_6th.pptx
+++ b/slides/ch0_apa_6th.pptx
@@ -212,7 +212,7 @@
           <a:p>
             <a:fld id="{387A93FA-11DC-4132-A420-E71D185CF2B8}" type="datetimeFigureOut">
               <a:rPr lang="en-US" smtClean="0"/>
-              <a:t>12/29/17</a:t>
+              <a:t>5/4/2020</a:t>
             </a:fld>
             <a:endParaRPr lang="en-US"/>
           </a:p>
@@ -337,7 +337,7 @@
           </a:lstStyle>
           <a:p>
             <a:r>
-              <a:rPr lang="en-US" smtClean="0"/>
+              <a:rPr lang="en-US"/>
               <a:t>Click to edit Master title style</a:t>
             </a:r>
             <a:endParaRPr lang="en-US" dirty="0"/>
@@ -402,7 +402,7 @@
           </a:lstStyle>
           <a:p>
             <a:r>
-              <a:rPr lang="en-US" smtClean="0"/>
+              <a:rPr lang="en-US"/>
               <a:t>Click to edit Master subtitle style</a:t>
             </a:r>
             <a:endParaRPr lang="en-US" dirty="0"/>
@@ -427,7 +427,7 @@
             <a:fld id="{96DFF08F-DC6B-4601-B491-B0F83F6DD2DA}" type="datetimeFigureOut">
               <a:rPr lang="en-US" smtClean="0"/>
               <a:pPr/>
-              <a:t>12/29/17</a:t>
+              <a:t>5/4/2020</a:t>
             </a:fld>
             <a:endParaRPr lang="en-US" dirty="0"/>
           </a:p>
@@ -516,7 +516,7 @@
           <a:lstStyle/>
           <a:p>
             <a:r>
-              <a:rPr lang="en-US" smtClean="0"/>
+              <a:rPr lang="en-US"/>
               <a:t>Click to edit Master title style</a:t>
             </a:r>
             <a:endParaRPr lang="en-US" dirty="0"/>
@@ -540,35 +540,35 @@
           <a:p>
             <a:pPr lvl="0"/>
             <a:r>
-              <a:rPr lang="en-US" smtClean="0"/>
+              <a:rPr lang="en-US"/>
               <a:t>Click to edit Master text styles</a:t>
             </a:r>
           </a:p>
           <a:p>
             <a:pPr lvl="1"/>
             <a:r>
-              <a:rPr lang="en-US" smtClean="0"/>
+              <a:rPr lang="en-US"/>
               <a:t>Second level</a:t>
             </a:r>
           </a:p>
           <a:p>
             <a:pPr lvl="2"/>
             <a:r>
-              <a:rPr lang="en-US" smtClean="0"/>
+              <a:rPr lang="en-US"/>
               <a:t>Third level</a:t>
             </a:r>
           </a:p>
           <a:p>
             <a:pPr lvl="3"/>
             <a:r>
-              <a:rPr lang="en-US" smtClean="0"/>
+              <a:rPr lang="en-US"/>
               <a:t>Fourth level</a:t>
             </a:r>
           </a:p>
           <a:p>
             <a:pPr lvl="4"/>
             <a:r>
-              <a:rPr lang="en-US" smtClean="0"/>
+              <a:rPr lang="en-US"/>
               <a:t>Fifth level</a:t>
             </a:r>
             <a:endParaRPr lang="en-US" dirty="0"/>
@@ -592,7 +592,7 @@
           <a:p>
             <a:fld id="{96DFF08F-DC6B-4601-B491-B0F83F6DD2DA}" type="datetimeFigureOut">
               <a:rPr lang="en-US" smtClean="0"/>
-              <a:t>12/29/17</a:t>
+              <a:t>5/4/2020</a:t>
             </a:fld>
             <a:endParaRPr lang="en-US" dirty="0"/>
           </a:p>
@@ -686,7 +686,7 @@
           <a:lstStyle/>
           <a:p>
             <a:r>
-              <a:rPr lang="en-US" smtClean="0"/>
+              <a:rPr lang="en-US"/>
               <a:t>Click to edit Master title style</a:t>
             </a:r>
             <a:endParaRPr lang="en-US" dirty="0"/>
@@ -715,35 +715,35 @@
           <a:p>
             <a:pPr lvl="0"/>
             <a:r>
-              <a:rPr lang="en-US" smtClean="0"/>
+              <a:rPr lang="en-US"/>
               <a:t>Click to edit Master text styles</a:t>
             </a:r>
           </a:p>
           <a:p>
             <a:pPr lvl="1"/>
             <a:r>
-              <a:rPr lang="en-US" smtClean="0"/>
+              <a:rPr lang="en-US"/>
               <a:t>Second level</a:t>
             </a:r>
           </a:p>
           <a:p>
             <a:pPr lvl="2"/>
             <a:r>
-              <a:rPr lang="en-US" smtClean="0"/>
+              <a:rPr lang="en-US"/>
               <a:t>Third level</a:t>
             </a:r>
           </a:p>
           <a:p>
             <a:pPr lvl="3"/>
             <a:r>
-              <a:rPr lang="en-US" smtClean="0"/>
+              <a:rPr lang="en-US"/>
               <a:t>Fourth level</a:t>
             </a:r>
           </a:p>
           <a:p>
             <a:pPr lvl="4"/>
             <a:r>
-              <a:rPr lang="en-US" smtClean="0"/>
+              <a:rPr lang="en-US"/>
               <a:t>Fifth level</a:t>
             </a:r>
             <a:endParaRPr lang="en-US" dirty="0"/>
@@ -767,7 +767,7 @@
           <a:p>
             <a:fld id="{96DFF08F-DC6B-4601-B491-B0F83F6DD2DA}" type="datetimeFigureOut">
               <a:rPr lang="en-US" smtClean="0"/>
-              <a:t>12/29/17</a:t>
+              <a:t>5/4/2020</a:t>
             </a:fld>
             <a:endParaRPr lang="en-US" dirty="0"/>
           </a:p>
@@ -856,7 +856,7 @@
           <a:lstStyle/>
           <a:p>
             <a:r>
-              <a:rPr lang="en-US" smtClean="0"/>
+              <a:rPr lang="en-US"/>
               <a:t>Click to edit Master title style</a:t>
             </a:r>
             <a:endParaRPr lang="en-US" dirty="0"/>
@@ -880,35 +880,35 @@
           <a:p>
             <a:pPr lvl="0"/>
             <a:r>
-              <a:rPr lang="en-US" smtClean="0"/>
+              <a:rPr lang="en-US"/>
               <a:t>Click to edit Master text styles</a:t>
             </a:r>
           </a:p>
           <a:p>
             <a:pPr lvl="1"/>
             <a:r>
-              <a:rPr lang="en-US" smtClean="0"/>
+              <a:rPr lang="en-US"/>
               <a:t>Second level</a:t>
             </a:r>
           </a:p>
           <a:p>
             <a:pPr lvl="2"/>
             <a:r>
-              <a:rPr lang="en-US" smtClean="0"/>
+              <a:rPr lang="en-US"/>
               <a:t>Third level</a:t>
             </a:r>
           </a:p>
           <a:p>
             <a:pPr lvl="3"/>
             <a:r>
-              <a:rPr lang="en-US" smtClean="0"/>
+              <a:rPr lang="en-US"/>
               <a:t>Fourth level</a:t>
             </a:r>
           </a:p>
           <a:p>
             <a:pPr lvl="4"/>
             <a:r>
-              <a:rPr lang="en-US" smtClean="0"/>
+              <a:rPr lang="en-US"/>
               <a:t>Fifth level</a:t>
             </a:r>
             <a:endParaRPr lang="en-US" dirty="0"/>
@@ -932,7 +932,7 @@
           <a:p>
             <a:fld id="{96DFF08F-DC6B-4601-B491-B0F83F6DD2DA}" type="datetimeFigureOut">
               <a:rPr lang="en-US" smtClean="0"/>
-              <a:t>12/29/17</a:t>
+              <a:t>5/4/2020</a:t>
             </a:fld>
             <a:endParaRPr lang="en-US" dirty="0"/>
           </a:p>
@@ -1030,7 +1030,7 @@
           </a:lstStyle>
           <a:p>
             <a:r>
-              <a:rPr lang="en-US" smtClean="0"/>
+              <a:rPr lang="en-US"/>
               <a:t>Click to edit Master title style</a:t>
             </a:r>
             <a:endParaRPr lang="en-US" dirty="0"/>
@@ -1150,7 +1150,7 @@
           <a:p>
             <a:pPr lvl="0"/>
             <a:r>
-              <a:rPr lang="en-US" smtClean="0"/>
+              <a:rPr lang="en-US"/>
               <a:t>Click to edit Master text styles</a:t>
             </a:r>
           </a:p>
@@ -1173,7 +1173,7 @@
           <a:p>
             <a:fld id="{96DFF08F-DC6B-4601-B491-B0F83F6DD2DA}" type="datetimeFigureOut">
               <a:rPr lang="en-US" smtClean="0"/>
-              <a:t>12/29/17</a:t>
+              <a:t>5/4/2020</a:t>
             </a:fld>
             <a:endParaRPr lang="en-US" dirty="0"/>
           </a:p>
@@ -1262,7 +1262,7 @@
           <a:lstStyle/>
           <a:p>
             <a:r>
-              <a:rPr lang="en-US" smtClean="0"/>
+              <a:rPr lang="en-US"/>
               <a:t>Click to edit Master title style</a:t>
             </a:r>
             <a:endParaRPr lang="en-US" dirty="0"/>
@@ -1291,35 +1291,35 @@
           <a:p>
             <a:pPr lvl="0"/>
             <a:r>
-              <a:rPr lang="en-US" smtClean="0"/>
+              <a:rPr lang="en-US"/>
               <a:t>Click to edit Master text styles</a:t>
             </a:r>
           </a:p>
           <a:p>
             <a:pPr lvl="1"/>
             <a:r>
-              <a:rPr lang="en-US" smtClean="0"/>
+              <a:rPr lang="en-US"/>
               <a:t>Second level</a:t>
             </a:r>
           </a:p>
           <a:p>
             <a:pPr lvl="2"/>
             <a:r>
-              <a:rPr lang="en-US" smtClean="0"/>
+              <a:rPr lang="en-US"/>
               <a:t>Third level</a:t>
             </a:r>
           </a:p>
           <a:p>
             <a:pPr lvl="3"/>
             <a:r>
-              <a:rPr lang="en-US" smtClean="0"/>
+              <a:rPr lang="en-US"/>
               <a:t>Fourth level</a:t>
             </a:r>
           </a:p>
           <a:p>
             <a:pPr lvl="4"/>
             <a:r>
-              <a:rPr lang="en-US" smtClean="0"/>
+              <a:rPr lang="en-US"/>
               <a:t>Fifth level</a:t>
             </a:r>
             <a:endParaRPr lang="en-US" dirty="0"/>
@@ -1348,35 +1348,35 @@
           <a:p>
             <a:pPr lvl="0"/>
             <a:r>
-              <a:rPr lang="en-US" smtClean="0"/>
+              <a:rPr lang="en-US"/>
               <a:t>Click to edit Master text styles</a:t>
             </a:r>
           </a:p>
           <a:p>
             <a:pPr lvl="1"/>
             <a:r>
-              <a:rPr lang="en-US" smtClean="0"/>
+              <a:rPr lang="en-US"/>
               <a:t>Second level</a:t>
             </a:r>
           </a:p>
           <a:p>
             <a:pPr lvl="2"/>
             <a:r>
-              <a:rPr lang="en-US" smtClean="0"/>
+              <a:rPr lang="en-US"/>
               <a:t>Third level</a:t>
             </a:r>
           </a:p>
           <a:p>
             <a:pPr lvl="3"/>
             <a:r>
-              <a:rPr lang="en-US" smtClean="0"/>
+              <a:rPr lang="en-US"/>
               <a:t>Fourth level</a:t>
             </a:r>
           </a:p>
           <a:p>
             <a:pPr lvl="4"/>
             <a:r>
-              <a:rPr lang="en-US" smtClean="0"/>
+              <a:rPr lang="en-US"/>
               <a:t>Fifth level</a:t>
             </a:r>
             <a:endParaRPr lang="en-US" dirty="0"/>
@@ -1400,7 +1400,7 @@
           <a:p>
             <a:fld id="{96DFF08F-DC6B-4601-B491-B0F83F6DD2DA}" type="datetimeFigureOut">
               <a:rPr lang="en-US" smtClean="0"/>
-              <a:t>12/29/17</a:t>
+              <a:t>5/4/2020</a:t>
             </a:fld>
             <a:endParaRPr lang="en-US" dirty="0"/>
           </a:p>
@@ -1494,7 +1494,7 @@
           <a:lstStyle/>
           <a:p>
             <a:r>
-              <a:rPr lang="en-US" smtClean="0"/>
+              <a:rPr lang="en-US"/>
               <a:t>Click to edit Master title style</a:t>
             </a:r>
             <a:endParaRPr lang="en-US" dirty="0"/>
@@ -1560,7 +1560,7 @@
           <a:p>
             <a:pPr lvl="0"/>
             <a:r>
-              <a:rPr lang="en-US" smtClean="0"/>
+              <a:rPr lang="en-US"/>
               <a:t>Click to edit Master text styles</a:t>
             </a:r>
           </a:p>
@@ -1588,35 +1588,35 @@
           <a:p>
             <a:pPr lvl="0"/>
             <a:r>
-              <a:rPr lang="en-US" smtClean="0"/>
+              <a:rPr lang="en-US"/>
               <a:t>Click to edit Master text styles</a:t>
             </a:r>
           </a:p>
           <a:p>
             <a:pPr lvl="1"/>
             <a:r>
-              <a:rPr lang="en-US" smtClean="0"/>
+              <a:rPr lang="en-US"/>
               <a:t>Second level</a:t>
             </a:r>
           </a:p>
           <a:p>
             <a:pPr lvl="2"/>
             <a:r>
-              <a:rPr lang="en-US" smtClean="0"/>
+              <a:rPr lang="en-US"/>
               <a:t>Third level</a:t>
             </a:r>
           </a:p>
           <a:p>
             <a:pPr lvl="3"/>
             <a:r>
-              <a:rPr lang="en-US" smtClean="0"/>
+              <a:rPr lang="en-US"/>
               <a:t>Fourth level</a:t>
             </a:r>
           </a:p>
           <a:p>
             <a:pPr lvl="4"/>
             <a:r>
-              <a:rPr lang="en-US" smtClean="0"/>
+              <a:rPr lang="en-US"/>
               <a:t>Fifth level</a:t>
             </a:r>
             <a:endParaRPr lang="en-US" dirty="0"/>
@@ -1682,7 +1682,7 @@
           <a:p>
             <a:pPr lvl="0"/>
             <a:r>
-              <a:rPr lang="en-US" smtClean="0"/>
+              <a:rPr lang="en-US"/>
               <a:t>Click to edit Master text styles</a:t>
             </a:r>
           </a:p>
@@ -1710,35 +1710,35 @@
           <a:p>
             <a:pPr lvl="0"/>
             <a:r>
-              <a:rPr lang="en-US" smtClean="0"/>
+              <a:rPr lang="en-US"/>
               <a:t>Click to edit Master text styles</a:t>
             </a:r>
           </a:p>
           <a:p>
             <a:pPr lvl="1"/>
             <a:r>
-              <a:rPr lang="en-US" smtClean="0"/>
+              <a:rPr lang="en-US"/>
               <a:t>Second level</a:t>
             </a:r>
           </a:p>
           <a:p>
             <a:pPr lvl="2"/>
             <a:r>
-              <a:rPr lang="en-US" smtClean="0"/>
+              <a:rPr lang="en-US"/>
               <a:t>Third level</a:t>
             </a:r>
           </a:p>
           <a:p>
             <a:pPr lvl="3"/>
             <a:r>
-              <a:rPr lang="en-US" smtClean="0"/>
+              <a:rPr lang="en-US"/>
               <a:t>Fourth level</a:t>
             </a:r>
           </a:p>
           <a:p>
             <a:pPr lvl="4"/>
             <a:r>
-              <a:rPr lang="en-US" smtClean="0"/>
+              <a:rPr lang="en-US"/>
               <a:t>Fifth level</a:t>
             </a:r>
             <a:endParaRPr lang="en-US" dirty="0"/>
@@ -1762,7 +1762,7 @@
           <a:p>
             <a:fld id="{96DFF08F-DC6B-4601-B491-B0F83F6DD2DA}" type="datetimeFigureOut">
               <a:rPr lang="en-US" smtClean="0"/>
-              <a:t>12/29/17</a:t>
+              <a:t>5/4/2020</a:t>
             </a:fld>
             <a:endParaRPr lang="en-US" dirty="0"/>
           </a:p>
@@ -1851,7 +1851,7 @@
           <a:lstStyle/>
           <a:p>
             <a:r>
-              <a:rPr lang="en-US" smtClean="0"/>
+              <a:rPr lang="en-US"/>
               <a:t>Click to edit Master title style</a:t>
             </a:r>
             <a:endParaRPr lang="en-US" dirty="0"/>
@@ -1875,7 +1875,7 @@
           <a:p>
             <a:fld id="{96DFF08F-DC6B-4601-B491-B0F83F6DD2DA}" type="datetimeFigureOut">
               <a:rPr lang="en-US" smtClean="0"/>
-              <a:t>12/29/17</a:t>
+              <a:t>5/4/2020</a:t>
             </a:fld>
             <a:endParaRPr lang="en-US" dirty="0"/>
           </a:p>
@@ -1965,7 +1965,7 @@
           <a:p>
             <a:fld id="{96DFF08F-DC6B-4601-B491-B0F83F6DD2DA}" type="datetimeFigureOut">
               <a:rPr lang="en-US" smtClean="0"/>
-              <a:t>12/29/17</a:t>
+              <a:t>5/4/2020</a:t>
             </a:fld>
             <a:endParaRPr lang="en-US" dirty="0"/>
           </a:p>
@@ -2063,7 +2063,7 @@
           </a:lstStyle>
           <a:p>
             <a:r>
-              <a:rPr lang="en-US" smtClean="0"/>
+              <a:rPr lang="en-US"/>
               <a:t>Click to edit Master title style</a:t>
             </a:r>
             <a:endParaRPr lang="en-US" dirty="0"/>
@@ -2120,35 +2120,35 @@
           <a:p>
             <a:pPr lvl="0"/>
             <a:r>
-              <a:rPr lang="en-US" smtClean="0"/>
+              <a:rPr lang="en-US"/>
               <a:t>Click to edit Master text styles</a:t>
             </a:r>
           </a:p>
           <a:p>
             <a:pPr lvl="1"/>
             <a:r>
-              <a:rPr lang="en-US" smtClean="0"/>
+              <a:rPr lang="en-US"/>
               <a:t>Second level</a:t>
             </a:r>
           </a:p>
           <a:p>
             <a:pPr lvl="2"/>
             <a:r>
-              <a:rPr lang="en-US" smtClean="0"/>
+              <a:rPr lang="en-US"/>
               <a:t>Third level</a:t>
             </a:r>
           </a:p>
           <a:p>
             <a:pPr lvl="3"/>
             <a:r>
-              <a:rPr lang="en-US" smtClean="0"/>
+              <a:rPr lang="en-US"/>
               <a:t>Fourth level</a:t>
             </a:r>
           </a:p>
           <a:p>
             <a:pPr lvl="4"/>
             <a:r>
-              <a:rPr lang="en-US" smtClean="0"/>
+              <a:rPr lang="en-US"/>
               <a:t>Fifth level</a:t>
             </a:r>
             <a:endParaRPr lang="en-US" dirty="0"/>
@@ -2214,7 +2214,7 @@
           <a:p>
             <a:pPr lvl="0"/>
             <a:r>
-              <a:rPr lang="en-US" smtClean="0"/>
+              <a:rPr lang="en-US"/>
               <a:t>Click to edit Master text styles</a:t>
             </a:r>
           </a:p>
@@ -2237,7 +2237,7 @@
           <a:p>
             <a:fld id="{96DFF08F-DC6B-4601-B491-B0F83F6DD2DA}" type="datetimeFigureOut">
               <a:rPr lang="en-US" smtClean="0"/>
-              <a:t>12/29/17</a:t>
+              <a:t>5/4/2020</a:t>
             </a:fld>
             <a:endParaRPr lang="en-US" dirty="0"/>
           </a:p>
@@ -2335,7 +2335,7 @@
           </a:lstStyle>
           <a:p>
             <a:r>
-              <a:rPr lang="en-US" smtClean="0"/>
+              <a:rPr lang="en-US"/>
               <a:t>Click to edit Master title style</a:t>
             </a:r>
             <a:endParaRPr lang="en-US" dirty="0"/>
@@ -2400,7 +2400,7 @@
           </a:lstStyle>
           <a:p>
             <a:r>
-              <a:rPr lang="en-US" smtClean="0"/>
+              <a:rPr lang="en-US"/>
               <a:t>Drag picture to placeholder or click icon to add</a:t>
             </a:r>
             <a:endParaRPr lang="en-US" dirty="0"/>
@@ -2466,7 +2466,7 @@
           <a:p>
             <a:pPr lvl="0"/>
             <a:r>
-              <a:rPr lang="en-US" smtClean="0"/>
+              <a:rPr lang="en-US"/>
               <a:t>Click to edit Master text styles</a:t>
             </a:r>
           </a:p>
@@ -2489,7 +2489,7 @@
           <a:p>
             <a:fld id="{C7616CA0-919D-4A49-9C8A-62FDFB3A5183}" type="datetimeFigureOut">
               <a:rPr lang="en-US" smtClean="0"/>
-              <a:t>12/29/17</a:t>
+              <a:t>5/4/2020</a:t>
             </a:fld>
             <a:endParaRPr lang="en-US" dirty="0"/>
           </a:p>
@@ -2593,7 +2593,7 @@
           <a:lstStyle/>
           <a:p>
             <a:r>
-              <a:rPr lang="en-US" smtClean="0"/>
+              <a:rPr lang="en-US"/>
               <a:t>Click to edit Master title style</a:t>
             </a:r>
             <a:endParaRPr lang="en-US" dirty="0"/>
@@ -2627,35 +2627,35 @@
           <a:p>
             <a:pPr lvl="0"/>
             <a:r>
-              <a:rPr lang="en-US" smtClean="0"/>
+              <a:rPr lang="en-US"/>
               <a:t>Click to edit Master text styles</a:t>
             </a:r>
           </a:p>
           <a:p>
             <a:pPr lvl="1"/>
             <a:r>
-              <a:rPr lang="en-US" smtClean="0"/>
+              <a:rPr lang="en-US"/>
               <a:t>Second level</a:t>
             </a:r>
           </a:p>
           <a:p>
             <a:pPr lvl="2"/>
             <a:r>
-              <a:rPr lang="en-US" smtClean="0"/>
+              <a:rPr lang="en-US"/>
               <a:t>Third level</a:t>
             </a:r>
           </a:p>
           <a:p>
             <a:pPr lvl="3"/>
             <a:r>
-              <a:rPr lang="en-US" smtClean="0"/>
+              <a:rPr lang="en-US"/>
               <a:t>Fourth level</a:t>
             </a:r>
           </a:p>
           <a:p>
             <a:pPr lvl="4"/>
             <a:r>
-              <a:rPr lang="en-US" smtClean="0"/>
+              <a:rPr lang="en-US"/>
               <a:t>Fifth level</a:t>
             </a:r>
             <a:endParaRPr lang="en-US" dirty="0"/>
@@ -2698,7 +2698,7 @@
             <a:fld id="{96DFF08F-DC6B-4601-B491-B0F83F6DD2DA}" type="datetimeFigureOut">
               <a:rPr lang="en-US" smtClean="0"/>
               <a:pPr/>
-              <a:t>12/29/17</a:t>
+              <a:t>5/4/2020</a:t>
             </a:fld>
             <a:endParaRPr lang="en-US" dirty="0"/>
           </a:p>
@@ -3345,17 +3345,6 @@
           <a:lstStyle/>
           <a:p>
             <a:r>
-              <a:rPr lang="en-US" sz="2400" b="1" dirty="0" smtClean="0">
-                <a:solidFill>
-                  <a:schemeClr val="accent6"/>
-                </a:solidFill>
-                <a:latin typeface="Consolas" charset="0"/>
-                <a:ea typeface="Consolas" charset="0"/>
-                <a:cs typeface="Consolas" charset="0"/>
-              </a:rPr>
-              <a:t>Must </a:t>
-            </a:r>
-            <a:r>
               <a:rPr lang="en-US" sz="2400" b="1" dirty="0">
                 <a:solidFill>
                   <a:schemeClr val="accent6"/>
@@ -3364,25 +3353,17 @@
                 <a:ea typeface="Consolas" charset="0"/>
                 <a:cs typeface="Consolas" charset="0"/>
               </a:rPr>
-              <a:t>be able to stand on its own</a:t>
-            </a:r>
-          </a:p>
-          <a:p>
-            <a:r>
-              <a:rPr lang="en-US" sz="2400" dirty="0" smtClean="0">
-                <a:latin typeface="Consolas" charset="0"/>
-                <a:ea typeface="Consolas" charset="0"/>
-                <a:cs typeface="Consolas" charset="0"/>
-              </a:rPr>
-              <a:t>Number </a:t>
-            </a:r>
+              <a:t>Must be able to stand on its own</a:t>
+            </a:r>
+          </a:p>
+          <a:p>
             <a:r>
               <a:rPr lang="en-US" sz="2400" dirty="0">
                 <a:latin typeface="Consolas" charset="0"/>
                 <a:ea typeface="Consolas" charset="0"/>
                 <a:cs typeface="Consolas" charset="0"/>
               </a:rPr>
-              <a:t>tables </a:t>
+              <a:t>Number tables </a:t>
             </a:r>
             <a:r>
               <a:rPr lang="en-US" sz="2400" dirty="0">
@@ -3422,7 +3403,7 @@
           </a:p>
           <a:p>
             <a:r>
-              <a:rPr lang="en-US" sz="2400" dirty="0" smtClean="0">
+              <a:rPr lang="en-US" sz="2400" dirty="0">
                 <a:latin typeface="Consolas" charset="0"/>
                 <a:ea typeface="Consolas" charset="0"/>
                 <a:cs typeface="Consolas" charset="0"/>
@@ -3467,26 +3448,18 @@
           </a:p>
           <a:p>
             <a:r>
-              <a:rPr lang="en-US" sz="2400" dirty="0" smtClean="0">
-                <a:latin typeface="Consolas" charset="0"/>
-                <a:ea typeface="Consolas" charset="0"/>
-                <a:cs typeface="Consolas" charset="0"/>
-              </a:rPr>
-              <a:t>Results </a:t>
-            </a:r>
-            <a:r>
               <a:rPr lang="en-US" sz="2400" dirty="0">
                 <a:latin typeface="Consolas" charset="0"/>
                 <a:ea typeface="Consolas" charset="0"/>
                 <a:cs typeface="Consolas" charset="0"/>
               </a:rPr>
-              <a:t>Table types</a:t>
+              <a:t>Results Table types</a:t>
             </a:r>
           </a:p>
           <a:p>
             <a:pPr lvl="1"/>
             <a:r>
-              <a:rPr lang="en-US" sz="2000" dirty="0" smtClean="0">
+              <a:rPr lang="en-US" sz="2000" dirty="0">
                 <a:solidFill>
                   <a:schemeClr val="accent6"/>
                 </a:solidFill>
@@ -3508,7 +3481,7 @@
           <a:p>
             <a:pPr lvl="1"/>
             <a:r>
-              <a:rPr lang="en-US" sz="2000" dirty="0" smtClean="0">
+              <a:rPr lang="en-US" sz="2000" dirty="0">
                 <a:solidFill>
                   <a:schemeClr val="accent6"/>
                 </a:solidFill>
@@ -3546,39 +3519,12 @@
           <a:p>
             <a:pPr lvl="1"/>
             <a:r>
-              <a:rPr lang="en-US" sz="2000" dirty="0" smtClean="0">
-                <a:latin typeface="Consolas" charset="0"/>
-                <a:ea typeface="Consolas" charset="0"/>
-                <a:cs typeface="Consolas" charset="0"/>
-              </a:rPr>
-              <a:t>Both </a:t>
-            </a:r>
-            <a:r>
               <a:rPr lang="en-US" sz="2000" dirty="0">
                 <a:latin typeface="Consolas" charset="0"/>
                 <a:ea typeface="Consolas" charset="0"/>
                 <a:cs typeface="Consolas" charset="0"/>
               </a:rPr>
-              <a:t>descriptive AND inferential info in the same </a:t>
-            </a:r>
-            <a:r>
-              <a:rPr lang="en-US" sz="2000" dirty="0" smtClean="0">
-                <a:latin typeface="Consolas" charset="0"/>
-                <a:ea typeface="Consolas" charset="0"/>
-                <a:cs typeface="Consolas" charset="0"/>
-              </a:rPr>
-              <a:t>table -&gt; </a:t>
-            </a:r>
-            <a:r>
-              <a:rPr lang="en-US" sz="2000" dirty="0" smtClean="0">
-                <a:solidFill>
-                  <a:schemeClr val="accent1"/>
-                </a:solidFill>
-                <a:latin typeface="Consolas" charset="0"/>
-                <a:ea typeface="Consolas" charset="0"/>
-                <a:cs typeface="Consolas" charset="0"/>
-              </a:rPr>
-              <a:t>USE </a:t>
+              <a:t>Both descriptive AND inferential info in the same table -&gt; </a:t>
             </a:r>
             <a:r>
               <a:rPr lang="en-US" sz="2000" dirty="0">
@@ -3589,7 +3535,7 @@
                 <a:ea typeface="Consolas" charset="0"/>
                 <a:cs typeface="Consolas" charset="0"/>
               </a:rPr>
-              <a:t>HEADINGS </a:t>
+              <a:t>USE HEADINGS </a:t>
             </a:r>
             <a:r>
               <a:rPr lang="en-US" sz="2000" dirty="0">
@@ -3602,20 +3548,12 @@
           </a:p>
           <a:p>
             <a:r>
-              <a:rPr lang="en-US" sz="2400" dirty="0" smtClean="0">
-                <a:latin typeface="Consolas" charset="0"/>
-                <a:ea typeface="Consolas" charset="0"/>
-                <a:cs typeface="Consolas" charset="0"/>
-              </a:rPr>
-              <a:t>Data </a:t>
-            </a:r>
-            <a:r>
               <a:rPr lang="en-US" sz="2400" dirty="0">
                 <a:latin typeface="Consolas" charset="0"/>
                 <a:ea typeface="Consolas" charset="0"/>
                 <a:cs typeface="Consolas" charset="0"/>
               </a:rPr>
-              <a:t>not applicable: leave </a:t>
+              <a:t>Data not applicable: leave </a:t>
             </a:r>
             <a:r>
               <a:rPr lang="en-US" sz="2400" dirty="0">
@@ -3631,23 +3569,15 @@
           </a:p>
           <a:p>
             <a:r>
-              <a:rPr lang="en-US" sz="2400" dirty="0" smtClean="0">
-                <a:latin typeface="Consolas" charset="0"/>
-                <a:ea typeface="Consolas" charset="0"/>
-                <a:cs typeface="Consolas" charset="0"/>
-              </a:rPr>
-              <a:t>Data </a:t>
-            </a:r>
-            <a:r>
               <a:rPr lang="en-US" sz="2400" dirty="0">
                 <a:latin typeface="Consolas" charset="0"/>
                 <a:ea typeface="Consolas" charset="0"/>
                 <a:cs typeface="Consolas" charset="0"/>
               </a:rPr>
-              <a:t>not obtained/not computable: use a dash </a:t>
-            </a:r>
-            <a:r>
-              <a:rPr lang="en-US" sz="2400" dirty="0" smtClean="0">
+              <a:t>Data not obtained/not computable: use a dash </a:t>
+            </a:r>
+            <a:r>
+              <a:rPr lang="en-US" sz="2400" dirty="0">
                 <a:solidFill>
                   <a:schemeClr val="tx2"/>
                 </a:solidFill>
@@ -3657,14 +3587,6 @@
               </a:rPr>
               <a:t>“-”</a:t>
             </a:r>
-            <a:endParaRPr lang="en-US" sz="2400" dirty="0">
-              <a:solidFill>
-                <a:schemeClr val="tx2"/>
-              </a:solidFill>
-              <a:latin typeface="Consolas" charset="0"/>
-              <a:ea typeface="Consolas" charset="0"/>
-              <a:cs typeface="Consolas" charset="0"/>
-            </a:endParaRPr>
           </a:p>
         </p:txBody>
       </p:sp>
@@ -3838,11 +3760,6 @@
               </a:rPr>
               <a:t>Title may be italicized</a:t>
             </a:r>
-            <a:endParaRPr lang="en-US" sz="2400" dirty="0">
-              <a:latin typeface="Consolas" charset="0"/>
-              <a:ea typeface="Consolas" charset="0"/>
-              <a:cs typeface="Consolas" charset="0"/>
-            </a:endParaRPr>
           </a:p>
         </p:txBody>
       </p:sp>
@@ -3868,20 +3785,12 @@
           <a:lstStyle/>
           <a:p>
             <a:r>
-              <a:rPr lang="en-US" sz="2800" dirty="0" smtClean="0">
-                <a:latin typeface="Consolas" charset="0"/>
-                <a:ea typeface="Consolas" charset="0"/>
-                <a:cs typeface="Consolas" charset="0"/>
-              </a:rPr>
-              <a:t>Caption </a:t>
-            </a:r>
-            <a:r>
               <a:rPr lang="en-US" sz="2800" dirty="0">
                 <a:latin typeface="Consolas" charset="0"/>
                 <a:ea typeface="Consolas" charset="0"/>
                 <a:cs typeface="Consolas" charset="0"/>
               </a:rPr>
-              <a:t>and Notes (</a:t>
+              <a:t>Caption and Notes (</a:t>
             </a:r>
             <a:r>
               <a:rPr lang="en-US" sz="2800" b="1" dirty="0">
@@ -3906,102 +3815,62 @@
           <a:p>
             <a:pPr lvl="1"/>
             <a:r>
-              <a:rPr lang="en-US" sz="2400" dirty="0" smtClean="0">
-                <a:latin typeface="Consolas" charset="0"/>
-                <a:ea typeface="Consolas" charset="0"/>
-                <a:cs typeface="Consolas" charset="0"/>
-              </a:rPr>
-              <a:t>General </a:t>
-            </a:r>
-            <a:r>
               <a:rPr lang="en-US" sz="2400" dirty="0">
                 <a:latin typeface="Consolas" charset="0"/>
                 <a:ea typeface="Consolas" charset="0"/>
                 <a:cs typeface="Consolas" charset="0"/>
               </a:rPr>
-              <a:t>Note</a:t>
+              <a:t>General Note</a:t>
             </a:r>
           </a:p>
           <a:p>
             <a:pPr lvl="2"/>
             <a:r>
-              <a:rPr lang="en-US" dirty="0" smtClean="0">
-                <a:latin typeface="Consolas" charset="0"/>
-                <a:ea typeface="Consolas" charset="0"/>
-                <a:cs typeface="Consolas" charset="0"/>
-              </a:rPr>
-              <a:t>Explains/qualifies </a:t>
-            </a:r>
-            <a:r>
               <a:rPr lang="en-US" dirty="0">
                 <a:latin typeface="Consolas" charset="0"/>
                 <a:ea typeface="Consolas" charset="0"/>
                 <a:cs typeface="Consolas" charset="0"/>
               </a:rPr>
-              <a:t>info in table, symbols, abbreviations</a:t>
+              <a:t>Explains/qualifies info in table, symbols, abbreviations</a:t>
             </a:r>
           </a:p>
           <a:p>
             <a:pPr lvl="2"/>
             <a:r>
-              <a:rPr lang="en-US" dirty="0" smtClean="0">
-                <a:latin typeface="Consolas" charset="0"/>
-                <a:ea typeface="Consolas" charset="0"/>
-                <a:cs typeface="Consolas" charset="0"/>
-              </a:rPr>
-              <a:t>No </a:t>
-            </a:r>
-            <a:r>
               <a:rPr lang="en-US" dirty="0">
                 <a:latin typeface="Consolas" charset="0"/>
                 <a:ea typeface="Consolas" charset="0"/>
                 <a:cs typeface="Consolas" charset="0"/>
               </a:rPr>
-              <a:t>explanation for basic stats (M, SD, no. N, n)</a:t>
+              <a:t>No explanation for basic stats (M, SD, no. N, n)</a:t>
             </a:r>
           </a:p>
           <a:p>
             <a:pPr lvl="1"/>
             <a:r>
-              <a:rPr lang="en-US" sz="2400" dirty="0" smtClean="0">
-                <a:latin typeface="Consolas" charset="0"/>
-                <a:ea typeface="Consolas" charset="0"/>
-                <a:cs typeface="Consolas" charset="0"/>
-              </a:rPr>
-              <a:t>Specific </a:t>
-            </a:r>
-            <a:r>
               <a:rPr lang="en-US" sz="2400" dirty="0">
                 <a:latin typeface="Consolas" charset="0"/>
                 <a:ea typeface="Consolas" charset="0"/>
                 <a:cs typeface="Consolas" charset="0"/>
               </a:rPr>
-              <a:t>Note</a:t>
+              <a:t>Specific Note</a:t>
             </a:r>
           </a:p>
           <a:p>
             <a:pPr lvl="2"/>
             <a:r>
-              <a:rPr lang="en-US" dirty="0" smtClean="0">
-                <a:latin typeface="Consolas" charset="0"/>
-                <a:ea typeface="Consolas" charset="0"/>
-                <a:cs typeface="Consolas" charset="0"/>
-              </a:rPr>
-              <a:t>Begin </a:t>
-            </a:r>
-            <a:r>
               <a:rPr lang="en-US" dirty="0">
                 <a:latin typeface="Consolas" charset="0"/>
                 <a:ea typeface="Consolas" charset="0"/>
                 <a:cs typeface="Consolas" charset="0"/>
               </a:rPr>
-              <a:t>on a new line, flush left</a:t>
+              <a:t>Begin on a new line, flush left</a:t>
             </a:r>
           </a:p>
           <a:p>
             <a:pPr lvl="2"/>
             <a:r>
-              <a:rPr lang="en-US" dirty="0" smtClean="0">
+              <a:rPr lang="en-US" dirty="0">
                 <a:latin typeface="Consolas" charset="0"/>
                 <a:ea typeface="Consolas" charset="0"/>
                 <a:cs typeface="Consolas" charset="0"/>
@@ -4009,20 +3878,12 @@
               <a:t>Define superscripts </a:t>
             </a:r>
             <a:r>
-              <a:rPr lang="en-US" baseline="30000" dirty="0" smtClean="0">
-                <a:latin typeface="Consolas" charset="0"/>
-                <a:ea typeface="Consolas" charset="0"/>
-                <a:cs typeface="Consolas" charset="0"/>
-              </a:rPr>
-              <a:t>a</a:t>
-            </a:r>
-            <a:r>
               <a:rPr lang="en-US" baseline="30000" dirty="0">
                 <a:latin typeface="Consolas" charset="0"/>
                 <a:ea typeface="Consolas" charset="0"/>
                 <a:cs typeface="Consolas" charset="0"/>
               </a:rPr>
-              <a:t>, b, c</a:t>
+              <a:t>a, b, c</a:t>
             </a:r>
             <a:endParaRPr lang="en-US" dirty="0">
               <a:latin typeface="Consolas" charset="0"/>
@@ -4033,64 +3894,35 @@
           <a:p>
             <a:pPr lvl="1"/>
             <a:r>
-              <a:rPr lang="en-US" sz="2400" dirty="0" smtClean="0">
-                <a:latin typeface="Consolas" charset="0"/>
-                <a:ea typeface="Consolas" charset="0"/>
-                <a:cs typeface="Consolas" charset="0"/>
-              </a:rPr>
-              <a:t>Probability </a:t>
-            </a:r>
-            <a:r>
               <a:rPr lang="en-US" sz="2400" dirty="0">
                 <a:latin typeface="Consolas" charset="0"/>
                 <a:ea typeface="Consolas" charset="0"/>
                 <a:cs typeface="Consolas" charset="0"/>
               </a:rPr>
-              <a:t>note</a:t>
+              <a:t>Probability note</a:t>
             </a:r>
           </a:p>
           <a:p>
             <a:pPr lvl="2"/>
             <a:r>
-              <a:rPr lang="en-US" dirty="0" smtClean="0">
-                <a:latin typeface="Consolas" charset="0"/>
-                <a:ea typeface="Consolas" charset="0"/>
-                <a:cs typeface="Consolas" charset="0"/>
-              </a:rPr>
-              <a:t>Begin </a:t>
-            </a:r>
-            <a:r>
               <a:rPr lang="en-US" dirty="0">
                 <a:latin typeface="Consolas" charset="0"/>
                 <a:ea typeface="Consolas" charset="0"/>
                 <a:cs typeface="Consolas" charset="0"/>
               </a:rPr>
-              <a:t>on a new line, flush left</a:t>
+              <a:t>Begin on a new line, flush left</a:t>
             </a:r>
           </a:p>
           <a:p>
             <a:pPr lvl="2"/>
             <a:r>
-              <a:rPr lang="en-US" dirty="0" smtClean="0">
-                <a:latin typeface="Consolas" charset="0"/>
-                <a:ea typeface="Consolas" charset="0"/>
-                <a:cs typeface="Consolas" charset="0"/>
-              </a:rPr>
-              <a:t>* </a:t>
-            </a:r>
-            <a:r>
               <a:rPr lang="en-US" dirty="0">
                 <a:latin typeface="Consolas" charset="0"/>
                 <a:ea typeface="Consolas" charset="0"/>
                 <a:cs typeface="Consolas" charset="0"/>
               </a:rPr>
-              <a:t>p &lt; 0.05, ** p &lt; 0.01, *** p &lt; 0.001, **** p &lt; 0.0001</a:t>
-            </a:r>
-            <a:endParaRPr lang="en-US" dirty="0">
-              <a:latin typeface="Consolas" charset="0"/>
-              <a:ea typeface="Consolas" charset="0"/>
-              <a:cs typeface="Consolas" charset="0"/>
-            </a:endParaRPr>
+              <a:t>* p &lt; 0.05, ** p &lt; 0.01, *** p &lt; 0.001, **** p &lt; 0.0001</a:t>
+            </a:r>
           </a:p>
         </p:txBody>
       </p:sp>
@@ -4344,103 +4176,48 @@
           <a:lstStyle/>
           <a:p>
             <a:r>
-              <a:rPr lang="en-US" dirty="0" smtClean="0">
-                <a:latin typeface="Consolas" charset="0"/>
-                <a:ea typeface="Consolas" charset="0"/>
-                <a:cs typeface="Consolas" charset="0"/>
-              </a:rPr>
-              <a:t>Includes</a:t>
-            </a:r>
-            <a:r>
               <a:rPr lang="en-US" dirty="0">
                 <a:latin typeface="Consolas" charset="0"/>
                 <a:ea typeface="Consolas" charset="0"/>
                 <a:cs typeface="Consolas" charset="0"/>
               </a:rPr>
-              <a:t>: charts, graphs, photos, drawings, images, </a:t>
-            </a:r>
-            <a:r>
-              <a:rPr lang="en-US" dirty="0" smtClean="0">
-                <a:latin typeface="Consolas" charset="0"/>
-                <a:ea typeface="Consolas" charset="0"/>
-                <a:cs typeface="Consolas" charset="0"/>
-              </a:rPr>
-              <a:t>etc.</a:t>
-            </a:r>
-            <a:endParaRPr lang="en-US" dirty="0">
-              <a:latin typeface="Consolas" charset="0"/>
-              <a:ea typeface="Consolas" charset="0"/>
-              <a:cs typeface="Consolas" charset="0"/>
-            </a:endParaRPr>
-          </a:p>
-          <a:p>
-            <a:r>
-              <a:rPr lang="en-US" dirty="0" smtClean="0">
-                <a:latin typeface="Consolas" charset="0"/>
-                <a:ea typeface="Consolas" charset="0"/>
-                <a:cs typeface="Consolas" charset="0"/>
-              </a:rPr>
-              <a:t>Must </a:t>
-            </a:r>
+              <a:t>Includes: charts, graphs, photos, drawings, images, etc.</a:t>
+            </a:r>
+          </a:p>
+          <a:p>
             <a:r>
               <a:rPr lang="en-US" dirty="0">
                 <a:latin typeface="Consolas" charset="0"/>
                 <a:ea typeface="Consolas" charset="0"/>
                 <a:cs typeface="Consolas" charset="0"/>
               </a:rPr>
-              <a:t>stand on its own: simple BUT illustrates a point</a:t>
-            </a:r>
-          </a:p>
-          <a:p>
-            <a:r>
-              <a:rPr lang="en-US" dirty="0" smtClean="0">
-                <a:latin typeface="Consolas" charset="0"/>
-                <a:ea typeface="Consolas" charset="0"/>
-                <a:cs typeface="Consolas" charset="0"/>
-              </a:rPr>
-              <a:t>Number </a:t>
-            </a:r>
+              <a:t>Must stand on its own: simple BUT illustrates a point</a:t>
+            </a:r>
+          </a:p>
+          <a:p>
             <a:r>
               <a:rPr lang="en-US" dirty="0">
                 <a:latin typeface="Consolas" charset="0"/>
                 <a:ea typeface="Consolas" charset="0"/>
                 <a:cs typeface="Consolas" charset="0"/>
               </a:rPr>
-              <a:t>tables sequentially in text (Figure1, Figure2, </a:t>
-            </a:r>
-            <a:r>
-              <a:rPr lang="en-US" dirty="0" smtClean="0">
-                <a:latin typeface="Consolas" charset="0"/>
-                <a:ea typeface="Consolas" charset="0"/>
-                <a:cs typeface="Consolas" charset="0"/>
-              </a:rPr>
-              <a:t>etc.)  </a:t>
-            </a:r>
-            <a:endParaRPr lang="en-US" dirty="0">
-              <a:latin typeface="Consolas" charset="0"/>
-              <a:ea typeface="Consolas" charset="0"/>
-              <a:cs typeface="Consolas" charset="0"/>
-            </a:endParaRPr>
-          </a:p>
-          <a:p>
-            <a:r>
-              <a:rPr lang="en-US" dirty="0" smtClean="0">
+              <a:t>Number tables sequentially in text (Figure1, Figure2, etc.)  </a:t>
+            </a:r>
+          </a:p>
+          <a:p>
+            <a:r>
+              <a:rPr lang="en-US" dirty="0">
                 <a:latin typeface="Consolas" charset="0"/>
                 <a:ea typeface="Consolas" charset="0"/>
                 <a:cs typeface="Consolas" charset="0"/>
               </a:rPr>
               <a:t>Caption</a:t>
             </a:r>
-            <a:endParaRPr lang="en-US" dirty="0">
-              <a:latin typeface="Consolas" charset="0"/>
-              <a:ea typeface="Consolas" charset="0"/>
-              <a:cs typeface="Consolas" charset="0"/>
-            </a:endParaRPr>
           </a:p>
           <a:p>
             <a:pPr lvl="1"/>
             <a:r>
-              <a:rPr lang="en-US" dirty="0" smtClean="0">
+              <a:rPr lang="en-US" dirty="0">
                 <a:latin typeface="Consolas" charset="0"/>
                 <a:ea typeface="Consolas" charset="0"/>
                 <a:cs typeface="Consolas" charset="0"/>
@@ -4481,39 +4258,23 @@
           <a:p>
             <a:pPr lvl="1"/>
             <a:r>
-              <a:rPr lang="en-US" dirty="0" smtClean="0">
-                <a:latin typeface="Consolas" charset="0"/>
-                <a:ea typeface="Consolas" charset="0"/>
-                <a:cs typeface="Consolas" charset="0"/>
-              </a:rPr>
-              <a:t>NOT </a:t>
-            </a:r>
-            <a:r>
               <a:rPr lang="en-US" dirty="0">
                 <a:latin typeface="Consolas" charset="0"/>
                 <a:ea typeface="Consolas" charset="0"/>
                 <a:cs typeface="Consolas" charset="0"/>
               </a:rPr>
-              <a:t>a title, NOT capitalized</a:t>
+              <a:t>NOT a title, NOT capitalized</a:t>
             </a:r>
           </a:p>
           <a:p>
             <a:pPr lvl="2"/>
             <a:r>
-              <a:rPr lang="en-US" dirty="0" smtClean="0">
-                <a:latin typeface="Consolas" charset="0"/>
-                <a:ea typeface="Consolas" charset="0"/>
-                <a:cs typeface="Consolas" charset="0"/>
-              </a:rPr>
-              <a:t>Brief</a:t>
-            </a:r>
-            <a:r>
               <a:rPr lang="en-US" dirty="0">
                 <a:latin typeface="Consolas" charset="0"/>
                 <a:ea typeface="Consolas" charset="0"/>
                 <a:cs typeface="Consolas" charset="0"/>
               </a:rPr>
-              <a:t>, but descriptive explanation of figure</a:t>
+              <a:t>Brief, but descriptive explanation of figure</a:t>
             </a:r>
           </a:p>
           <a:p>
@@ -4545,18 +4306,13 @@
           </a:p>
           <a:p>
             <a:r>
-              <a:rPr lang="en-US" dirty="0" smtClean="0">
+              <a:rPr lang="en-US" dirty="0">
                 <a:latin typeface="Consolas" charset="0"/>
                 <a:ea typeface="Consolas" charset="0"/>
                 <a:cs typeface="Consolas" charset="0"/>
               </a:rPr>
               <a:t>Legend</a:t>
             </a:r>
-            <a:endParaRPr lang="en-US" dirty="0">
-              <a:latin typeface="Consolas" charset="0"/>
-              <a:ea typeface="Consolas" charset="0"/>
-              <a:cs typeface="Consolas" charset="0"/>
-            </a:endParaRPr>
           </a:p>
           <a:p>
             <a:pPr lvl="1"/>
@@ -4974,24 +4730,16 @@
           </a:lstStyle>
           <a:p>
             <a:r>
-              <a:rPr lang="en-US" sz="3200" dirty="0" smtClean="0">
-                <a:latin typeface="Consolas" charset="0"/>
-                <a:ea typeface="Consolas" charset="0"/>
-                <a:cs typeface="Consolas" charset="0"/>
-              </a:rPr>
-              <a:t>Now </a:t>
-            </a:r>
-            <a:r>
               <a:rPr lang="en-US" sz="3200" dirty="0">
                 <a:latin typeface="Consolas" charset="0"/>
                 <a:ea typeface="Consolas" charset="0"/>
                 <a:cs typeface="Consolas" charset="0"/>
               </a:rPr>
-              <a:t>using the 6th edition</a:t>
-            </a:r>
-          </a:p>
-          <a:p>
-            <a:endParaRPr lang="en-US" sz="1200" dirty="0" smtClean="0">
+              <a:t>Now using the 7th edition</a:t>
+            </a:r>
+          </a:p>
+          <a:p>
+            <a:endParaRPr lang="en-US" sz="1200" dirty="0">
               <a:latin typeface="Consolas" charset="0"/>
               <a:ea typeface="Consolas" charset="0"/>
               <a:cs typeface="Consolas" charset="0"/>
@@ -4999,26 +4747,18 @@
           </a:p>
           <a:p>
             <a:r>
-              <a:rPr lang="en-US" sz="3200" dirty="0" smtClean="0">
-                <a:latin typeface="Consolas" charset="0"/>
-                <a:ea typeface="Consolas" charset="0"/>
-                <a:cs typeface="Consolas" charset="0"/>
-              </a:rPr>
-              <a:t>Used </a:t>
-            </a:r>
-            <a:r>
               <a:rPr lang="en-US" sz="3200" dirty="0">
                 <a:latin typeface="Consolas" charset="0"/>
                 <a:ea typeface="Consolas" charset="0"/>
                 <a:cs typeface="Consolas" charset="0"/>
               </a:rPr>
-              <a:t>for:</a:t>
+              <a:t>Used for:</a:t>
             </a:r>
           </a:p>
           <a:p>
             <a:pPr lvl="2" algn="l"/>
             <a:r>
-              <a:rPr lang="en-US" sz="2800" dirty="0" smtClean="0">
+              <a:rPr lang="en-US" sz="2800" dirty="0">
                 <a:solidFill>
                   <a:schemeClr val="accent6"/>
                 </a:solidFill>
@@ -5028,19 +4768,11 @@
               </a:rPr>
               <a:t>Theses</a:t>
             </a:r>
-            <a:endParaRPr lang="en-US" sz="2800" dirty="0">
-              <a:solidFill>
-                <a:schemeClr val="accent6"/>
-              </a:solidFill>
-              <a:latin typeface="Consolas" charset="0"/>
-              <a:ea typeface="Consolas" charset="0"/>
-              <a:cs typeface="Consolas" charset="0"/>
-            </a:endParaRPr>
           </a:p>
           <a:p>
             <a:pPr lvl="2" algn="l"/>
             <a:r>
-              <a:rPr lang="en-US" sz="2800" dirty="0" smtClean="0">
+              <a:rPr lang="en-US" sz="2800" dirty="0">
                 <a:solidFill>
                   <a:schemeClr val="accent5"/>
                 </a:solidFill>
@@ -5050,19 +4782,11 @@
               </a:rPr>
               <a:t>Dissertations</a:t>
             </a:r>
-            <a:endParaRPr lang="en-US" sz="2800" dirty="0">
-              <a:solidFill>
-                <a:schemeClr val="accent5"/>
-              </a:solidFill>
-              <a:latin typeface="Consolas" charset="0"/>
-              <a:ea typeface="Consolas" charset="0"/>
-              <a:cs typeface="Consolas" charset="0"/>
-            </a:endParaRPr>
           </a:p>
           <a:p>
             <a:pPr lvl="2" algn="l"/>
             <a:r>
-              <a:rPr lang="en-US" sz="2800" dirty="0" smtClean="0">
+              <a:rPr lang="en-US" sz="2800" dirty="0">
                 <a:latin typeface="Consolas" charset="0"/>
                 <a:ea typeface="Consolas" charset="0"/>
                 <a:cs typeface="Consolas" charset="0"/>
@@ -5070,7 +4794,7 @@
               <a:t>Paper/Journal </a:t>
             </a:r>
             <a:r>
-              <a:rPr lang="en-US" sz="2800" dirty="0" smtClean="0">
+              <a:rPr lang="en-US" sz="2800" dirty="0">
                 <a:solidFill>
                   <a:schemeClr val="accent1"/>
                 </a:solidFill>
@@ -5080,19 +4804,11 @@
               </a:rPr>
               <a:t>Articles</a:t>
             </a:r>
-            <a:endParaRPr lang="en-US" sz="2800" dirty="0">
-              <a:solidFill>
-                <a:schemeClr val="accent1"/>
-              </a:solidFill>
-              <a:latin typeface="Consolas" charset="0"/>
-              <a:ea typeface="Consolas" charset="0"/>
-              <a:cs typeface="Consolas" charset="0"/>
-            </a:endParaRPr>
           </a:p>
           <a:p>
             <a:pPr lvl="2" algn="l"/>
             <a:r>
-              <a:rPr lang="en-US" sz="2800" dirty="0" smtClean="0">
+              <a:rPr lang="en-US" sz="2800" dirty="0">
                 <a:solidFill>
                   <a:schemeClr val="accent3"/>
                 </a:solidFill>
@@ -5102,19 +4818,11 @@
               </a:rPr>
               <a:t>Presentations/Posters</a:t>
             </a:r>
-            <a:endParaRPr lang="en-US" sz="2800" dirty="0">
-              <a:solidFill>
-                <a:schemeClr val="accent3"/>
-              </a:solidFill>
-              <a:latin typeface="Consolas" charset="0"/>
-              <a:ea typeface="Consolas" charset="0"/>
-              <a:cs typeface="Consolas" charset="0"/>
-            </a:endParaRPr>
           </a:p>
           <a:p>
             <a:pPr lvl="2" algn="l"/>
             <a:r>
-              <a:rPr lang="en-US" sz="2800" dirty="0" smtClean="0">
+              <a:rPr lang="en-US" sz="2800" dirty="0">
                 <a:solidFill>
                   <a:schemeClr val="accent2"/>
                 </a:solidFill>
@@ -5125,28 +4833,12 @@
               <a:t>Homework</a:t>
             </a:r>
             <a:r>
-              <a:rPr lang="en-US" sz="2800" dirty="0" smtClean="0">
-                <a:latin typeface="Consolas" charset="0"/>
-                <a:ea typeface="Consolas" charset="0"/>
-                <a:cs typeface="Consolas" charset="0"/>
-              </a:rPr>
-              <a:t> </a:t>
-            </a:r>
-            <a:r>
               <a:rPr lang="en-US" sz="2800" dirty="0">
                 <a:latin typeface="Consolas" charset="0"/>
                 <a:ea typeface="Consolas" charset="0"/>
                 <a:cs typeface="Consolas" charset="0"/>
               </a:rPr>
-              <a:t>for this </a:t>
-            </a:r>
-            <a:r>
-              <a:rPr lang="en-US" sz="2800" dirty="0" smtClean="0">
-                <a:latin typeface="Consolas" charset="0"/>
-                <a:ea typeface="Consolas" charset="0"/>
-                <a:cs typeface="Consolas" charset="0"/>
-              </a:rPr>
-              <a:t>course (most importantly!)</a:t>
+              <a:t> for this course (most importantly!)</a:t>
             </a:r>
           </a:p>
         </p:txBody>
@@ -5280,13 +4972,13 @@
         </p:nvSpPr>
         <p:spPr>
           <a:xfrm>
-            <a:off x="1024128" y="1212980"/>
-            <a:ext cx="10113772" cy="3259010"/>
+            <a:off x="241540" y="1212980"/>
+            <a:ext cx="11708920" cy="3259010"/>
           </a:xfrm>
         </p:spPr>
         <p:txBody>
           <a:bodyPr>
-            <a:normAutofit fontScale="92500" lnSpcReduction="10000"/>
+            <a:normAutofit/>
           </a:bodyPr>
           <a:lstStyle/>
           <a:p>
@@ -5295,80 +4987,16 @@
                 <a:spcPts val="0"/>
               </a:spcBef>
               <a:spcAft>
-                <a:spcPts val="500"/>
+                <a:spcPts val="1200"/>
               </a:spcAft>
             </a:pPr>
             <a:r>
-              <a:rPr lang="en-US" dirty="0" smtClean="0">
-                <a:latin typeface="Consolas" charset="0"/>
-                <a:ea typeface="Consolas" charset="0"/>
-                <a:cs typeface="Consolas" charset="0"/>
-              </a:rPr>
-              <a:t>If </a:t>
-            </a:r>
-            <a:r>
-              <a:rPr lang="en-US" dirty="0">
-                <a:latin typeface="Consolas" charset="0"/>
-                <a:ea typeface="Consolas" charset="0"/>
-                <a:cs typeface="Consolas" charset="0"/>
-              </a:rPr>
-              <a:t>n</a:t>
-            </a:r>
-            <a:r>
-              <a:rPr lang="en-US" dirty="0" smtClean="0">
-                <a:latin typeface="Consolas" charset="0"/>
-                <a:ea typeface="Consolas" charset="0"/>
-                <a:cs typeface="Consolas" charset="0"/>
-              </a:rPr>
-              <a:t>umber </a:t>
-            </a:r>
-            <a:r>
-              <a:rPr lang="en-US" dirty="0">
-                <a:latin typeface="Consolas" charset="0"/>
-                <a:ea typeface="Consolas" charset="0"/>
-                <a:cs typeface="Consolas" charset="0"/>
-              </a:rPr>
-              <a:t>&lt; </a:t>
-            </a:r>
-            <a:r>
-              <a:rPr lang="en-US" dirty="0" smtClean="0">
-                <a:latin typeface="Consolas" charset="0"/>
-                <a:ea typeface="Consolas" charset="0"/>
-                <a:cs typeface="Consolas" charset="0"/>
-              </a:rPr>
-              <a:t>10 then </a:t>
-            </a:r>
-            <a:r>
-              <a:rPr lang="en-US" dirty="0">
-                <a:latin typeface="Consolas" charset="0"/>
-                <a:ea typeface="Consolas" charset="0"/>
-                <a:cs typeface="Consolas" charset="0"/>
-              </a:rPr>
-              <a:t>write it </a:t>
-            </a:r>
-            <a:r>
-              <a:rPr lang="en-US">
-                <a:latin typeface="Consolas" charset="0"/>
-                <a:ea typeface="Consolas" charset="0"/>
-                <a:cs typeface="Consolas" charset="0"/>
-              </a:rPr>
-              <a:t>out </a:t>
-            </a:r>
-            <a:r>
-              <a:rPr lang="en-US" smtClean="0">
-                <a:latin typeface="Consolas" charset="0"/>
-                <a:ea typeface="Consolas" charset="0"/>
-                <a:cs typeface="Consolas" charset="0"/>
-              </a:rPr>
-              <a:t>(“</a:t>
-            </a:r>
-            <a:r>
-              <a:rPr lang="en-US" dirty="0">
-                <a:latin typeface="Consolas" charset="0"/>
-                <a:ea typeface="Consolas" charset="0"/>
-                <a:cs typeface="Consolas" charset="0"/>
-              </a:rPr>
-              <a:t>four” instead of 4)</a:t>
+              <a:rPr lang="en-US" sz="2400" dirty="0">
+                <a:latin typeface="Consolas" charset="0"/>
+                <a:ea typeface="Consolas" charset="0"/>
+                <a:cs typeface="Consolas" charset="0"/>
+              </a:rPr>
+              <a:t>If number &lt; 10 then write it out (“four” instead of 4)</a:t>
             </a:r>
           </a:p>
           <a:p>
@@ -5377,32 +5005,16 @@
                 <a:spcPts val="0"/>
               </a:spcBef>
               <a:spcAft>
-                <a:spcPts val="500"/>
+                <a:spcPts val="1200"/>
               </a:spcAft>
             </a:pPr>
             <a:r>
-              <a:rPr lang="en-US" dirty="0" smtClean="0">
-                <a:latin typeface="Consolas" charset="0"/>
-                <a:ea typeface="Consolas" charset="0"/>
-                <a:cs typeface="Consolas" charset="0"/>
-              </a:rPr>
-              <a:t>Use </a:t>
-            </a:r>
-            <a:r>
-              <a:rPr lang="en-US" dirty="0">
-                <a:latin typeface="Consolas" charset="0"/>
-                <a:ea typeface="Consolas" charset="0"/>
-                <a:cs typeface="Consolas" charset="0"/>
-              </a:rPr>
-              <a:t>zero “0” before decimal  ( 0.25 instead of .25</a:t>
-            </a:r>
-            <a:r>
-              <a:rPr lang="en-US" dirty="0" smtClean="0">
-                <a:latin typeface="Consolas" charset="0"/>
-                <a:ea typeface="Consolas" charset="0"/>
-                <a:cs typeface="Consolas" charset="0"/>
-              </a:rPr>
-              <a:t>)</a:t>
+              <a:rPr lang="en-US" sz="2400" dirty="0">
+                <a:latin typeface="Consolas" charset="0"/>
+                <a:ea typeface="Consolas" charset="0"/>
+                <a:cs typeface="Consolas" charset="0"/>
+              </a:rPr>
+              <a:t>Use zero “0” before decimal  ( 0.25 instead of .25)</a:t>
             </a:r>
           </a:p>
           <a:p>
@@ -5411,11 +5023,11 @@
                 <a:spcPts val="0"/>
               </a:spcBef>
               <a:spcAft>
-                <a:spcPts val="500"/>
+                <a:spcPts val="1200"/>
               </a:spcAft>
             </a:pPr>
             <a:r>
-              <a:rPr lang="en-US" dirty="0" smtClean="0">
+              <a:rPr lang="en-US" sz="2400" dirty="0">
                 <a:latin typeface="Consolas" charset="0"/>
                 <a:ea typeface="Consolas" charset="0"/>
                 <a:cs typeface="Consolas" charset="0"/>
@@ -5429,11 +5041,11 @@
                 <a:spcPts val="0"/>
               </a:spcBef>
               <a:spcAft>
-                <a:spcPts val="500"/>
+                <a:spcPts val="1200"/>
               </a:spcAft>
             </a:pPr>
             <a:r>
-              <a:rPr lang="en-US" dirty="0" smtClean="0">
+              <a:rPr lang="en-US" sz="2400" dirty="0">
                 <a:latin typeface="Consolas" charset="0"/>
                 <a:ea typeface="Consolas" charset="0"/>
                 <a:cs typeface="Consolas" charset="0"/>
@@ -5447,22 +5059,17 @@
                 <a:spcPts val="0"/>
               </a:spcBef>
               <a:spcAft>
-                <a:spcPts val="500"/>
+                <a:spcPts val="1200"/>
               </a:spcAft>
             </a:pPr>
             <a:r>
-              <a:rPr lang="en-US" dirty="0" smtClean="0">
+              <a:rPr lang="en-US" sz="2400" dirty="0">
                 <a:latin typeface="Consolas" charset="0"/>
                 <a:ea typeface="Consolas" charset="0"/>
                 <a:cs typeface="Consolas" charset="0"/>
               </a:rPr>
               <a:t>No leading zero on p-values (p = .006 not p = 0.006)</a:t>
             </a:r>
-            <a:endParaRPr lang="en-US" dirty="0">
-              <a:latin typeface="Consolas" charset="0"/>
-              <a:ea typeface="Consolas" charset="0"/>
-              <a:cs typeface="Consolas" charset="0"/>
-            </a:endParaRPr>
           </a:p>
         </p:txBody>
       </p:sp>
@@ -5659,76 +5266,39 @@
           <a:lstStyle/>
           <a:p>
             <a:r>
-              <a:rPr lang="en-US" sz="2800" dirty="0" smtClean="0">
-                <a:latin typeface="Consolas" charset="0"/>
-                <a:ea typeface="Consolas" charset="0"/>
-                <a:cs typeface="Consolas" charset="0"/>
-              </a:rPr>
-              <a:t>Referencing </a:t>
-            </a:r>
-            <a:r>
-              <a:rPr lang="en-US" sz="2800" dirty="0">
-                <a:latin typeface="Consolas" charset="0"/>
-                <a:ea typeface="Consolas" charset="0"/>
-                <a:cs typeface="Consolas" charset="0"/>
-              </a:rPr>
-              <a:t>analysis method?</a:t>
+              <a:rPr lang="en-US" sz="2400" dirty="0">
+                <a:latin typeface="Consolas" charset="0"/>
+                <a:ea typeface="Consolas" charset="0"/>
+                <a:cs typeface="Consolas" charset="0"/>
+              </a:rPr>
+              <a:t>Referencing analysis method?</a:t>
             </a:r>
           </a:p>
           <a:p>
             <a:pPr lvl="1"/>
             <a:r>
-              <a:rPr lang="en-US" dirty="0">
-                <a:latin typeface="Consolas" charset="0"/>
-                <a:ea typeface="Consolas" charset="0"/>
-                <a:cs typeface="Consolas" charset="0"/>
-              </a:rPr>
-              <a:t>C</a:t>
-            </a:r>
-            <a:r>
-              <a:rPr lang="en-US" sz="2400" dirty="0" smtClean="0">
-                <a:latin typeface="Consolas" charset="0"/>
-                <a:ea typeface="Consolas" charset="0"/>
-                <a:cs typeface="Consolas" charset="0"/>
-              </a:rPr>
-              <a:t>ommon</a:t>
-            </a:r>
-            <a:r>
-              <a:rPr lang="en-US" sz="2400" dirty="0">
-                <a:latin typeface="Consolas" charset="0"/>
-                <a:ea typeface="Consolas" charset="0"/>
-                <a:cs typeface="Consolas" charset="0"/>
-              </a:rPr>
-              <a:t>: no</a:t>
+              <a:rPr lang="en-US" sz="2000" dirty="0">
+                <a:latin typeface="Consolas" charset="0"/>
+                <a:ea typeface="Consolas" charset="0"/>
+                <a:cs typeface="Consolas" charset="0"/>
+              </a:rPr>
+              <a:t>Common: no</a:t>
             </a:r>
           </a:p>
           <a:p>
             <a:pPr lvl="1"/>
             <a:r>
-              <a:rPr lang="en-US" sz="2400" dirty="0" smtClean="0">
-                <a:latin typeface="Consolas" charset="0"/>
-                <a:ea typeface="Consolas" charset="0"/>
-                <a:cs typeface="Consolas" charset="0"/>
-              </a:rPr>
-              <a:t>Rare </a:t>
-            </a:r>
-            <a:r>
-              <a:rPr lang="en-US" sz="2400" dirty="0">
-                <a:latin typeface="Consolas" charset="0"/>
-                <a:ea typeface="Consolas" charset="0"/>
-                <a:cs typeface="Consolas" charset="0"/>
-              </a:rPr>
-              <a:t>or new:  </a:t>
-            </a:r>
-            <a:r>
-              <a:rPr lang="en-US" sz="2400" dirty="0" smtClean="0">
-                <a:latin typeface="Consolas" charset="0"/>
-                <a:ea typeface="Consolas" charset="0"/>
-                <a:cs typeface="Consolas" charset="0"/>
-              </a:rPr>
-              <a:t>yes</a:t>
-            </a:r>
-            <a:endParaRPr lang="en-US" sz="2400" dirty="0">
+              <a:rPr lang="en-US" sz="2000" dirty="0">
+                <a:latin typeface="Consolas" charset="0"/>
+                <a:ea typeface="Consolas" charset="0"/>
+                <a:cs typeface="Consolas" charset="0"/>
+              </a:rPr>
+              <a:t>Rare or new:  yes</a:t>
+            </a:r>
+          </a:p>
+          <a:p>
+            <a:pPr lvl="1"/>
+            <a:endParaRPr lang="en-US" sz="2000" dirty="0">
               <a:latin typeface="Consolas" charset="0"/>
               <a:ea typeface="Consolas" charset="0"/>
               <a:cs typeface="Consolas" charset="0"/>
@@ -5736,39 +5306,23 @@
           </a:p>
           <a:p>
             <a:r>
-              <a:rPr lang="en-US" sz="2800" dirty="0" smtClean="0">
-                <a:latin typeface="Consolas" charset="0"/>
-                <a:ea typeface="Consolas" charset="0"/>
-                <a:cs typeface="Consolas" charset="0"/>
-              </a:rPr>
-              <a:t>Descriptive </a:t>
-            </a:r>
-            <a:r>
-              <a:rPr lang="en-US" sz="2800" dirty="0">
-                <a:latin typeface="Consolas" charset="0"/>
-                <a:ea typeface="Consolas" charset="0"/>
-                <a:cs typeface="Consolas" charset="0"/>
-              </a:rPr>
-              <a:t>statistics:</a:t>
+              <a:rPr lang="en-US" sz="2400" dirty="0">
+                <a:latin typeface="Consolas" charset="0"/>
+                <a:ea typeface="Consolas" charset="0"/>
+                <a:cs typeface="Consolas" charset="0"/>
+              </a:rPr>
+              <a:t>Descriptive statistics:</a:t>
             </a:r>
           </a:p>
           <a:p>
             <a:pPr lvl="1"/>
             <a:r>
-              <a:rPr lang="en-US" sz="2400" dirty="0" smtClean="0">
-                <a:latin typeface="Consolas" charset="0"/>
-                <a:ea typeface="Consolas" charset="0"/>
-                <a:cs typeface="Consolas" charset="0"/>
-              </a:rPr>
-              <a:t>Abbreviations </a:t>
-            </a:r>
-            <a:r>
-              <a:rPr lang="en-US" sz="2400" dirty="0">
-                <a:latin typeface="Consolas" charset="0"/>
-                <a:ea typeface="Consolas" charset="0"/>
-                <a:cs typeface="Consolas" charset="0"/>
-              </a:rPr>
-              <a:t>(spell out if not followed by stats)</a:t>
+              <a:rPr lang="en-US" sz="2000" dirty="0">
+                <a:latin typeface="Consolas" charset="0"/>
+                <a:ea typeface="Consolas" charset="0"/>
+                <a:cs typeface="Consolas" charset="0"/>
+              </a:rPr>
+              <a:t>Abbreviations (spell out if not followed by stats)</a:t>
             </a:r>
           </a:p>
           <a:p>
@@ -5777,7 +5331,7 @@
               <a:buChar char="o"/>
             </a:pPr>
             <a:r>
-              <a:rPr lang="en-US" sz="1800" dirty="0">
+              <a:rPr lang="en-US" sz="1600" dirty="0">
                 <a:latin typeface="Consolas" charset="0"/>
                 <a:ea typeface="Consolas" charset="0"/>
                 <a:cs typeface="Consolas" charset="0"/>
@@ -5791,7 +5345,7 @@
               <a:buChar char="o"/>
             </a:pPr>
             <a:r>
-              <a:rPr lang="en-US" sz="1800" dirty="0">
+              <a:rPr lang="en-US" sz="1600" dirty="0">
                 <a:latin typeface="Consolas" charset="0"/>
                 <a:ea typeface="Consolas" charset="0"/>
                 <a:cs typeface="Consolas" charset="0"/>
@@ -5800,43 +5354,38 @@
             </a:r>
           </a:p>
           <a:p>
-            <a:r>
-              <a:rPr lang="en-US" sz="2800" dirty="0" smtClean="0">
-                <a:latin typeface="Consolas" charset="0"/>
-                <a:ea typeface="Consolas" charset="0"/>
-                <a:cs typeface="Consolas" charset="0"/>
-              </a:rPr>
-              <a:t>Inferential </a:t>
-            </a:r>
-            <a:r>
-              <a:rPr lang="en-US" sz="2800" dirty="0">
-                <a:latin typeface="Consolas" charset="0"/>
-                <a:ea typeface="Consolas" charset="0"/>
-                <a:cs typeface="Consolas" charset="0"/>
-              </a:rPr>
-              <a:t>statistics :</a:t>
+            <a:pPr lvl="2">
+              <a:buFont typeface="Courier New" panose="02070309020205020404" pitchFamily="49" charset="0"/>
+              <a:buChar char="o"/>
+            </a:pPr>
+            <a:endParaRPr lang="en-US" sz="1600" dirty="0">
+              <a:latin typeface="Consolas" charset="0"/>
+              <a:ea typeface="Consolas" charset="0"/>
+              <a:cs typeface="Consolas" charset="0"/>
+            </a:endParaRPr>
+          </a:p>
+          <a:p>
+            <a:r>
+              <a:rPr lang="en-US" sz="2400" dirty="0">
+                <a:latin typeface="Consolas" charset="0"/>
+                <a:ea typeface="Consolas" charset="0"/>
+                <a:cs typeface="Consolas" charset="0"/>
+              </a:rPr>
+              <a:t>Inferential statistics :</a:t>
             </a:r>
           </a:p>
           <a:p>
             <a:pPr lvl="1"/>
             <a:r>
-              <a:rPr lang="en-US" sz="2400" dirty="0" smtClean="0">
-                <a:latin typeface="Consolas" charset="0"/>
-                <a:ea typeface="Consolas" charset="0"/>
-                <a:cs typeface="Consolas" charset="0"/>
-              </a:rPr>
-              <a:t>Distributions</a:t>
-            </a:r>
-            <a:r>
-              <a:rPr lang="en-US" sz="2400" dirty="0">
-                <a:latin typeface="Consolas" charset="0"/>
-                <a:ea typeface="Consolas" charset="0"/>
-                <a:cs typeface="Consolas" charset="0"/>
-              </a:rPr>
-              <a:t>, </a:t>
-            </a:r>
-            <a:r>
-              <a:rPr lang="en-US" sz="2400" dirty="0" err="1">
+              <a:rPr lang="en-US" sz="2000" dirty="0">
+                <a:latin typeface="Consolas" charset="0"/>
+                <a:ea typeface="Consolas" charset="0"/>
+                <a:cs typeface="Consolas" charset="0"/>
+              </a:rPr>
+              <a:t>Distributions, </a:t>
+            </a:r>
+            <a:r>
+              <a:rPr lang="en-US" sz="2000" dirty="0" err="1">
                 <a:latin typeface="Consolas" charset="0"/>
                 <a:ea typeface="Consolas" charset="0"/>
                 <a:cs typeface="Consolas" charset="0"/>
@@ -5844,7 +5393,7 @@
               <a:t>df</a:t>
             </a:r>
             <a:r>
-              <a:rPr lang="en-US" sz="2400" dirty="0">
+              <a:rPr lang="en-US" sz="2000" dirty="0">
                 <a:latin typeface="Consolas" charset="0"/>
                 <a:ea typeface="Consolas" charset="0"/>
                 <a:cs typeface="Consolas" charset="0"/>
@@ -5855,20 +5404,12 @@
           <a:p>
             <a:pPr lvl="1"/>
             <a:r>
-              <a:rPr lang="en-US" sz="2400" dirty="0" smtClean="0">
-                <a:latin typeface="Consolas" charset="0"/>
-                <a:ea typeface="Consolas" charset="0"/>
-                <a:cs typeface="Consolas" charset="0"/>
-              </a:rPr>
-              <a:t>t(32</a:t>
-            </a:r>
-            <a:r>
-              <a:rPr lang="en-US" sz="2400" dirty="0">
-                <a:latin typeface="Consolas" charset="0"/>
-                <a:ea typeface="Consolas" charset="0"/>
-                <a:cs typeface="Consolas" charset="0"/>
-              </a:rPr>
-              <a:t>) = 4.75, p &lt; 0.05, Cohen’s d = 0.87</a:t>
+              <a:rPr lang="en-US" sz="2000" dirty="0">
+                <a:latin typeface="Consolas" charset="0"/>
+                <a:ea typeface="Consolas" charset="0"/>
+                <a:cs typeface="Consolas" charset="0"/>
+              </a:rPr>
+              <a:t>t(32) = 4.75, p &lt; 0.05, Cohen’s d = 0.87</a:t>
             </a:r>
           </a:p>
         </p:txBody>
@@ -6147,109 +5688,58 @@
           <a:lstStyle/>
           <a:p>
             <a:r>
-              <a:rPr lang="en-US" sz="2800" dirty="0" smtClean="0">
-                <a:latin typeface="Consolas" charset="0"/>
-                <a:ea typeface="Consolas" charset="0"/>
-                <a:cs typeface="Consolas" charset="0"/>
-              </a:rPr>
-              <a:t>Results </a:t>
-            </a:r>
-            <a:r>
               <a:rPr lang="en-US" sz="2800" dirty="0">
                 <a:latin typeface="Consolas" charset="0"/>
                 <a:ea typeface="Consolas" charset="0"/>
                 <a:cs typeface="Consolas" charset="0"/>
               </a:rPr>
-              <a:t>may presented as: text, tables, or figures</a:t>
-            </a:r>
-          </a:p>
-          <a:p>
-            <a:r>
-              <a:rPr lang="en-US" sz="2800" dirty="0" smtClean="0">
-                <a:latin typeface="Consolas" charset="0"/>
-                <a:ea typeface="Consolas" charset="0"/>
-                <a:cs typeface="Consolas" charset="0"/>
-              </a:rPr>
-              <a:t>Rules </a:t>
-            </a:r>
+              <a:t>Results may presented as: text, tables, or figures</a:t>
+            </a:r>
+          </a:p>
+          <a:p>
             <a:r>
               <a:rPr lang="en-US" sz="2800" dirty="0">
                 <a:latin typeface="Consolas" charset="0"/>
                 <a:ea typeface="Consolas" charset="0"/>
                 <a:cs typeface="Consolas" charset="0"/>
               </a:rPr>
-              <a:t>of thumb:</a:t>
+              <a:t>Rules of thumb:</a:t>
             </a:r>
           </a:p>
           <a:p>
             <a:pPr lvl="1"/>
             <a:r>
-              <a:rPr lang="en-US" sz="2400" dirty="0" smtClean="0">
-                <a:latin typeface="Consolas" charset="0"/>
-                <a:ea typeface="Consolas" charset="0"/>
-                <a:cs typeface="Consolas" charset="0"/>
-              </a:rPr>
-              <a:t>TEXT </a:t>
-            </a:r>
-            <a:r>
               <a:rPr lang="en-US" sz="2400" dirty="0">
                 <a:latin typeface="Consolas" charset="0"/>
                 <a:ea typeface="Consolas" charset="0"/>
                 <a:cs typeface="Consolas" charset="0"/>
               </a:rPr>
-              <a:t>if &lt; 4 numbers/statistics</a:t>
+              <a:t>TEXT if &lt; 4 numbers/statistics</a:t>
             </a:r>
           </a:p>
           <a:p>
             <a:pPr lvl="1"/>
             <a:r>
-              <a:rPr lang="en-US" sz="2400" dirty="0" smtClean="0">
-                <a:latin typeface="Consolas" charset="0"/>
-                <a:ea typeface="Consolas" charset="0"/>
-                <a:cs typeface="Consolas" charset="0"/>
-              </a:rPr>
-              <a:t>TABLE </a:t>
-            </a:r>
-            <a:r>
               <a:rPr lang="en-US" sz="2400" dirty="0">
                 <a:latin typeface="Consolas" charset="0"/>
                 <a:ea typeface="Consolas" charset="0"/>
                 <a:cs typeface="Consolas" charset="0"/>
               </a:rPr>
-              <a:t>if 4 to 20 numbers/statistics</a:t>
+              <a:t>TABLE if 4 to 20 numbers/statistics</a:t>
             </a:r>
           </a:p>
           <a:p>
             <a:pPr lvl="1"/>
             <a:r>
-              <a:rPr lang="en-US" sz="2400" dirty="0" smtClean="0">
-                <a:latin typeface="Consolas" charset="0"/>
-                <a:ea typeface="Consolas" charset="0"/>
-                <a:cs typeface="Consolas" charset="0"/>
-              </a:rPr>
-              <a:t>FIGURE </a:t>
-            </a:r>
-            <a:r>
               <a:rPr lang="en-US" sz="2400" dirty="0">
                 <a:latin typeface="Consolas" charset="0"/>
                 <a:ea typeface="Consolas" charset="0"/>
                 <a:cs typeface="Consolas" charset="0"/>
               </a:rPr>
-              <a:t>if 20+ numbers/statistics</a:t>
-            </a:r>
-          </a:p>
-          <a:p>
-            <a:r>
-              <a:rPr lang="en-US" sz="2800" b="1" dirty="0" smtClean="0">
-                <a:solidFill>
-                  <a:schemeClr val="accent6"/>
-                </a:solidFill>
-                <a:latin typeface="Consolas" charset="0"/>
-                <a:ea typeface="Consolas" charset="0"/>
-                <a:cs typeface="Consolas" charset="0"/>
-              </a:rPr>
-              <a:t>Pick </a:t>
-            </a:r>
+              <a:t>FIGURE if 20+ numbers/statistics</a:t>
+            </a:r>
+          </a:p>
+          <a:p>
             <a:r>
               <a:rPr lang="en-US" sz="2800" b="1" dirty="0">
                 <a:solidFill>
@@ -6259,79 +5749,50 @@
                 <a:ea typeface="Consolas" charset="0"/>
                 <a:cs typeface="Consolas" charset="0"/>
               </a:rPr>
-              <a:t>the method that best communicates the results/message</a:t>
-            </a:r>
-          </a:p>
-          <a:p>
-            <a:r>
-              <a:rPr lang="en-US" sz="2800" dirty="0" smtClean="0">
-                <a:latin typeface="Consolas" charset="0"/>
-                <a:ea typeface="Consolas" charset="0"/>
-                <a:cs typeface="Consolas" charset="0"/>
-              </a:rPr>
-              <a:t>Symbols </a:t>
-            </a:r>
+              <a:t>Pick the method that best communicates the results/message</a:t>
+            </a:r>
+          </a:p>
+          <a:p>
             <a:r>
               <a:rPr lang="en-US" sz="2800" dirty="0">
                 <a:latin typeface="Consolas" charset="0"/>
                 <a:ea typeface="Consolas" charset="0"/>
                 <a:cs typeface="Consolas" charset="0"/>
               </a:rPr>
-              <a:t>&amp; abbreviations</a:t>
+              <a:t>Symbols &amp; abbreviations</a:t>
             </a:r>
           </a:p>
           <a:p>
             <a:pPr lvl="1"/>
             <a:r>
-              <a:rPr lang="en-US" sz="2400" dirty="0" smtClean="0">
-                <a:latin typeface="Consolas" charset="0"/>
-                <a:ea typeface="Consolas" charset="0"/>
-                <a:cs typeface="Consolas" charset="0"/>
-              </a:rPr>
-              <a:t>N </a:t>
-            </a:r>
-            <a:r>
               <a:rPr lang="en-US" sz="2400" dirty="0">
                 <a:latin typeface="Consolas" charset="0"/>
                 <a:ea typeface="Consolas" charset="0"/>
                 <a:cs typeface="Consolas" charset="0"/>
               </a:rPr>
-              <a:t>vs. n</a:t>
+              <a:t>N vs. n</a:t>
             </a:r>
           </a:p>
           <a:p>
             <a:pPr lvl="1"/>
             <a:r>
-              <a:rPr lang="en-US" sz="2400" dirty="0" smtClean="0">
+              <a:rPr lang="en-US" sz="2400" dirty="0">
                 <a:latin typeface="Consolas" charset="0"/>
                 <a:ea typeface="Consolas" charset="0"/>
                 <a:cs typeface="Consolas" charset="0"/>
               </a:rPr>
               <a:t>Italicized</a:t>
             </a:r>
-            <a:endParaRPr lang="en-US" sz="2400" dirty="0">
-              <a:latin typeface="Consolas" charset="0"/>
-              <a:ea typeface="Consolas" charset="0"/>
-              <a:cs typeface="Consolas" charset="0"/>
-            </a:endParaRPr>
           </a:p>
           <a:p>
             <a:pPr lvl="1"/>
             <a:r>
-              <a:rPr lang="en-US" sz="2400" i="1" dirty="0" smtClean="0">
-                <a:latin typeface="Consolas" charset="0"/>
-                <a:ea typeface="Consolas" charset="0"/>
-                <a:cs typeface="Consolas" charset="0"/>
-              </a:rPr>
-              <a:t>See </a:t>
-            </a:r>
-            <a:r>
               <a:rPr lang="en-US" sz="2400" i="1" dirty="0">
                 <a:latin typeface="Consolas" charset="0"/>
                 <a:ea typeface="Consolas" charset="0"/>
                 <a:cs typeface="Consolas" charset="0"/>
               </a:rPr>
-              <a:t>pages 141-144 of APA publication manual (reading “AR2” p 20-23)</a:t>
+              <a:t>See pages 141-144 of APA publication manual (reading “AR2” p 20-23)</a:t>
             </a:r>
           </a:p>
         </p:txBody>

</xml_diff>

<commit_message>
update APA to 7th edition
</commit_message>
<xml_diff>
--- a/slides/ch0_apa_6th.pptx
+++ b/slides/ch0_apa_6th.pptx
@@ -2,10 +2,10 @@
 <file path=ppt/presentation.xml><?xml version="1.0" encoding="utf-8"?>
 <p:presentation xmlns:a="http://schemas.openxmlformats.org/drawingml/2006/main" xmlns:r="http://schemas.openxmlformats.org/officeDocument/2006/relationships" xmlns:p="http://schemas.openxmlformats.org/presentationml/2006/main" saveSubsetFonts="1" autoCompressPictures="0">
   <p:sldMasterIdLst>
-    <p:sldMasterId id="2147483673" r:id="rId1"/>
+    <p:sldMasterId id="2147483724" r:id="rId1"/>
   </p:sldMasterIdLst>
   <p:handoutMasterIdLst>
-    <p:handoutMasterId r:id="rId18"/>
+    <p:handoutMasterId r:id="rId14"/>
   </p:handoutMasterIdLst>
   <p:sldIdLst>
     <p:sldId id="256" r:id="rId2"/>
@@ -13,17 +13,13 @@
     <p:sldId id="258" r:id="rId4"/>
     <p:sldId id="259" r:id="rId5"/>
     <p:sldId id="270" r:id="rId6"/>
-    <p:sldId id="261" r:id="rId7"/>
-    <p:sldId id="271" r:id="rId8"/>
-    <p:sldId id="260" r:id="rId9"/>
-    <p:sldId id="262" r:id="rId10"/>
-    <p:sldId id="272" r:id="rId11"/>
-    <p:sldId id="264" r:id="rId12"/>
-    <p:sldId id="266" r:id="rId13"/>
-    <p:sldId id="263" r:id="rId14"/>
-    <p:sldId id="265" r:id="rId15"/>
-    <p:sldId id="267" r:id="rId16"/>
-    <p:sldId id="268" r:id="rId17"/>
+    <p:sldId id="260" r:id="rId7"/>
+    <p:sldId id="264" r:id="rId8"/>
+    <p:sldId id="266" r:id="rId9"/>
+    <p:sldId id="263" r:id="rId10"/>
+    <p:sldId id="265" r:id="rId11"/>
+    <p:sldId id="267" r:id="rId12"/>
+    <p:sldId id="268" r:id="rId13"/>
   </p:sldIdLst>
   <p:sldSz cx="12192000" cy="6858000"/>
   <p:notesSz cx="6858000" cy="9144000"/>
@@ -31,7 +27,7 @@
     <a:defPPr>
       <a:defRPr lang="en-US"/>
     </a:defPPr>
-    <a:lvl1pPr marL="0" algn="l" defTabSz="457200" rtl="0" eaLnBrk="1" latinLnBrk="0" hangingPunct="1">
+    <a:lvl1pPr marL="0" algn="l" defTabSz="914400" rtl="0" eaLnBrk="1" latinLnBrk="0" hangingPunct="1">
       <a:defRPr sz="1800" kern="1200">
         <a:solidFill>
           <a:schemeClr val="tx1"/>
@@ -41,7 +37,7 @@
         <a:cs typeface="+mn-cs"/>
       </a:defRPr>
     </a:lvl1pPr>
-    <a:lvl2pPr marL="457200" algn="l" defTabSz="457200" rtl="0" eaLnBrk="1" latinLnBrk="0" hangingPunct="1">
+    <a:lvl2pPr marL="457200" algn="l" defTabSz="914400" rtl="0" eaLnBrk="1" latinLnBrk="0" hangingPunct="1">
       <a:defRPr sz="1800" kern="1200">
         <a:solidFill>
           <a:schemeClr val="tx1"/>
@@ -51,7 +47,7 @@
         <a:cs typeface="+mn-cs"/>
       </a:defRPr>
     </a:lvl2pPr>
-    <a:lvl3pPr marL="914400" algn="l" defTabSz="457200" rtl="0" eaLnBrk="1" latinLnBrk="0" hangingPunct="1">
+    <a:lvl3pPr marL="914400" algn="l" defTabSz="914400" rtl="0" eaLnBrk="1" latinLnBrk="0" hangingPunct="1">
       <a:defRPr sz="1800" kern="1200">
         <a:solidFill>
           <a:schemeClr val="tx1"/>
@@ -61,7 +57,7 @@
         <a:cs typeface="+mn-cs"/>
       </a:defRPr>
     </a:lvl3pPr>
-    <a:lvl4pPr marL="1371600" algn="l" defTabSz="457200" rtl="0" eaLnBrk="1" latinLnBrk="0" hangingPunct="1">
+    <a:lvl4pPr marL="1371600" algn="l" defTabSz="914400" rtl="0" eaLnBrk="1" latinLnBrk="0" hangingPunct="1">
       <a:defRPr sz="1800" kern="1200">
         <a:solidFill>
           <a:schemeClr val="tx1"/>
@@ -71,7 +67,7 @@
         <a:cs typeface="+mn-cs"/>
       </a:defRPr>
     </a:lvl4pPr>
-    <a:lvl5pPr marL="1828800" algn="l" defTabSz="457200" rtl="0" eaLnBrk="1" latinLnBrk="0" hangingPunct="1">
+    <a:lvl5pPr marL="1828800" algn="l" defTabSz="914400" rtl="0" eaLnBrk="1" latinLnBrk="0" hangingPunct="1">
       <a:defRPr sz="1800" kern="1200">
         <a:solidFill>
           <a:schemeClr val="tx1"/>
@@ -81,7 +77,7 @@
         <a:cs typeface="+mn-cs"/>
       </a:defRPr>
     </a:lvl5pPr>
-    <a:lvl6pPr marL="2286000" algn="l" defTabSz="457200" rtl="0" eaLnBrk="1" latinLnBrk="0" hangingPunct="1">
+    <a:lvl6pPr marL="2286000" algn="l" defTabSz="914400" rtl="0" eaLnBrk="1" latinLnBrk="0" hangingPunct="1">
       <a:defRPr sz="1800" kern="1200">
         <a:solidFill>
           <a:schemeClr val="tx1"/>
@@ -91,7 +87,7 @@
         <a:cs typeface="+mn-cs"/>
       </a:defRPr>
     </a:lvl6pPr>
-    <a:lvl7pPr marL="2743200" algn="l" defTabSz="457200" rtl="0" eaLnBrk="1" latinLnBrk="0" hangingPunct="1">
+    <a:lvl7pPr marL="2743200" algn="l" defTabSz="914400" rtl="0" eaLnBrk="1" latinLnBrk="0" hangingPunct="1">
       <a:defRPr sz="1800" kern="1200">
         <a:solidFill>
           <a:schemeClr val="tx1"/>
@@ -101,7 +97,7 @@
         <a:cs typeface="+mn-cs"/>
       </a:defRPr>
     </a:lvl7pPr>
-    <a:lvl8pPr marL="3200400" algn="l" defTabSz="457200" rtl="0" eaLnBrk="1" latinLnBrk="0" hangingPunct="1">
+    <a:lvl8pPr marL="3200400" algn="l" defTabSz="914400" rtl="0" eaLnBrk="1" latinLnBrk="0" hangingPunct="1">
       <a:defRPr sz="1800" kern="1200">
         <a:solidFill>
           <a:schemeClr val="tx1"/>
@@ -111,7 +107,7 @@
         <a:cs typeface="+mn-cs"/>
       </a:defRPr>
     </a:lvl8pPr>
-    <a:lvl9pPr marL="3657600" algn="l" defTabSz="457200" rtl="0" eaLnBrk="1" latinLnBrk="0" hangingPunct="1">
+    <a:lvl9pPr marL="3657600" algn="l" defTabSz="914400" rtl="0" eaLnBrk="1" latinLnBrk="0" hangingPunct="1">
       <a:defRPr sz="1800" kern="1200">
         <a:solidFill>
           <a:schemeClr val="tx1"/>
@@ -212,7 +208,7 @@
           <a:p>
             <a:fld id="{387A93FA-11DC-4132-A420-E71D185CF2B8}" type="datetimeFigureOut">
               <a:rPr lang="en-US" smtClean="0"/>
-              <a:t>5/4/2020</a:t>
+              <a:t>1/27/2021</a:t>
             </a:fld>
             <a:endParaRPr lang="en-US"/>
           </a:p>
@@ -314,7 +310,13 @@
       </p:grpSpPr>
       <p:sp>
         <p:nvSpPr>
-          <p:cNvPr id="2" name="Title 1"/>
+          <p:cNvPr id="2" name="Title 1">
+            <a:extLst>
+              <a:ext uri="{FF2B5EF4-FFF2-40B4-BE49-F238E27FC236}">
+                <a16:creationId xmlns:a16="http://schemas.microsoft.com/office/drawing/2014/main" id="{86C6BCDD-08E7-4CEC-9DA6-6E3BD3965E38}"/>
+              </a:ext>
+            </a:extLst>
+          </p:cNvPr>
           <p:cNvSpPr>
             <a:spLocks noGrp="1"/>
           </p:cNvSpPr>
@@ -340,13 +342,18 @@
               <a:rPr lang="en-US"/>
               <a:t>Click to edit Master title style</a:t>
             </a:r>
-            <a:endParaRPr lang="en-US" dirty="0"/>
-          </a:p>
-        </p:txBody>
-      </p:sp>
-      <p:sp>
-        <p:nvSpPr>
-          <p:cNvPr id="3" name="Subtitle 2"/>
+          </a:p>
+        </p:txBody>
+      </p:sp>
+      <p:sp>
+        <p:nvSpPr>
+          <p:cNvPr id="3" name="Subtitle 2">
+            <a:extLst>
+              <a:ext uri="{FF2B5EF4-FFF2-40B4-BE49-F238E27FC236}">
+                <a16:creationId xmlns:a16="http://schemas.microsoft.com/office/drawing/2014/main" id="{0B0614FB-017E-4CEB-80E5-7FF42A0E172F}"/>
+              </a:ext>
+            </a:extLst>
+          </p:cNvPr>
           <p:cNvSpPr>
             <a:spLocks noGrp="1"/>
           </p:cNvSpPr>
@@ -405,13 +412,18 @@
               <a:rPr lang="en-US"/>
               <a:t>Click to edit Master subtitle style</a:t>
             </a:r>
-            <a:endParaRPr lang="en-US" dirty="0"/>
-          </a:p>
-        </p:txBody>
-      </p:sp>
-      <p:sp>
-        <p:nvSpPr>
-          <p:cNvPr id="4" name="Date Placeholder 3"/>
+          </a:p>
+        </p:txBody>
+      </p:sp>
+      <p:sp>
+        <p:nvSpPr>
+          <p:cNvPr id="4" name="Date Placeholder 3">
+            <a:extLst>
+              <a:ext uri="{FF2B5EF4-FFF2-40B4-BE49-F238E27FC236}">
+                <a16:creationId xmlns:a16="http://schemas.microsoft.com/office/drawing/2014/main" id="{8AC857F8-A33A-41AB-B601-641C687895F1}"/>
+              </a:ext>
+            </a:extLst>
+          </p:cNvPr>
           <p:cNvSpPr>
             <a:spLocks noGrp="1"/>
           </p:cNvSpPr>
@@ -427,7 +439,7 @@
             <a:fld id="{96DFF08F-DC6B-4601-B491-B0F83F6DD2DA}" type="datetimeFigureOut">
               <a:rPr lang="en-US" smtClean="0"/>
               <a:pPr/>
-              <a:t>5/4/2020</a:t>
+              <a:t>1/27/2021</a:t>
             </a:fld>
             <a:endParaRPr lang="en-US" dirty="0"/>
           </a:p>
@@ -435,7 +447,13 @@
       </p:sp>
       <p:sp>
         <p:nvSpPr>
-          <p:cNvPr id="5" name="Footer Placeholder 4"/>
+          <p:cNvPr id="5" name="Footer Placeholder 4">
+            <a:extLst>
+              <a:ext uri="{FF2B5EF4-FFF2-40B4-BE49-F238E27FC236}">
+                <a16:creationId xmlns:a16="http://schemas.microsoft.com/office/drawing/2014/main" id="{54A54188-7CFF-462C-9248-A1734DDB7C13}"/>
+              </a:ext>
+            </a:extLst>
+          </p:cNvPr>
           <p:cNvSpPr>
             <a:spLocks noGrp="1"/>
           </p:cNvSpPr>
@@ -454,7 +472,13 @@
       </p:sp>
       <p:sp>
         <p:nvSpPr>
-          <p:cNvPr id="6" name="Slide Number Placeholder 5"/>
+          <p:cNvPr id="6" name="Slide Number Placeholder 5">
+            <a:extLst>
+              <a:ext uri="{FF2B5EF4-FFF2-40B4-BE49-F238E27FC236}">
+                <a16:creationId xmlns:a16="http://schemas.microsoft.com/office/drawing/2014/main" id="{9C6BB2EE-FB52-462C-929D-A270E0D9D32E}"/>
+              </a:ext>
+            </a:extLst>
+          </p:cNvPr>
           <p:cNvSpPr>
             <a:spLocks noGrp="1"/>
           </p:cNvSpPr>
@@ -476,6 +500,11 @@
         </p:txBody>
       </p:sp>
     </p:spTree>
+    <p:extLst>
+      <p:ext uri="{BB962C8B-B14F-4D97-AF65-F5344CB8AC3E}">
+        <p14:creationId xmlns:p14="http://schemas.microsoft.com/office/powerpoint/2010/main" val="3100712058"/>
+      </p:ext>
+    </p:extLst>
   </p:cSld>
   <p:clrMapOvr>
     <a:masterClrMapping/>
@@ -502,7 +531,13 @@
       </p:grpSpPr>
       <p:sp>
         <p:nvSpPr>
-          <p:cNvPr id="2" name="Title 1"/>
+          <p:cNvPr id="2" name="Title 1">
+            <a:extLst>
+              <a:ext uri="{FF2B5EF4-FFF2-40B4-BE49-F238E27FC236}">
+                <a16:creationId xmlns:a16="http://schemas.microsoft.com/office/drawing/2014/main" id="{69BF0453-CCA0-4CB3-9261-9E97F8DFB11F}"/>
+              </a:ext>
+            </a:extLst>
+          </p:cNvPr>
           <p:cNvSpPr>
             <a:spLocks noGrp="1"/>
           </p:cNvSpPr>
@@ -519,13 +554,18 @@
               <a:rPr lang="en-US"/>
               <a:t>Click to edit Master title style</a:t>
             </a:r>
-            <a:endParaRPr lang="en-US" dirty="0"/>
-          </a:p>
-        </p:txBody>
-      </p:sp>
-      <p:sp>
-        <p:nvSpPr>
-          <p:cNvPr id="3" name="Vertical Text Placeholder 2"/>
+          </a:p>
+        </p:txBody>
+      </p:sp>
+      <p:sp>
+        <p:nvSpPr>
+          <p:cNvPr id="3" name="Vertical Text Placeholder 2">
+            <a:extLst>
+              <a:ext uri="{FF2B5EF4-FFF2-40B4-BE49-F238E27FC236}">
+                <a16:creationId xmlns:a16="http://schemas.microsoft.com/office/drawing/2014/main" id="{715FFC83-3CA2-4F86-9AB4-178C2EB1FE4E}"/>
+              </a:ext>
+            </a:extLst>
+          </p:cNvPr>
           <p:cNvSpPr>
             <a:spLocks noGrp="1"/>
           </p:cNvSpPr>
@@ -571,13 +611,18 @@
               <a:rPr lang="en-US"/>
               <a:t>Fifth level</a:t>
             </a:r>
-            <a:endParaRPr lang="en-US" dirty="0"/>
-          </a:p>
-        </p:txBody>
-      </p:sp>
-      <p:sp>
-        <p:nvSpPr>
-          <p:cNvPr id="4" name="Date Placeholder 3"/>
+          </a:p>
+        </p:txBody>
+      </p:sp>
+      <p:sp>
+        <p:nvSpPr>
+          <p:cNvPr id="4" name="Date Placeholder 3">
+            <a:extLst>
+              <a:ext uri="{FF2B5EF4-FFF2-40B4-BE49-F238E27FC236}">
+                <a16:creationId xmlns:a16="http://schemas.microsoft.com/office/drawing/2014/main" id="{4A5A219E-E069-4679-A6CB-E4853834DCEF}"/>
+              </a:ext>
+            </a:extLst>
+          </p:cNvPr>
           <p:cNvSpPr>
             <a:spLocks noGrp="1"/>
           </p:cNvSpPr>
@@ -592,7 +637,7 @@
           <a:p>
             <a:fld id="{96DFF08F-DC6B-4601-B491-B0F83F6DD2DA}" type="datetimeFigureOut">
               <a:rPr lang="en-US" smtClean="0"/>
-              <a:t>5/4/2020</a:t>
+              <a:t>1/27/2021</a:t>
             </a:fld>
             <a:endParaRPr lang="en-US" dirty="0"/>
           </a:p>
@@ -600,7 +645,13 @@
       </p:sp>
       <p:sp>
         <p:nvSpPr>
-          <p:cNvPr id="5" name="Footer Placeholder 4"/>
+          <p:cNvPr id="5" name="Footer Placeholder 4">
+            <a:extLst>
+              <a:ext uri="{FF2B5EF4-FFF2-40B4-BE49-F238E27FC236}">
+                <a16:creationId xmlns:a16="http://schemas.microsoft.com/office/drawing/2014/main" id="{FC2F1107-FA5D-4744-8703-6D4851AF229F}"/>
+              </a:ext>
+            </a:extLst>
+          </p:cNvPr>
           <p:cNvSpPr>
             <a:spLocks noGrp="1"/>
           </p:cNvSpPr>
@@ -619,7 +670,13 @@
       </p:sp>
       <p:sp>
         <p:nvSpPr>
-          <p:cNvPr id="6" name="Slide Number Placeholder 5"/>
+          <p:cNvPr id="6" name="Slide Number Placeholder 5">
+            <a:extLst>
+              <a:ext uri="{FF2B5EF4-FFF2-40B4-BE49-F238E27FC236}">
+                <a16:creationId xmlns:a16="http://schemas.microsoft.com/office/drawing/2014/main" id="{367EB822-E8A9-413D-B093-8402311EC411}"/>
+              </a:ext>
+            </a:extLst>
+          </p:cNvPr>
           <p:cNvSpPr>
             <a:spLocks noGrp="1"/>
           </p:cNvSpPr>
@@ -641,6 +698,11 @@
         </p:txBody>
       </p:sp>
     </p:spTree>
+    <p:extLst>
+      <p:ext uri="{BB962C8B-B14F-4D97-AF65-F5344CB8AC3E}">
+        <p14:creationId xmlns:p14="http://schemas.microsoft.com/office/powerpoint/2010/main" val="2267581852"/>
+      </p:ext>
+    </p:extLst>
   </p:cSld>
   <p:clrMapOvr>
     <a:masterClrMapping/>
@@ -667,7 +729,13 @@
       </p:grpSpPr>
       <p:sp>
         <p:nvSpPr>
-          <p:cNvPr id="2" name="Vertical Title 1"/>
+          <p:cNvPr id="2" name="Vertical Title 1">
+            <a:extLst>
+              <a:ext uri="{FF2B5EF4-FFF2-40B4-BE49-F238E27FC236}">
+                <a16:creationId xmlns:a16="http://schemas.microsoft.com/office/drawing/2014/main" id="{B7E8070A-6931-41E0-9F57-454DB5867EA5}"/>
+              </a:ext>
+            </a:extLst>
+          </p:cNvPr>
           <p:cNvSpPr>
             <a:spLocks noGrp="1"/>
           </p:cNvSpPr>
@@ -689,13 +757,18 @@
               <a:rPr lang="en-US"/>
               <a:t>Click to edit Master title style</a:t>
             </a:r>
-            <a:endParaRPr lang="en-US" dirty="0"/>
-          </a:p>
-        </p:txBody>
-      </p:sp>
-      <p:sp>
-        <p:nvSpPr>
-          <p:cNvPr id="3" name="Vertical Text Placeholder 2"/>
+          </a:p>
+        </p:txBody>
+      </p:sp>
+      <p:sp>
+        <p:nvSpPr>
+          <p:cNvPr id="3" name="Vertical Text Placeholder 2">
+            <a:extLst>
+              <a:ext uri="{FF2B5EF4-FFF2-40B4-BE49-F238E27FC236}">
+                <a16:creationId xmlns:a16="http://schemas.microsoft.com/office/drawing/2014/main" id="{72484185-5652-4952-A53C-F9FD7861843D}"/>
+              </a:ext>
+            </a:extLst>
+          </p:cNvPr>
           <p:cNvSpPr>
             <a:spLocks noGrp="1"/>
           </p:cNvSpPr>
@@ -746,13 +819,18 @@
               <a:rPr lang="en-US"/>
               <a:t>Fifth level</a:t>
             </a:r>
-            <a:endParaRPr lang="en-US" dirty="0"/>
-          </a:p>
-        </p:txBody>
-      </p:sp>
-      <p:sp>
-        <p:nvSpPr>
-          <p:cNvPr id="4" name="Date Placeholder 3"/>
+          </a:p>
+        </p:txBody>
+      </p:sp>
+      <p:sp>
+        <p:nvSpPr>
+          <p:cNvPr id="4" name="Date Placeholder 3">
+            <a:extLst>
+              <a:ext uri="{FF2B5EF4-FFF2-40B4-BE49-F238E27FC236}">
+                <a16:creationId xmlns:a16="http://schemas.microsoft.com/office/drawing/2014/main" id="{DEE6112C-CF21-4803-841B-948964A1E659}"/>
+              </a:ext>
+            </a:extLst>
+          </p:cNvPr>
           <p:cNvSpPr>
             <a:spLocks noGrp="1"/>
           </p:cNvSpPr>
@@ -767,7 +845,7 @@
           <a:p>
             <a:fld id="{96DFF08F-DC6B-4601-B491-B0F83F6DD2DA}" type="datetimeFigureOut">
               <a:rPr lang="en-US" smtClean="0"/>
-              <a:t>5/4/2020</a:t>
+              <a:t>1/27/2021</a:t>
             </a:fld>
             <a:endParaRPr lang="en-US" dirty="0"/>
           </a:p>
@@ -775,7 +853,13 @@
       </p:sp>
       <p:sp>
         <p:nvSpPr>
-          <p:cNvPr id="5" name="Footer Placeholder 4"/>
+          <p:cNvPr id="5" name="Footer Placeholder 4">
+            <a:extLst>
+              <a:ext uri="{FF2B5EF4-FFF2-40B4-BE49-F238E27FC236}">
+                <a16:creationId xmlns:a16="http://schemas.microsoft.com/office/drawing/2014/main" id="{A796BEE6-2287-4606-AF38-B77FBDBF1CD0}"/>
+              </a:ext>
+            </a:extLst>
+          </p:cNvPr>
           <p:cNvSpPr>
             <a:spLocks noGrp="1"/>
           </p:cNvSpPr>
@@ -794,7 +878,13 @@
       </p:sp>
       <p:sp>
         <p:nvSpPr>
-          <p:cNvPr id="6" name="Slide Number Placeholder 5"/>
+          <p:cNvPr id="6" name="Slide Number Placeholder 5">
+            <a:extLst>
+              <a:ext uri="{FF2B5EF4-FFF2-40B4-BE49-F238E27FC236}">
+                <a16:creationId xmlns:a16="http://schemas.microsoft.com/office/drawing/2014/main" id="{87B51DD0-8050-4CBF-8465-D9307DB85104}"/>
+              </a:ext>
+            </a:extLst>
+          </p:cNvPr>
           <p:cNvSpPr>
             <a:spLocks noGrp="1"/>
           </p:cNvSpPr>
@@ -816,6 +906,11 @@
         </p:txBody>
       </p:sp>
     </p:spTree>
+    <p:extLst>
+      <p:ext uri="{BB962C8B-B14F-4D97-AF65-F5344CB8AC3E}">
+        <p14:creationId xmlns:p14="http://schemas.microsoft.com/office/powerpoint/2010/main" val="3092324535"/>
+      </p:ext>
+    </p:extLst>
   </p:cSld>
   <p:clrMapOvr>
     <a:masterClrMapping/>
@@ -842,7 +937,13 @@
       </p:grpSpPr>
       <p:sp>
         <p:nvSpPr>
-          <p:cNvPr id="2" name="Title 1"/>
+          <p:cNvPr id="2" name="Title 1">
+            <a:extLst>
+              <a:ext uri="{FF2B5EF4-FFF2-40B4-BE49-F238E27FC236}">
+                <a16:creationId xmlns:a16="http://schemas.microsoft.com/office/drawing/2014/main" id="{9E50947A-6C9C-4A27-9B46-4266F4EBC9DF}"/>
+              </a:ext>
+            </a:extLst>
+          </p:cNvPr>
           <p:cNvSpPr>
             <a:spLocks noGrp="1"/>
           </p:cNvSpPr>
@@ -859,13 +960,18 @@
               <a:rPr lang="en-US"/>
               <a:t>Click to edit Master title style</a:t>
             </a:r>
-            <a:endParaRPr lang="en-US" dirty="0"/>
-          </a:p>
-        </p:txBody>
-      </p:sp>
-      <p:sp>
-        <p:nvSpPr>
-          <p:cNvPr id="3" name="Content Placeholder 2"/>
+          </a:p>
+        </p:txBody>
+      </p:sp>
+      <p:sp>
+        <p:nvSpPr>
+          <p:cNvPr id="3" name="Content Placeholder 2">
+            <a:extLst>
+              <a:ext uri="{FF2B5EF4-FFF2-40B4-BE49-F238E27FC236}">
+                <a16:creationId xmlns:a16="http://schemas.microsoft.com/office/drawing/2014/main" id="{F7B70040-D79E-4292-9B97-CEFBB2ED4F7F}"/>
+              </a:ext>
+            </a:extLst>
+          </p:cNvPr>
           <p:cNvSpPr>
             <a:spLocks noGrp="1"/>
           </p:cNvSpPr>
@@ -911,13 +1017,18 @@
               <a:rPr lang="en-US"/>
               <a:t>Fifth level</a:t>
             </a:r>
-            <a:endParaRPr lang="en-US" dirty="0"/>
-          </a:p>
-        </p:txBody>
-      </p:sp>
-      <p:sp>
-        <p:nvSpPr>
-          <p:cNvPr id="4" name="Date Placeholder 3"/>
+          </a:p>
+        </p:txBody>
+      </p:sp>
+      <p:sp>
+        <p:nvSpPr>
+          <p:cNvPr id="4" name="Date Placeholder 3">
+            <a:extLst>
+              <a:ext uri="{FF2B5EF4-FFF2-40B4-BE49-F238E27FC236}">
+                <a16:creationId xmlns:a16="http://schemas.microsoft.com/office/drawing/2014/main" id="{33136395-3E21-44EF-B570-A179253AC8E9}"/>
+              </a:ext>
+            </a:extLst>
+          </p:cNvPr>
           <p:cNvSpPr>
             <a:spLocks noGrp="1"/>
           </p:cNvSpPr>
@@ -932,7 +1043,7 @@
           <a:p>
             <a:fld id="{96DFF08F-DC6B-4601-B491-B0F83F6DD2DA}" type="datetimeFigureOut">
               <a:rPr lang="en-US" smtClean="0"/>
-              <a:t>5/4/2020</a:t>
+              <a:t>1/27/2021</a:t>
             </a:fld>
             <a:endParaRPr lang="en-US" dirty="0"/>
           </a:p>
@@ -940,7 +1051,13 @@
       </p:sp>
       <p:sp>
         <p:nvSpPr>
-          <p:cNvPr id="5" name="Footer Placeholder 4"/>
+          <p:cNvPr id="5" name="Footer Placeholder 4">
+            <a:extLst>
+              <a:ext uri="{FF2B5EF4-FFF2-40B4-BE49-F238E27FC236}">
+                <a16:creationId xmlns:a16="http://schemas.microsoft.com/office/drawing/2014/main" id="{1ECF3C68-08EC-4766-9260-9DE25B562D6E}"/>
+              </a:ext>
+            </a:extLst>
+          </p:cNvPr>
           <p:cNvSpPr>
             <a:spLocks noGrp="1"/>
           </p:cNvSpPr>
@@ -959,7 +1076,13 @@
       </p:sp>
       <p:sp>
         <p:nvSpPr>
-          <p:cNvPr id="6" name="Slide Number Placeholder 5"/>
+          <p:cNvPr id="6" name="Slide Number Placeholder 5">
+            <a:extLst>
+              <a:ext uri="{FF2B5EF4-FFF2-40B4-BE49-F238E27FC236}">
+                <a16:creationId xmlns:a16="http://schemas.microsoft.com/office/drawing/2014/main" id="{78132333-6626-49EB-A942-90917B3E3491}"/>
+              </a:ext>
+            </a:extLst>
+          </p:cNvPr>
           <p:cNvSpPr>
             <a:spLocks noGrp="1"/>
           </p:cNvSpPr>
@@ -981,6 +1104,11 @@
         </p:txBody>
       </p:sp>
     </p:spTree>
+    <p:extLst>
+      <p:ext uri="{BB962C8B-B14F-4D97-AF65-F5344CB8AC3E}">
+        <p14:creationId xmlns:p14="http://schemas.microsoft.com/office/powerpoint/2010/main" val="1923256090"/>
+      </p:ext>
+    </p:extLst>
   </p:cSld>
   <p:clrMapOvr>
     <a:masterClrMapping/>
@@ -1007,7 +1135,13 @@
       </p:grpSpPr>
       <p:sp>
         <p:nvSpPr>
-          <p:cNvPr id="2" name="Title 1"/>
+          <p:cNvPr id="2" name="Title 1">
+            <a:extLst>
+              <a:ext uri="{FF2B5EF4-FFF2-40B4-BE49-F238E27FC236}">
+                <a16:creationId xmlns:a16="http://schemas.microsoft.com/office/drawing/2014/main" id="{BADC4383-54F0-45EC-87F9-D5244246E879}"/>
+              </a:ext>
+            </a:extLst>
+          </p:cNvPr>
           <p:cNvSpPr>
             <a:spLocks noGrp="1"/>
           </p:cNvSpPr>
@@ -1033,13 +1167,18 @@
               <a:rPr lang="en-US"/>
               <a:t>Click to edit Master title style</a:t>
             </a:r>
-            <a:endParaRPr lang="en-US" dirty="0"/>
-          </a:p>
-        </p:txBody>
-      </p:sp>
-      <p:sp>
-        <p:nvSpPr>
-          <p:cNvPr id="3" name="Text Placeholder 2"/>
+          </a:p>
+        </p:txBody>
+      </p:sp>
+      <p:sp>
+        <p:nvSpPr>
+          <p:cNvPr id="3" name="Text Placeholder 2">
+            <a:extLst>
+              <a:ext uri="{FF2B5EF4-FFF2-40B4-BE49-F238E27FC236}">
+                <a16:creationId xmlns:a16="http://schemas.microsoft.com/office/drawing/2014/main" id="{9CF29B81-6782-4731-814B-F92C4C4A3380}"/>
+              </a:ext>
+            </a:extLst>
+          </p:cNvPr>
           <p:cNvSpPr>
             <a:spLocks noGrp="1"/>
           </p:cNvSpPr>
@@ -1158,7 +1297,13 @@
       </p:sp>
       <p:sp>
         <p:nvSpPr>
-          <p:cNvPr id="4" name="Date Placeholder 3"/>
+          <p:cNvPr id="4" name="Date Placeholder 3">
+            <a:extLst>
+              <a:ext uri="{FF2B5EF4-FFF2-40B4-BE49-F238E27FC236}">
+                <a16:creationId xmlns:a16="http://schemas.microsoft.com/office/drawing/2014/main" id="{7937919D-2E95-49B4-B5D3-119472E22C2C}"/>
+              </a:ext>
+            </a:extLst>
+          </p:cNvPr>
           <p:cNvSpPr>
             <a:spLocks noGrp="1"/>
           </p:cNvSpPr>
@@ -1173,7 +1318,7 @@
           <a:p>
             <a:fld id="{96DFF08F-DC6B-4601-B491-B0F83F6DD2DA}" type="datetimeFigureOut">
               <a:rPr lang="en-US" smtClean="0"/>
-              <a:t>5/4/2020</a:t>
+              <a:t>1/27/2021</a:t>
             </a:fld>
             <a:endParaRPr lang="en-US" dirty="0"/>
           </a:p>
@@ -1181,7 +1326,13 @@
       </p:sp>
       <p:sp>
         <p:nvSpPr>
-          <p:cNvPr id="5" name="Footer Placeholder 4"/>
+          <p:cNvPr id="5" name="Footer Placeholder 4">
+            <a:extLst>
+              <a:ext uri="{FF2B5EF4-FFF2-40B4-BE49-F238E27FC236}">
+                <a16:creationId xmlns:a16="http://schemas.microsoft.com/office/drawing/2014/main" id="{7956344F-1FCD-402B-9899-082FF2D90973}"/>
+              </a:ext>
+            </a:extLst>
+          </p:cNvPr>
           <p:cNvSpPr>
             <a:spLocks noGrp="1"/>
           </p:cNvSpPr>
@@ -1200,7 +1351,13 @@
       </p:sp>
       <p:sp>
         <p:nvSpPr>
-          <p:cNvPr id="6" name="Slide Number Placeholder 5"/>
+          <p:cNvPr id="6" name="Slide Number Placeholder 5">
+            <a:extLst>
+              <a:ext uri="{FF2B5EF4-FFF2-40B4-BE49-F238E27FC236}">
+                <a16:creationId xmlns:a16="http://schemas.microsoft.com/office/drawing/2014/main" id="{7E22D5FF-36D3-42F4-9AB9-23BB3C51D390}"/>
+              </a:ext>
+            </a:extLst>
+          </p:cNvPr>
           <p:cNvSpPr>
             <a:spLocks noGrp="1"/>
           </p:cNvSpPr>
@@ -1222,6 +1379,11 @@
         </p:txBody>
       </p:sp>
     </p:spTree>
+    <p:extLst>
+      <p:ext uri="{BB962C8B-B14F-4D97-AF65-F5344CB8AC3E}">
+        <p14:creationId xmlns:p14="http://schemas.microsoft.com/office/powerpoint/2010/main" val="1031642054"/>
+      </p:ext>
+    </p:extLst>
   </p:cSld>
   <p:clrMapOvr>
     <a:masterClrMapping/>
@@ -1248,7 +1410,13 @@
       </p:grpSpPr>
       <p:sp>
         <p:nvSpPr>
-          <p:cNvPr id="2" name="Title 1"/>
+          <p:cNvPr id="2" name="Title 1">
+            <a:extLst>
+              <a:ext uri="{FF2B5EF4-FFF2-40B4-BE49-F238E27FC236}">
+                <a16:creationId xmlns:a16="http://schemas.microsoft.com/office/drawing/2014/main" id="{ABD641C7-C641-4AD4-B890-76764F9F1DC1}"/>
+              </a:ext>
+            </a:extLst>
+          </p:cNvPr>
           <p:cNvSpPr>
             <a:spLocks noGrp="1"/>
           </p:cNvSpPr>
@@ -1265,13 +1433,18 @@
               <a:rPr lang="en-US"/>
               <a:t>Click to edit Master title style</a:t>
             </a:r>
-            <a:endParaRPr lang="en-US" dirty="0"/>
-          </a:p>
-        </p:txBody>
-      </p:sp>
-      <p:sp>
-        <p:nvSpPr>
-          <p:cNvPr id="3" name="Content Placeholder 2"/>
+          </a:p>
+        </p:txBody>
+      </p:sp>
+      <p:sp>
+        <p:nvSpPr>
+          <p:cNvPr id="3" name="Content Placeholder 2">
+            <a:extLst>
+              <a:ext uri="{FF2B5EF4-FFF2-40B4-BE49-F238E27FC236}">
+                <a16:creationId xmlns:a16="http://schemas.microsoft.com/office/drawing/2014/main" id="{3F847488-549E-403B-B4F7-95859F8B049A}"/>
+              </a:ext>
+            </a:extLst>
+          </p:cNvPr>
           <p:cNvSpPr>
             <a:spLocks noGrp="1"/>
           </p:cNvSpPr>
@@ -1322,13 +1495,18 @@
               <a:rPr lang="en-US"/>
               <a:t>Fifth level</a:t>
             </a:r>
-            <a:endParaRPr lang="en-US" dirty="0"/>
-          </a:p>
-        </p:txBody>
-      </p:sp>
-      <p:sp>
-        <p:nvSpPr>
-          <p:cNvPr id="4" name="Content Placeholder 3"/>
+          </a:p>
+        </p:txBody>
+      </p:sp>
+      <p:sp>
+        <p:nvSpPr>
+          <p:cNvPr id="4" name="Content Placeholder 3">
+            <a:extLst>
+              <a:ext uri="{FF2B5EF4-FFF2-40B4-BE49-F238E27FC236}">
+                <a16:creationId xmlns:a16="http://schemas.microsoft.com/office/drawing/2014/main" id="{0C8C2985-132E-40E6-837C-0ECE0BDC7D3B}"/>
+              </a:ext>
+            </a:extLst>
+          </p:cNvPr>
           <p:cNvSpPr>
             <a:spLocks noGrp="1"/>
           </p:cNvSpPr>
@@ -1379,13 +1557,18 @@
               <a:rPr lang="en-US"/>
               <a:t>Fifth level</a:t>
             </a:r>
-            <a:endParaRPr lang="en-US" dirty="0"/>
-          </a:p>
-        </p:txBody>
-      </p:sp>
-      <p:sp>
-        <p:nvSpPr>
-          <p:cNvPr id="5" name="Date Placeholder 4"/>
+          </a:p>
+        </p:txBody>
+      </p:sp>
+      <p:sp>
+        <p:nvSpPr>
+          <p:cNvPr id="5" name="Date Placeholder 4">
+            <a:extLst>
+              <a:ext uri="{FF2B5EF4-FFF2-40B4-BE49-F238E27FC236}">
+                <a16:creationId xmlns:a16="http://schemas.microsoft.com/office/drawing/2014/main" id="{32DD35B6-58EF-4DE9-A841-85B9FF0EC7D0}"/>
+              </a:ext>
+            </a:extLst>
+          </p:cNvPr>
           <p:cNvSpPr>
             <a:spLocks noGrp="1"/>
           </p:cNvSpPr>
@@ -1400,7 +1583,7 @@
           <a:p>
             <a:fld id="{96DFF08F-DC6B-4601-B491-B0F83F6DD2DA}" type="datetimeFigureOut">
               <a:rPr lang="en-US" smtClean="0"/>
-              <a:t>5/4/2020</a:t>
+              <a:t>1/27/2021</a:t>
             </a:fld>
             <a:endParaRPr lang="en-US" dirty="0"/>
           </a:p>
@@ -1408,7 +1591,13 @@
       </p:sp>
       <p:sp>
         <p:nvSpPr>
-          <p:cNvPr id="6" name="Footer Placeholder 5"/>
+          <p:cNvPr id="6" name="Footer Placeholder 5">
+            <a:extLst>
+              <a:ext uri="{FF2B5EF4-FFF2-40B4-BE49-F238E27FC236}">
+                <a16:creationId xmlns:a16="http://schemas.microsoft.com/office/drawing/2014/main" id="{3CE1B995-1BA5-400D-AB83-0EAEF42E74C3}"/>
+              </a:ext>
+            </a:extLst>
+          </p:cNvPr>
           <p:cNvSpPr>
             <a:spLocks noGrp="1"/>
           </p:cNvSpPr>
@@ -1427,7 +1616,13 @@
       </p:sp>
       <p:sp>
         <p:nvSpPr>
-          <p:cNvPr id="7" name="Slide Number Placeholder 6"/>
+          <p:cNvPr id="7" name="Slide Number Placeholder 6">
+            <a:extLst>
+              <a:ext uri="{FF2B5EF4-FFF2-40B4-BE49-F238E27FC236}">
+                <a16:creationId xmlns:a16="http://schemas.microsoft.com/office/drawing/2014/main" id="{8EB78DF6-50B2-4138-96C9-7E63CBF38FC9}"/>
+              </a:ext>
+            </a:extLst>
+          </p:cNvPr>
           <p:cNvSpPr>
             <a:spLocks noGrp="1"/>
           </p:cNvSpPr>
@@ -1449,6 +1644,11 @@
         </p:txBody>
       </p:sp>
     </p:spTree>
+    <p:extLst>
+      <p:ext uri="{BB962C8B-B14F-4D97-AF65-F5344CB8AC3E}">
+        <p14:creationId xmlns:p14="http://schemas.microsoft.com/office/powerpoint/2010/main" val="868040425"/>
+      </p:ext>
+    </p:extLst>
   </p:cSld>
   <p:clrMapOvr>
     <a:masterClrMapping/>
@@ -1475,7 +1675,13 @@
       </p:grpSpPr>
       <p:sp>
         <p:nvSpPr>
-          <p:cNvPr id="2" name="Title 1"/>
+          <p:cNvPr id="2" name="Title 1">
+            <a:extLst>
+              <a:ext uri="{FF2B5EF4-FFF2-40B4-BE49-F238E27FC236}">
+                <a16:creationId xmlns:a16="http://schemas.microsoft.com/office/drawing/2014/main" id="{1E35A0E1-7658-46B1-8868-37E9A01E818E}"/>
+              </a:ext>
+            </a:extLst>
+          </p:cNvPr>
           <p:cNvSpPr>
             <a:spLocks noGrp="1"/>
           </p:cNvSpPr>
@@ -1497,13 +1703,18 @@
               <a:rPr lang="en-US"/>
               <a:t>Click to edit Master title style</a:t>
             </a:r>
-            <a:endParaRPr lang="en-US" dirty="0"/>
-          </a:p>
-        </p:txBody>
-      </p:sp>
-      <p:sp>
-        <p:nvSpPr>
-          <p:cNvPr id="3" name="Text Placeholder 2"/>
+          </a:p>
+        </p:txBody>
+      </p:sp>
+      <p:sp>
+        <p:nvSpPr>
+          <p:cNvPr id="3" name="Text Placeholder 2">
+            <a:extLst>
+              <a:ext uri="{FF2B5EF4-FFF2-40B4-BE49-F238E27FC236}">
+                <a16:creationId xmlns:a16="http://schemas.microsoft.com/office/drawing/2014/main" id="{4ECA3F4A-73A5-4227-895B-3739700BB5D4}"/>
+              </a:ext>
+            </a:extLst>
+          </p:cNvPr>
           <p:cNvSpPr>
             <a:spLocks noGrp="1"/>
           </p:cNvSpPr>
@@ -1568,7 +1779,13 @@
       </p:sp>
       <p:sp>
         <p:nvSpPr>
-          <p:cNvPr id="4" name="Content Placeholder 3"/>
+          <p:cNvPr id="4" name="Content Placeholder 3">
+            <a:extLst>
+              <a:ext uri="{FF2B5EF4-FFF2-40B4-BE49-F238E27FC236}">
+                <a16:creationId xmlns:a16="http://schemas.microsoft.com/office/drawing/2014/main" id="{84253725-BD0E-4FB8-B5A7-46DA75445862}"/>
+              </a:ext>
+            </a:extLst>
+          </p:cNvPr>
           <p:cNvSpPr>
             <a:spLocks noGrp="1"/>
           </p:cNvSpPr>
@@ -1619,13 +1836,18 @@
               <a:rPr lang="en-US"/>
               <a:t>Fifth level</a:t>
             </a:r>
-            <a:endParaRPr lang="en-US" dirty="0"/>
-          </a:p>
-        </p:txBody>
-      </p:sp>
-      <p:sp>
-        <p:nvSpPr>
-          <p:cNvPr id="5" name="Text Placeholder 4"/>
+          </a:p>
+        </p:txBody>
+      </p:sp>
+      <p:sp>
+        <p:nvSpPr>
+          <p:cNvPr id="5" name="Text Placeholder 4">
+            <a:extLst>
+              <a:ext uri="{FF2B5EF4-FFF2-40B4-BE49-F238E27FC236}">
+                <a16:creationId xmlns:a16="http://schemas.microsoft.com/office/drawing/2014/main" id="{A0E4ED2E-1E06-4454-9046-4B9E47072A97}"/>
+              </a:ext>
+            </a:extLst>
+          </p:cNvPr>
           <p:cNvSpPr>
             <a:spLocks noGrp="1"/>
           </p:cNvSpPr>
@@ -1690,7 +1912,13 @@
       </p:sp>
       <p:sp>
         <p:nvSpPr>
-          <p:cNvPr id="6" name="Content Placeholder 5"/>
+          <p:cNvPr id="6" name="Content Placeholder 5">
+            <a:extLst>
+              <a:ext uri="{FF2B5EF4-FFF2-40B4-BE49-F238E27FC236}">
+                <a16:creationId xmlns:a16="http://schemas.microsoft.com/office/drawing/2014/main" id="{50162046-233E-42BD-B884-0601A56D93FB}"/>
+              </a:ext>
+            </a:extLst>
+          </p:cNvPr>
           <p:cNvSpPr>
             <a:spLocks noGrp="1"/>
           </p:cNvSpPr>
@@ -1741,13 +1969,18 @@
               <a:rPr lang="en-US"/>
               <a:t>Fifth level</a:t>
             </a:r>
-            <a:endParaRPr lang="en-US" dirty="0"/>
-          </a:p>
-        </p:txBody>
-      </p:sp>
-      <p:sp>
-        <p:nvSpPr>
-          <p:cNvPr id="7" name="Date Placeholder 6"/>
+          </a:p>
+        </p:txBody>
+      </p:sp>
+      <p:sp>
+        <p:nvSpPr>
+          <p:cNvPr id="7" name="Date Placeholder 6">
+            <a:extLst>
+              <a:ext uri="{FF2B5EF4-FFF2-40B4-BE49-F238E27FC236}">
+                <a16:creationId xmlns:a16="http://schemas.microsoft.com/office/drawing/2014/main" id="{FAA1DB16-157E-4F04-A350-5D1E14F059ED}"/>
+              </a:ext>
+            </a:extLst>
+          </p:cNvPr>
           <p:cNvSpPr>
             <a:spLocks noGrp="1"/>
           </p:cNvSpPr>
@@ -1762,7 +1995,7 @@
           <a:p>
             <a:fld id="{96DFF08F-DC6B-4601-B491-B0F83F6DD2DA}" type="datetimeFigureOut">
               <a:rPr lang="en-US" smtClean="0"/>
-              <a:t>5/4/2020</a:t>
+              <a:t>1/27/2021</a:t>
             </a:fld>
             <a:endParaRPr lang="en-US" dirty="0"/>
           </a:p>
@@ -1770,7 +2003,13 @@
       </p:sp>
       <p:sp>
         <p:nvSpPr>
-          <p:cNvPr id="8" name="Footer Placeholder 7"/>
+          <p:cNvPr id="8" name="Footer Placeholder 7">
+            <a:extLst>
+              <a:ext uri="{FF2B5EF4-FFF2-40B4-BE49-F238E27FC236}">
+                <a16:creationId xmlns:a16="http://schemas.microsoft.com/office/drawing/2014/main" id="{98C7A461-7DEE-4BFF-A2B6-7A50BC29A4F4}"/>
+              </a:ext>
+            </a:extLst>
+          </p:cNvPr>
           <p:cNvSpPr>
             <a:spLocks noGrp="1"/>
           </p:cNvSpPr>
@@ -1789,7 +2028,13 @@
       </p:sp>
       <p:sp>
         <p:nvSpPr>
-          <p:cNvPr id="9" name="Slide Number Placeholder 8"/>
+          <p:cNvPr id="9" name="Slide Number Placeholder 8">
+            <a:extLst>
+              <a:ext uri="{FF2B5EF4-FFF2-40B4-BE49-F238E27FC236}">
+                <a16:creationId xmlns:a16="http://schemas.microsoft.com/office/drawing/2014/main" id="{614F1C72-65EE-479F-8741-15BCDC10CDA2}"/>
+              </a:ext>
+            </a:extLst>
+          </p:cNvPr>
           <p:cNvSpPr>
             <a:spLocks noGrp="1"/>
           </p:cNvSpPr>
@@ -1811,6 +2056,11 @@
         </p:txBody>
       </p:sp>
     </p:spTree>
+    <p:extLst>
+      <p:ext uri="{BB962C8B-B14F-4D97-AF65-F5344CB8AC3E}">
+        <p14:creationId xmlns:p14="http://schemas.microsoft.com/office/powerpoint/2010/main" val="1074625666"/>
+      </p:ext>
+    </p:extLst>
   </p:cSld>
   <p:clrMapOvr>
     <a:masterClrMapping/>
@@ -1837,7 +2087,13 @@
       </p:grpSpPr>
       <p:sp>
         <p:nvSpPr>
-          <p:cNvPr id="2" name="Title 1"/>
+          <p:cNvPr id="2" name="Title 1">
+            <a:extLst>
+              <a:ext uri="{FF2B5EF4-FFF2-40B4-BE49-F238E27FC236}">
+                <a16:creationId xmlns:a16="http://schemas.microsoft.com/office/drawing/2014/main" id="{23B20475-A5BD-45C0-8750-8F70E3284AA5}"/>
+              </a:ext>
+            </a:extLst>
+          </p:cNvPr>
           <p:cNvSpPr>
             <a:spLocks noGrp="1"/>
           </p:cNvSpPr>
@@ -1854,13 +2110,18 @@
               <a:rPr lang="en-US"/>
               <a:t>Click to edit Master title style</a:t>
             </a:r>
-            <a:endParaRPr lang="en-US" dirty="0"/>
-          </a:p>
-        </p:txBody>
-      </p:sp>
-      <p:sp>
-        <p:nvSpPr>
-          <p:cNvPr id="3" name="Date Placeholder 2"/>
+          </a:p>
+        </p:txBody>
+      </p:sp>
+      <p:sp>
+        <p:nvSpPr>
+          <p:cNvPr id="3" name="Date Placeholder 2">
+            <a:extLst>
+              <a:ext uri="{FF2B5EF4-FFF2-40B4-BE49-F238E27FC236}">
+                <a16:creationId xmlns:a16="http://schemas.microsoft.com/office/drawing/2014/main" id="{CE5C17F2-0383-4D47-90E7-E61FFAB7FD1B}"/>
+              </a:ext>
+            </a:extLst>
+          </p:cNvPr>
           <p:cNvSpPr>
             <a:spLocks noGrp="1"/>
           </p:cNvSpPr>
@@ -1875,7 +2136,7 @@
           <a:p>
             <a:fld id="{96DFF08F-DC6B-4601-B491-B0F83F6DD2DA}" type="datetimeFigureOut">
               <a:rPr lang="en-US" smtClean="0"/>
-              <a:t>5/4/2020</a:t>
+              <a:t>1/27/2021</a:t>
             </a:fld>
             <a:endParaRPr lang="en-US" dirty="0"/>
           </a:p>
@@ -1883,7 +2144,13 @@
       </p:sp>
       <p:sp>
         <p:nvSpPr>
-          <p:cNvPr id="4" name="Footer Placeholder 3"/>
+          <p:cNvPr id="4" name="Footer Placeholder 3">
+            <a:extLst>
+              <a:ext uri="{FF2B5EF4-FFF2-40B4-BE49-F238E27FC236}">
+                <a16:creationId xmlns:a16="http://schemas.microsoft.com/office/drawing/2014/main" id="{38A103F5-3053-48E9-AEAE-6571EE5482B8}"/>
+              </a:ext>
+            </a:extLst>
+          </p:cNvPr>
           <p:cNvSpPr>
             <a:spLocks noGrp="1"/>
           </p:cNvSpPr>
@@ -1902,7 +2169,13 @@
       </p:sp>
       <p:sp>
         <p:nvSpPr>
-          <p:cNvPr id="5" name="Slide Number Placeholder 4"/>
+          <p:cNvPr id="5" name="Slide Number Placeholder 4">
+            <a:extLst>
+              <a:ext uri="{FF2B5EF4-FFF2-40B4-BE49-F238E27FC236}">
+                <a16:creationId xmlns:a16="http://schemas.microsoft.com/office/drawing/2014/main" id="{7B44441D-E6ED-4940-B6EB-D0D54BE3E0B7}"/>
+              </a:ext>
+            </a:extLst>
+          </p:cNvPr>
           <p:cNvSpPr>
             <a:spLocks noGrp="1"/>
           </p:cNvSpPr>
@@ -1924,6 +2197,11 @@
         </p:txBody>
       </p:sp>
     </p:spTree>
+    <p:extLst>
+      <p:ext uri="{BB962C8B-B14F-4D97-AF65-F5344CB8AC3E}">
+        <p14:creationId xmlns:p14="http://schemas.microsoft.com/office/powerpoint/2010/main" val="1432580800"/>
+      </p:ext>
+    </p:extLst>
   </p:cSld>
   <p:clrMapOvr>
     <a:masterClrMapping/>
@@ -1950,7 +2228,13 @@
       </p:grpSpPr>
       <p:sp>
         <p:nvSpPr>
-          <p:cNvPr id="2" name="Date Placeholder 1"/>
+          <p:cNvPr id="2" name="Date Placeholder 1">
+            <a:extLst>
+              <a:ext uri="{FF2B5EF4-FFF2-40B4-BE49-F238E27FC236}">
+                <a16:creationId xmlns:a16="http://schemas.microsoft.com/office/drawing/2014/main" id="{CCFD1343-F875-4F70-9BEF-D28D5CD292BC}"/>
+              </a:ext>
+            </a:extLst>
+          </p:cNvPr>
           <p:cNvSpPr>
             <a:spLocks noGrp="1"/>
           </p:cNvSpPr>
@@ -1965,7 +2249,7 @@
           <a:p>
             <a:fld id="{96DFF08F-DC6B-4601-B491-B0F83F6DD2DA}" type="datetimeFigureOut">
               <a:rPr lang="en-US" smtClean="0"/>
-              <a:t>5/4/2020</a:t>
+              <a:t>1/27/2021</a:t>
             </a:fld>
             <a:endParaRPr lang="en-US" dirty="0"/>
           </a:p>
@@ -1973,7 +2257,13 @@
       </p:sp>
       <p:sp>
         <p:nvSpPr>
-          <p:cNvPr id="3" name="Footer Placeholder 2"/>
+          <p:cNvPr id="3" name="Footer Placeholder 2">
+            <a:extLst>
+              <a:ext uri="{FF2B5EF4-FFF2-40B4-BE49-F238E27FC236}">
+                <a16:creationId xmlns:a16="http://schemas.microsoft.com/office/drawing/2014/main" id="{69C6592F-CB01-44A6-97B4-75E7BF6612BD}"/>
+              </a:ext>
+            </a:extLst>
+          </p:cNvPr>
           <p:cNvSpPr>
             <a:spLocks noGrp="1"/>
           </p:cNvSpPr>
@@ -1992,7 +2282,13 @@
       </p:sp>
       <p:sp>
         <p:nvSpPr>
-          <p:cNvPr id="4" name="Slide Number Placeholder 3"/>
+          <p:cNvPr id="4" name="Slide Number Placeholder 3">
+            <a:extLst>
+              <a:ext uri="{FF2B5EF4-FFF2-40B4-BE49-F238E27FC236}">
+                <a16:creationId xmlns:a16="http://schemas.microsoft.com/office/drawing/2014/main" id="{6361F119-D330-4601-AE50-C5F41DA69271}"/>
+              </a:ext>
+            </a:extLst>
+          </p:cNvPr>
           <p:cNvSpPr>
             <a:spLocks noGrp="1"/>
           </p:cNvSpPr>
@@ -2014,6 +2310,11 @@
         </p:txBody>
       </p:sp>
     </p:spTree>
+    <p:extLst>
+      <p:ext uri="{BB962C8B-B14F-4D97-AF65-F5344CB8AC3E}">
+        <p14:creationId xmlns:p14="http://schemas.microsoft.com/office/powerpoint/2010/main" val="1574536163"/>
+      </p:ext>
+    </p:extLst>
   </p:cSld>
   <p:clrMapOvr>
     <a:masterClrMapping/>
@@ -2040,7 +2341,13 @@
       </p:grpSpPr>
       <p:sp>
         <p:nvSpPr>
-          <p:cNvPr id="2" name="Title 1"/>
+          <p:cNvPr id="2" name="Title 1">
+            <a:extLst>
+              <a:ext uri="{FF2B5EF4-FFF2-40B4-BE49-F238E27FC236}">
+                <a16:creationId xmlns:a16="http://schemas.microsoft.com/office/drawing/2014/main" id="{643C19C3-1FD6-47EA-9CC8-4B887C35580D}"/>
+              </a:ext>
+            </a:extLst>
+          </p:cNvPr>
           <p:cNvSpPr>
             <a:spLocks noGrp="1"/>
           </p:cNvSpPr>
@@ -2066,13 +2373,18 @@
               <a:rPr lang="en-US"/>
               <a:t>Click to edit Master title style</a:t>
             </a:r>
-            <a:endParaRPr lang="en-US" dirty="0"/>
-          </a:p>
-        </p:txBody>
-      </p:sp>
-      <p:sp>
-        <p:nvSpPr>
-          <p:cNvPr id="3" name="Content Placeholder 2"/>
+          </a:p>
+        </p:txBody>
+      </p:sp>
+      <p:sp>
+        <p:nvSpPr>
+          <p:cNvPr id="3" name="Content Placeholder 2">
+            <a:extLst>
+              <a:ext uri="{FF2B5EF4-FFF2-40B4-BE49-F238E27FC236}">
+                <a16:creationId xmlns:a16="http://schemas.microsoft.com/office/drawing/2014/main" id="{F28FCA8B-5E15-49E3-9C1E-A4567338AB2E}"/>
+              </a:ext>
+            </a:extLst>
+          </p:cNvPr>
           <p:cNvSpPr>
             <a:spLocks noGrp="1"/>
           </p:cNvSpPr>
@@ -2151,13 +2463,18 @@
               <a:rPr lang="en-US"/>
               <a:t>Fifth level</a:t>
             </a:r>
-            <a:endParaRPr lang="en-US" dirty="0"/>
-          </a:p>
-        </p:txBody>
-      </p:sp>
-      <p:sp>
-        <p:nvSpPr>
-          <p:cNvPr id="4" name="Text Placeholder 3"/>
+          </a:p>
+        </p:txBody>
+      </p:sp>
+      <p:sp>
+        <p:nvSpPr>
+          <p:cNvPr id="4" name="Text Placeholder 3">
+            <a:extLst>
+              <a:ext uri="{FF2B5EF4-FFF2-40B4-BE49-F238E27FC236}">
+                <a16:creationId xmlns:a16="http://schemas.microsoft.com/office/drawing/2014/main" id="{E8E22C50-736F-4199-9732-EB7841F95F6E}"/>
+              </a:ext>
+            </a:extLst>
+          </p:cNvPr>
           <p:cNvSpPr>
             <a:spLocks noGrp="1"/>
           </p:cNvSpPr>
@@ -2222,7 +2539,13 @@
       </p:sp>
       <p:sp>
         <p:nvSpPr>
-          <p:cNvPr id="5" name="Date Placeholder 4"/>
+          <p:cNvPr id="5" name="Date Placeholder 4">
+            <a:extLst>
+              <a:ext uri="{FF2B5EF4-FFF2-40B4-BE49-F238E27FC236}">
+                <a16:creationId xmlns:a16="http://schemas.microsoft.com/office/drawing/2014/main" id="{435693CB-524E-46DC-834E-FBAA59703677}"/>
+              </a:ext>
+            </a:extLst>
+          </p:cNvPr>
           <p:cNvSpPr>
             <a:spLocks noGrp="1"/>
           </p:cNvSpPr>
@@ -2237,7 +2560,7 @@
           <a:p>
             <a:fld id="{96DFF08F-DC6B-4601-B491-B0F83F6DD2DA}" type="datetimeFigureOut">
               <a:rPr lang="en-US" smtClean="0"/>
-              <a:t>5/4/2020</a:t>
+              <a:t>1/27/2021</a:t>
             </a:fld>
             <a:endParaRPr lang="en-US" dirty="0"/>
           </a:p>
@@ -2245,7 +2568,13 @@
       </p:sp>
       <p:sp>
         <p:nvSpPr>
-          <p:cNvPr id="6" name="Footer Placeholder 5"/>
+          <p:cNvPr id="6" name="Footer Placeholder 5">
+            <a:extLst>
+              <a:ext uri="{FF2B5EF4-FFF2-40B4-BE49-F238E27FC236}">
+                <a16:creationId xmlns:a16="http://schemas.microsoft.com/office/drawing/2014/main" id="{742132FE-E16B-4A85-AEA5-6948072556AC}"/>
+              </a:ext>
+            </a:extLst>
+          </p:cNvPr>
           <p:cNvSpPr>
             <a:spLocks noGrp="1"/>
           </p:cNvSpPr>
@@ -2264,7 +2593,13 @@
       </p:sp>
       <p:sp>
         <p:nvSpPr>
-          <p:cNvPr id="7" name="Slide Number Placeholder 6"/>
+          <p:cNvPr id="7" name="Slide Number Placeholder 6">
+            <a:extLst>
+              <a:ext uri="{FF2B5EF4-FFF2-40B4-BE49-F238E27FC236}">
+                <a16:creationId xmlns:a16="http://schemas.microsoft.com/office/drawing/2014/main" id="{CC5E98B3-47A8-42ED-AA94-7D8FFB0CD273}"/>
+              </a:ext>
+            </a:extLst>
+          </p:cNvPr>
           <p:cNvSpPr>
             <a:spLocks noGrp="1"/>
           </p:cNvSpPr>
@@ -2286,6 +2621,11 @@
         </p:txBody>
       </p:sp>
     </p:spTree>
+    <p:extLst>
+      <p:ext uri="{BB962C8B-B14F-4D97-AF65-F5344CB8AC3E}">
+        <p14:creationId xmlns:p14="http://schemas.microsoft.com/office/powerpoint/2010/main" val="1441584974"/>
+      </p:ext>
+    </p:extLst>
   </p:cSld>
   <p:clrMapOvr>
     <a:masterClrMapping/>
@@ -2312,7 +2652,13 @@
       </p:grpSpPr>
       <p:sp>
         <p:nvSpPr>
-          <p:cNvPr id="2" name="Title 1"/>
+          <p:cNvPr id="2" name="Title 1">
+            <a:extLst>
+              <a:ext uri="{FF2B5EF4-FFF2-40B4-BE49-F238E27FC236}">
+                <a16:creationId xmlns:a16="http://schemas.microsoft.com/office/drawing/2014/main" id="{68C388C4-EE13-455D-8FF1-BD7119232DA6}"/>
+              </a:ext>
+            </a:extLst>
+          </p:cNvPr>
           <p:cNvSpPr>
             <a:spLocks noGrp="1"/>
           </p:cNvSpPr>
@@ -2338,15 +2684,20 @@
               <a:rPr lang="en-US"/>
               <a:t>Click to edit Master title style</a:t>
             </a:r>
-            <a:endParaRPr lang="en-US" dirty="0"/>
-          </a:p>
-        </p:txBody>
-      </p:sp>
-      <p:sp>
-        <p:nvSpPr>
-          <p:cNvPr id="3" name="Picture Placeholder 2"/>
-          <p:cNvSpPr>
-            <a:spLocks noGrp="1" noChangeAspect="1"/>
+          </a:p>
+        </p:txBody>
+      </p:sp>
+      <p:sp>
+        <p:nvSpPr>
+          <p:cNvPr id="3" name="Picture Placeholder 2">
+            <a:extLst>
+              <a:ext uri="{FF2B5EF4-FFF2-40B4-BE49-F238E27FC236}">
+                <a16:creationId xmlns:a16="http://schemas.microsoft.com/office/drawing/2014/main" id="{50E63A73-C672-45D4-AEC2-5D72426A10BF}"/>
+              </a:ext>
+            </a:extLst>
+          </p:cNvPr>
+          <p:cNvSpPr>
+            <a:spLocks noGrp="1"/>
           </p:cNvSpPr>
           <p:nvPr>
             <p:ph type="pic" idx="1"/>
@@ -2359,7 +2710,7 @@
           </a:xfrm>
         </p:spPr>
         <p:txBody>
-          <a:bodyPr anchor="t"/>
+          <a:bodyPr/>
           <a:lstStyle>
             <a:lvl1pPr marL="0" indent="0">
               <a:buNone/>
@@ -2399,17 +2750,19 @@
             </a:lvl9pPr>
           </a:lstStyle>
           <a:p>
-            <a:r>
-              <a:rPr lang="en-US"/>
-              <a:t>Drag picture to placeholder or click icon to add</a:t>
-            </a:r>
-            <a:endParaRPr lang="en-US" dirty="0"/>
-          </a:p>
-        </p:txBody>
-      </p:sp>
-      <p:sp>
-        <p:nvSpPr>
-          <p:cNvPr id="4" name="Text Placeholder 3"/>
+            <a:endParaRPr lang="en-US"/>
+          </a:p>
+        </p:txBody>
+      </p:sp>
+      <p:sp>
+        <p:nvSpPr>
+          <p:cNvPr id="4" name="Text Placeholder 3">
+            <a:extLst>
+              <a:ext uri="{FF2B5EF4-FFF2-40B4-BE49-F238E27FC236}">
+                <a16:creationId xmlns:a16="http://schemas.microsoft.com/office/drawing/2014/main" id="{74B204EE-571F-4BD1-B9BD-A09121C56ED5}"/>
+              </a:ext>
+            </a:extLst>
+          </p:cNvPr>
           <p:cNvSpPr>
             <a:spLocks noGrp="1"/>
           </p:cNvSpPr>
@@ -2474,7 +2827,13 @@
       </p:sp>
       <p:sp>
         <p:nvSpPr>
-          <p:cNvPr id="5" name="Date Placeholder 4"/>
+          <p:cNvPr id="5" name="Date Placeholder 4">
+            <a:extLst>
+              <a:ext uri="{FF2B5EF4-FFF2-40B4-BE49-F238E27FC236}">
+                <a16:creationId xmlns:a16="http://schemas.microsoft.com/office/drawing/2014/main" id="{FF934108-210A-4438-BB29-06413E78EC53}"/>
+              </a:ext>
+            </a:extLst>
+          </p:cNvPr>
           <p:cNvSpPr>
             <a:spLocks noGrp="1"/>
           </p:cNvSpPr>
@@ -2487,9 +2846,10 @@
           <a:bodyPr/>
           <a:lstStyle/>
           <a:p>
-            <a:fld id="{C7616CA0-919D-4A49-9C8A-62FDFB3A5183}" type="datetimeFigureOut">
+            <a:fld id="{96DFF08F-DC6B-4601-B491-B0F83F6DD2DA}" type="datetimeFigureOut">
               <a:rPr lang="en-US" smtClean="0"/>
-              <a:t>5/4/2020</a:t>
+              <a:pPr/>
+              <a:t>1/27/2021</a:t>
             </a:fld>
             <a:endParaRPr lang="en-US" dirty="0"/>
           </a:p>
@@ -2497,7 +2857,13 @@
       </p:sp>
       <p:sp>
         <p:nvSpPr>
-          <p:cNvPr id="6" name="Footer Placeholder 5"/>
+          <p:cNvPr id="6" name="Footer Placeholder 5">
+            <a:extLst>
+              <a:ext uri="{FF2B5EF4-FFF2-40B4-BE49-F238E27FC236}">
+                <a16:creationId xmlns:a16="http://schemas.microsoft.com/office/drawing/2014/main" id="{85BB35A3-7CEF-4A1F-8ECF-25A8F9342159}"/>
+              </a:ext>
+            </a:extLst>
+          </p:cNvPr>
           <p:cNvSpPr>
             <a:spLocks noGrp="1"/>
           </p:cNvSpPr>
@@ -2510,13 +2876,19 @@
           <a:bodyPr/>
           <a:lstStyle/>
           <a:p>
-            <a:endParaRPr lang="en-US" dirty="0"/>
-          </a:p>
-        </p:txBody>
-      </p:sp>
-      <p:sp>
-        <p:nvSpPr>
-          <p:cNvPr id="7" name="Slide Number Placeholder 6"/>
+            <a:endParaRPr lang="en-US"/>
+          </a:p>
+        </p:txBody>
+      </p:sp>
+      <p:sp>
+        <p:nvSpPr>
+          <p:cNvPr id="7" name="Slide Number Placeholder 6">
+            <a:extLst>
+              <a:ext uri="{FF2B5EF4-FFF2-40B4-BE49-F238E27FC236}">
+                <a16:creationId xmlns:a16="http://schemas.microsoft.com/office/drawing/2014/main" id="{BDBE81A3-AA0F-49DF-9C7C-A66B885BB833}"/>
+              </a:ext>
+            </a:extLst>
+          </p:cNvPr>
           <p:cNvSpPr>
             <a:spLocks noGrp="1"/>
           </p:cNvSpPr>
@@ -2529,8 +2901,9 @@
           <a:bodyPr/>
           <a:lstStyle/>
           <a:p>
-            <a:fld id="{867E5644-1E61-4311-A31E-84CB9C7AA8A9}" type="slidenum">
+            <a:fld id="{4FAB73BC-B049-4115-A692-8D63A059BFB8}" type="slidenum">
               <a:rPr lang="en-US" smtClean="0"/>
+              <a:pPr/>
               <a:t>‹#›</a:t>
             </a:fld>
             <a:endParaRPr lang="en-US" dirty="0"/>
@@ -2538,6 +2911,11 @@
         </p:txBody>
       </p:sp>
     </p:spTree>
+    <p:extLst>
+      <p:ext uri="{BB962C8B-B14F-4D97-AF65-F5344CB8AC3E}">
+        <p14:creationId xmlns:p14="http://schemas.microsoft.com/office/powerpoint/2010/main" val="2317264383"/>
+      </p:ext>
+    </p:extLst>
   </p:cSld>
   <p:clrMapOvr>
     <a:masterClrMapping/>
@@ -2569,7 +2947,13 @@
       </p:grpSpPr>
       <p:sp>
         <p:nvSpPr>
-          <p:cNvPr id="2" name="Title Placeholder 1"/>
+          <p:cNvPr id="2" name="Title Placeholder 1">
+            <a:extLst>
+              <a:ext uri="{FF2B5EF4-FFF2-40B4-BE49-F238E27FC236}">
+                <a16:creationId xmlns:a16="http://schemas.microsoft.com/office/drawing/2014/main" id="{5656EC89-4826-4B13-92BB-6F7ACB518B23}"/>
+              </a:ext>
+            </a:extLst>
+          </p:cNvPr>
           <p:cNvSpPr>
             <a:spLocks noGrp="1"/>
           </p:cNvSpPr>
@@ -2596,13 +2980,18 @@
               <a:rPr lang="en-US"/>
               <a:t>Click to edit Master title style</a:t>
             </a:r>
-            <a:endParaRPr lang="en-US" dirty="0"/>
-          </a:p>
-        </p:txBody>
-      </p:sp>
-      <p:sp>
-        <p:nvSpPr>
-          <p:cNvPr id="3" name="Text Placeholder 2"/>
+          </a:p>
+        </p:txBody>
+      </p:sp>
+      <p:sp>
+        <p:nvSpPr>
+          <p:cNvPr id="3" name="Text Placeholder 2">
+            <a:extLst>
+              <a:ext uri="{FF2B5EF4-FFF2-40B4-BE49-F238E27FC236}">
+                <a16:creationId xmlns:a16="http://schemas.microsoft.com/office/drawing/2014/main" id="{A7814F35-DDC9-486E-A858-A0E1A98E18F2}"/>
+              </a:ext>
+            </a:extLst>
+          </p:cNvPr>
           <p:cNvSpPr>
             <a:spLocks noGrp="1"/>
           </p:cNvSpPr>
@@ -2658,13 +3047,18 @@
               <a:rPr lang="en-US"/>
               <a:t>Fifth level</a:t>
             </a:r>
-            <a:endParaRPr lang="en-US" dirty="0"/>
-          </a:p>
-        </p:txBody>
-      </p:sp>
-      <p:sp>
-        <p:nvSpPr>
-          <p:cNvPr id="4" name="Date Placeholder 3"/>
+          </a:p>
+        </p:txBody>
+      </p:sp>
+      <p:sp>
+        <p:nvSpPr>
+          <p:cNvPr id="4" name="Date Placeholder 3">
+            <a:extLst>
+              <a:ext uri="{FF2B5EF4-FFF2-40B4-BE49-F238E27FC236}">
+                <a16:creationId xmlns:a16="http://schemas.microsoft.com/office/drawing/2014/main" id="{D58F4CAF-DFB0-4E4C-89CB-8D81EEC49FFF}"/>
+              </a:ext>
+            </a:extLst>
+          </p:cNvPr>
           <p:cNvSpPr>
             <a:spLocks noGrp="1"/>
           </p:cNvSpPr>
@@ -2698,7 +3092,7 @@
             <a:fld id="{96DFF08F-DC6B-4601-B491-B0F83F6DD2DA}" type="datetimeFigureOut">
               <a:rPr lang="en-US" smtClean="0"/>
               <a:pPr/>
-              <a:t>5/4/2020</a:t>
+              <a:t>1/27/2021</a:t>
             </a:fld>
             <a:endParaRPr lang="en-US" dirty="0"/>
           </a:p>
@@ -2706,7 +3100,13 @@
       </p:sp>
       <p:sp>
         <p:nvSpPr>
-          <p:cNvPr id="5" name="Footer Placeholder 4"/>
+          <p:cNvPr id="5" name="Footer Placeholder 4">
+            <a:extLst>
+              <a:ext uri="{FF2B5EF4-FFF2-40B4-BE49-F238E27FC236}">
+                <a16:creationId xmlns:a16="http://schemas.microsoft.com/office/drawing/2014/main" id="{D345A15B-5838-4293-9318-D175AB27D50E}"/>
+              </a:ext>
+            </a:extLst>
+          </p:cNvPr>
           <p:cNvSpPr>
             <a:spLocks noGrp="1"/>
           </p:cNvSpPr>
@@ -2743,7 +3143,13 @@
       </p:sp>
       <p:sp>
         <p:nvSpPr>
-          <p:cNvPr id="6" name="Slide Number Placeholder 5"/>
+          <p:cNvPr id="6" name="Slide Number Placeholder 5">
+            <a:extLst>
+              <a:ext uri="{FF2B5EF4-FFF2-40B4-BE49-F238E27FC236}">
+                <a16:creationId xmlns:a16="http://schemas.microsoft.com/office/drawing/2014/main" id="{649DEF4E-5EF2-4569-94F1-553F75B31454}"/>
+              </a:ext>
+            </a:extLst>
+          </p:cNvPr>
           <p:cNvSpPr>
             <a:spLocks noGrp="1"/>
           </p:cNvSpPr>
@@ -2786,23 +3192,23 @@
     </p:spTree>
     <p:extLst>
       <p:ext uri="{BB962C8B-B14F-4D97-AF65-F5344CB8AC3E}">
-        <p14:creationId xmlns:p14="http://schemas.microsoft.com/office/powerpoint/2010/main" val="429445536"/>
+        <p14:creationId xmlns:p14="http://schemas.microsoft.com/office/powerpoint/2010/main" val="1609507592"/>
       </p:ext>
     </p:extLst>
   </p:cSld>
   <p:clrMap bg1="lt1" tx1="dk1" bg2="lt2" tx2="dk2" accent1="accent1" accent2="accent2" accent3="accent3" accent4="accent4" accent5="accent5" accent6="accent6" hlink="hlink" folHlink="folHlink"/>
   <p:sldLayoutIdLst>
-    <p:sldLayoutId id="2147483674" r:id="rId1"/>
-    <p:sldLayoutId id="2147483675" r:id="rId2"/>
-    <p:sldLayoutId id="2147483676" r:id="rId3"/>
-    <p:sldLayoutId id="2147483677" r:id="rId4"/>
-    <p:sldLayoutId id="2147483678" r:id="rId5"/>
-    <p:sldLayoutId id="2147483679" r:id="rId6"/>
-    <p:sldLayoutId id="2147483680" r:id="rId7"/>
-    <p:sldLayoutId id="2147483681" r:id="rId8"/>
-    <p:sldLayoutId id="2147483682" r:id="rId9"/>
-    <p:sldLayoutId id="2147483683" r:id="rId10"/>
-    <p:sldLayoutId id="2147483684" r:id="rId11"/>
+    <p:sldLayoutId id="2147483725" r:id="rId1"/>
+    <p:sldLayoutId id="2147483726" r:id="rId2"/>
+    <p:sldLayoutId id="2147483727" r:id="rId3"/>
+    <p:sldLayoutId id="2147483728" r:id="rId4"/>
+    <p:sldLayoutId id="2147483729" r:id="rId5"/>
+    <p:sldLayoutId id="2147483730" r:id="rId6"/>
+    <p:sldLayoutId id="2147483731" r:id="rId7"/>
+    <p:sldLayoutId id="2147483732" r:id="rId8"/>
+    <p:sldLayoutId id="2147483733" r:id="rId9"/>
+    <p:sldLayoutId id="2147483734" r:id="rId10"/>
+    <p:sldLayoutId id="2147483735" r:id="rId11"/>
   </p:sldLayoutIdLst>
   <p:txStyles>
     <p:titleStyle>
@@ -3210,842 +3616,6 @@
             <p:ph type="title"/>
           </p:nvPr>
         </p:nvSpPr>
-        <p:spPr>
-          <a:xfrm>
-            <a:off x="877661" y="137346"/>
-            <a:ext cx="9720072" cy="1499616"/>
-          </a:xfrm>
-        </p:spPr>
-        <p:txBody>
-          <a:bodyPr/>
-          <a:lstStyle/>
-          <a:p>
-            <a:r>
-              <a:rPr lang="en-US" dirty="0">
-                <a:latin typeface="Consolas" charset="0"/>
-                <a:ea typeface="Consolas" charset="0"/>
-                <a:cs typeface="Consolas" charset="0"/>
-              </a:rPr>
-              <a:t>APA format: results - Examples</a:t>
-            </a:r>
-          </a:p>
-        </p:txBody>
-      </p:sp>
-      <p:pic>
-        <p:nvPicPr>
-          <p:cNvPr id="3" name="Picture 2"/>
-          <p:cNvPicPr>
-            <a:picLocks noChangeAspect="1"/>
-          </p:cNvPicPr>
-          <p:nvPr/>
-        </p:nvPicPr>
-        <p:blipFill>
-          <a:blip r:embed="rId2"/>
-          <a:stretch>
-            <a:fillRect/>
-          </a:stretch>
-        </p:blipFill>
-        <p:spPr>
-          <a:xfrm>
-            <a:off x="877661" y="1335024"/>
-            <a:ext cx="10306050" cy="5257800"/>
-          </a:xfrm>
-          <a:prstGeom prst="rect">
-            <a:avLst/>
-          </a:prstGeom>
-        </p:spPr>
-      </p:pic>
-    </p:spTree>
-    <p:extLst>
-      <p:ext uri="{BB962C8B-B14F-4D97-AF65-F5344CB8AC3E}">
-        <p14:creationId xmlns:p14="http://schemas.microsoft.com/office/powerpoint/2010/main" val="3472298534"/>
-      </p:ext>
-    </p:extLst>
-  </p:cSld>
-  <p:clrMapOvr>
-    <a:masterClrMapping/>
-  </p:clrMapOvr>
-</p:sld>
-</file>
-
-<file path=ppt/slides/slide11.xml><?xml version="1.0" encoding="utf-8"?>
-<p:sld xmlns:a="http://schemas.openxmlformats.org/drawingml/2006/main" xmlns:r="http://schemas.openxmlformats.org/officeDocument/2006/relationships" xmlns:p="http://schemas.openxmlformats.org/presentationml/2006/main">
-  <p:cSld>
-    <p:spTree>
-      <p:nvGrpSpPr>
-        <p:cNvPr id="1" name=""/>
-        <p:cNvGrpSpPr/>
-        <p:nvPr/>
-      </p:nvGrpSpPr>
-      <p:grpSpPr>
-        <a:xfrm>
-          <a:off x="0" y="0"/>
-          <a:ext cx="0" cy="0"/>
-          <a:chOff x="0" y="0"/>
-          <a:chExt cx="0" cy="0"/>
-        </a:xfrm>
-      </p:grpSpPr>
-      <p:sp>
-        <p:nvSpPr>
-          <p:cNvPr id="2" name="Title 1"/>
-          <p:cNvSpPr>
-            <a:spLocks noGrp="1"/>
-          </p:cNvSpPr>
-          <p:nvPr>
-            <p:ph type="title"/>
-          </p:nvPr>
-        </p:nvSpPr>
-        <p:spPr/>
-        <p:txBody>
-          <a:bodyPr/>
-          <a:lstStyle/>
-          <a:p>
-            <a:r>
-              <a:rPr lang="en-US" dirty="0">
-                <a:latin typeface="Consolas" charset="0"/>
-                <a:ea typeface="Consolas" charset="0"/>
-                <a:cs typeface="Consolas" charset="0"/>
-              </a:rPr>
-              <a:t>APA format: </a:t>
-            </a:r>
-            <a:r>
-              <a:rPr lang="en-US" dirty="0">
-                <a:solidFill>
-                  <a:schemeClr val="accent3"/>
-                </a:solidFill>
-                <a:latin typeface="Consolas" charset="0"/>
-                <a:ea typeface="Consolas" charset="0"/>
-                <a:cs typeface="Consolas" charset="0"/>
-              </a:rPr>
-              <a:t>Tables</a:t>
-            </a:r>
-          </a:p>
-        </p:txBody>
-      </p:sp>
-      <p:sp>
-        <p:nvSpPr>
-          <p:cNvPr id="3" name="Content Placeholder 2"/>
-          <p:cNvSpPr>
-            <a:spLocks noGrp="1"/>
-          </p:cNvSpPr>
-          <p:nvPr>
-            <p:ph idx="1"/>
-          </p:nvPr>
-        </p:nvSpPr>
-        <p:spPr>
-          <a:xfrm>
-            <a:off x="1024128" y="1922108"/>
-            <a:ext cx="9720071" cy="4572000"/>
-          </a:xfrm>
-        </p:spPr>
-        <p:txBody>
-          <a:bodyPr>
-            <a:normAutofit lnSpcReduction="10000"/>
-          </a:bodyPr>
-          <a:lstStyle/>
-          <a:p>
-            <a:r>
-              <a:rPr lang="en-US" sz="2400" b="1" dirty="0">
-                <a:solidFill>
-                  <a:schemeClr val="accent6"/>
-                </a:solidFill>
-                <a:latin typeface="Consolas" charset="0"/>
-                <a:ea typeface="Consolas" charset="0"/>
-                <a:cs typeface="Consolas" charset="0"/>
-              </a:rPr>
-              <a:t>Must be able to stand on its own</a:t>
-            </a:r>
-          </a:p>
-          <a:p>
-            <a:r>
-              <a:rPr lang="en-US" sz="2400" dirty="0">
-                <a:latin typeface="Consolas" charset="0"/>
-                <a:ea typeface="Consolas" charset="0"/>
-                <a:cs typeface="Consolas" charset="0"/>
-              </a:rPr>
-              <a:t>Number tables </a:t>
-            </a:r>
-            <a:r>
-              <a:rPr lang="en-US" sz="2400" dirty="0">
-                <a:solidFill>
-                  <a:schemeClr val="accent3"/>
-                </a:solidFill>
-                <a:latin typeface="Consolas" charset="0"/>
-                <a:ea typeface="Consolas" charset="0"/>
-                <a:cs typeface="Consolas" charset="0"/>
-              </a:rPr>
-              <a:t>sequentially </a:t>
-            </a:r>
-            <a:r>
-              <a:rPr lang="en-US" sz="2400" dirty="0">
-                <a:latin typeface="Consolas" charset="0"/>
-                <a:ea typeface="Consolas" charset="0"/>
-                <a:cs typeface="Consolas" charset="0"/>
-              </a:rPr>
-              <a:t>in text (Table 1, Table 2, </a:t>
-            </a:r>
-            <a:r>
-              <a:rPr lang="en-US" sz="2400" dirty="0" err="1">
-                <a:latin typeface="Consolas" charset="0"/>
-                <a:ea typeface="Consolas" charset="0"/>
-                <a:cs typeface="Consolas" charset="0"/>
-              </a:rPr>
-              <a:t>ect</a:t>
-            </a:r>
-            <a:r>
-              <a:rPr lang="en-US" sz="2400" dirty="0">
-                <a:latin typeface="Consolas" charset="0"/>
-                <a:ea typeface="Consolas" charset="0"/>
-                <a:cs typeface="Consolas" charset="0"/>
-              </a:rPr>
-              <a:t>.)</a:t>
-            </a:r>
-          </a:p>
-          <a:p>
-            <a:r>
-              <a:rPr lang="en-US" sz="2400" dirty="0">
-                <a:latin typeface="Consolas" charset="0"/>
-                <a:ea typeface="Consolas" charset="0"/>
-                <a:cs typeface="Consolas" charset="0"/>
-              </a:rPr>
-              <a:t>Only </a:t>
-            </a:r>
-            <a:r>
-              <a:rPr lang="en-US" sz="2400" dirty="0">
-                <a:solidFill>
-                  <a:schemeClr val="accent5"/>
-                </a:solidFill>
-                <a:latin typeface="Consolas" charset="0"/>
-                <a:ea typeface="Consolas" charset="0"/>
-                <a:cs typeface="Consolas" charset="0"/>
-              </a:rPr>
-              <a:t>3-4</a:t>
-            </a:r>
-            <a:r>
-              <a:rPr lang="en-US" sz="2400" dirty="0">
-                <a:latin typeface="Consolas" charset="0"/>
-                <a:ea typeface="Consolas" charset="0"/>
-                <a:cs typeface="Consolas" charset="0"/>
-              </a:rPr>
-              <a:t> tables per manuscript (different for theses/</a:t>
-            </a:r>
-            <a:r>
-              <a:rPr lang="en-US" sz="2400" dirty="0" err="1">
-                <a:latin typeface="Consolas" charset="0"/>
-                <a:ea typeface="Consolas" charset="0"/>
-                <a:cs typeface="Consolas" charset="0"/>
-              </a:rPr>
-              <a:t>disertations</a:t>
-            </a:r>
-            <a:r>
-              <a:rPr lang="en-US" sz="2400" dirty="0">
-                <a:latin typeface="Consolas" charset="0"/>
-                <a:ea typeface="Consolas" charset="0"/>
-                <a:cs typeface="Consolas" charset="0"/>
-              </a:rPr>
-              <a:t>)</a:t>
-            </a:r>
-          </a:p>
-          <a:p>
-            <a:r>
-              <a:rPr lang="en-US" sz="2400" dirty="0">
-                <a:latin typeface="Consolas" charset="0"/>
-                <a:ea typeface="Consolas" charset="0"/>
-                <a:cs typeface="Consolas" charset="0"/>
-              </a:rPr>
-              <a:t>Results Table types</a:t>
-            </a:r>
-          </a:p>
-          <a:p>
-            <a:pPr lvl="1"/>
-            <a:r>
-              <a:rPr lang="en-US" sz="2000" dirty="0">
-                <a:solidFill>
-                  <a:schemeClr val="accent6"/>
-                </a:solidFill>
-                <a:latin typeface="Consolas" charset="0"/>
-                <a:ea typeface="Consolas" charset="0"/>
-                <a:cs typeface="Consolas" charset="0"/>
-              </a:rPr>
-              <a:t>Descriptive </a:t>
-            </a:r>
-            <a:r>
-              <a:rPr lang="en-US" sz="2000" dirty="0">
-                <a:latin typeface="Consolas" charset="0"/>
-                <a:ea typeface="Consolas" charset="0"/>
-                <a:cs typeface="Consolas" charset="0"/>
-              </a:rPr>
-              <a:t>statistics for N  or n (or both)</a:t>
-            </a:r>
-          </a:p>
-          <a:p>
-            <a:pPr lvl="1"/>
-            <a:r>
-              <a:rPr lang="en-US" sz="2000" dirty="0">
-                <a:solidFill>
-                  <a:schemeClr val="accent6"/>
-                </a:solidFill>
-                <a:latin typeface="Consolas" charset="0"/>
-                <a:ea typeface="Consolas" charset="0"/>
-                <a:cs typeface="Consolas" charset="0"/>
-              </a:rPr>
-              <a:t>Inferential </a:t>
-            </a:r>
-            <a:r>
-              <a:rPr lang="en-US" sz="2000" dirty="0">
-                <a:latin typeface="Consolas" charset="0"/>
-                <a:ea typeface="Consolas" charset="0"/>
-                <a:cs typeface="Consolas" charset="0"/>
-              </a:rPr>
-              <a:t>statistics for ANOVA, MLR, </a:t>
-            </a:r>
-            <a:r>
-              <a:rPr lang="en-US" sz="2000" dirty="0" err="1">
-                <a:latin typeface="Consolas" charset="0"/>
-                <a:ea typeface="Consolas" charset="0"/>
-                <a:cs typeface="Consolas" charset="0"/>
-              </a:rPr>
-              <a:t>ect</a:t>
-            </a:r>
-            <a:r>
-              <a:rPr lang="en-US" sz="2000" dirty="0">
-                <a:latin typeface="Consolas" charset="0"/>
-                <a:ea typeface="Consolas" charset="0"/>
-                <a:cs typeface="Consolas" charset="0"/>
-              </a:rPr>
-              <a:t>.</a:t>
-            </a:r>
-          </a:p>
-          <a:p>
-            <a:pPr lvl="1"/>
-            <a:r>
-              <a:rPr lang="en-US" sz="2000" dirty="0">
-                <a:latin typeface="Consolas" charset="0"/>
-                <a:ea typeface="Consolas" charset="0"/>
-                <a:cs typeface="Consolas" charset="0"/>
-              </a:rPr>
-              <a:t>Both descriptive AND inferential info in the same table -&gt; </a:t>
-            </a:r>
-            <a:r>
-              <a:rPr lang="en-US" sz="2000" dirty="0">
-                <a:solidFill>
-                  <a:schemeClr val="accent1"/>
-                </a:solidFill>
-                <a:latin typeface="Consolas" charset="0"/>
-                <a:ea typeface="Consolas" charset="0"/>
-                <a:cs typeface="Consolas" charset="0"/>
-              </a:rPr>
-              <a:t>USE HEADINGS </a:t>
-            </a:r>
-            <a:r>
-              <a:rPr lang="en-US" sz="2000" dirty="0">
-                <a:latin typeface="Consolas" charset="0"/>
-                <a:ea typeface="Consolas" charset="0"/>
-                <a:cs typeface="Consolas" charset="0"/>
-              </a:rPr>
-              <a:t>to organize</a:t>
-            </a:r>
-          </a:p>
-          <a:p>
-            <a:r>
-              <a:rPr lang="en-US" sz="2400" dirty="0">
-                <a:latin typeface="Consolas" charset="0"/>
-                <a:ea typeface="Consolas" charset="0"/>
-                <a:cs typeface="Consolas" charset="0"/>
-              </a:rPr>
-              <a:t>Data not applicable: leave </a:t>
-            </a:r>
-            <a:r>
-              <a:rPr lang="en-US" sz="2400" dirty="0">
-                <a:solidFill>
-                  <a:schemeClr val="accent2"/>
-                </a:solidFill>
-                <a:latin typeface="Consolas" charset="0"/>
-                <a:ea typeface="Consolas" charset="0"/>
-                <a:cs typeface="Consolas" charset="0"/>
-              </a:rPr>
-              <a:t>blank</a:t>
-            </a:r>
-          </a:p>
-          <a:p>
-            <a:r>
-              <a:rPr lang="en-US" sz="2400" dirty="0">
-                <a:latin typeface="Consolas" charset="0"/>
-                <a:ea typeface="Consolas" charset="0"/>
-                <a:cs typeface="Consolas" charset="0"/>
-              </a:rPr>
-              <a:t>Data not obtained/not computable: use a dash </a:t>
-            </a:r>
-            <a:r>
-              <a:rPr lang="en-US" sz="2400" dirty="0">
-                <a:solidFill>
-                  <a:schemeClr val="tx2"/>
-                </a:solidFill>
-                <a:latin typeface="Consolas" charset="0"/>
-                <a:ea typeface="Consolas" charset="0"/>
-                <a:cs typeface="Consolas" charset="0"/>
-              </a:rPr>
-              <a:t>“-”</a:t>
-            </a:r>
-          </a:p>
-        </p:txBody>
-      </p:sp>
-    </p:spTree>
-    <p:extLst>
-      <p:ext uri="{BB962C8B-B14F-4D97-AF65-F5344CB8AC3E}">
-        <p14:creationId xmlns:p14="http://schemas.microsoft.com/office/powerpoint/2010/main" val="3993618965"/>
-      </p:ext>
-    </p:extLst>
-  </p:cSld>
-  <p:clrMapOvr>
-    <a:masterClrMapping/>
-  </p:clrMapOvr>
-</p:sld>
-</file>
-
-<file path=ppt/slides/slide12.xml><?xml version="1.0" encoding="utf-8"?>
-<p:sld xmlns:a="http://schemas.openxmlformats.org/drawingml/2006/main" xmlns:r="http://schemas.openxmlformats.org/officeDocument/2006/relationships" xmlns:p="http://schemas.openxmlformats.org/presentationml/2006/main">
-  <p:cSld>
-    <p:spTree>
-      <p:nvGrpSpPr>
-        <p:cNvPr id="1" name=""/>
-        <p:cNvGrpSpPr/>
-        <p:nvPr/>
-      </p:nvGrpSpPr>
-      <p:grpSpPr>
-        <a:xfrm>
-          <a:off x="0" y="0"/>
-          <a:ext cx="0" cy="0"/>
-          <a:chOff x="0" y="0"/>
-          <a:chExt cx="0" cy="0"/>
-        </a:xfrm>
-      </p:grpSpPr>
-      <p:sp>
-        <p:nvSpPr>
-          <p:cNvPr id="2" name="Title 1"/>
-          <p:cNvSpPr>
-            <a:spLocks noGrp="1"/>
-          </p:cNvSpPr>
-          <p:nvPr>
-            <p:ph type="title"/>
-          </p:nvPr>
-        </p:nvSpPr>
-        <p:spPr/>
-        <p:txBody>
-          <a:bodyPr/>
-          <a:lstStyle/>
-          <a:p>
-            <a:r>
-              <a:rPr lang="en-US" dirty="0">
-                <a:latin typeface="Consolas" charset="0"/>
-                <a:ea typeface="Consolas" charset="0"/>
-                <a:cs typeface="Consolas" charset="0"/>
-              </a:rPr>
-              <a:t>APA format: </a:t>
-            </a:r>
-            <a:r>
-              <a:rPr lang="en-US" dirty="0">
-                <a:solidFill>
-                  <a:schemeClr val="accent3"/>
-                </a:solidFill>
-                <a:latin typeface="Consolas" charset="0"/>
-                <a:ea typeface="Consolas" charset="0"/>
-                <a:cs typeface="Consolas" charset="0"/>
-              </a:rPr>
-              <a:t>Tables</a:t>
-            </a:r>
-          </a:p>
-        </p:txBody>
-      </p:sp>
-      <p:sp>
-        <p:nvSpPr>
-          <p:cNvPr id="4" name="Rectangle 3"/>
-          <p:cNvSpPr/>
-          <p:nvPr/>
-        </p:nvSpPr>
-        <p:spPr>
-          <a:xfrm>
-            <a:off x="838200" y="1690688"/>
-            <a:ext cx="4597400" cy="3108543"/>
-          </a:xfrm>
-          <a:prstGeom prst="rect">
-            <a:avLst/>
-          </a:prstGeom>
-        </p:spPr>
-        <p:txBody>
-          <a:bodyPr wrap="square">
-            <a:spAutoFit/>
-          </a:bodyPr>
-          <a:lstStyle/>
-          <a:p>
-            <a:r>
-              <a:rPr lang="en-US" sz="2800" dirty="0">
-                <a:latin typeface="Consolas" charset="0"/>
-                <a:ea typeface="Consolas" charset="0"/>
-                <a:cs typeface="Consolas" charset="0"/>
-              </a:rPr>
-              <a:t>Title (</a:t>
-            </a:r>
-            <a:r>
-              <a:rPr lang="en-US" sz="2800" b="1" dirty="0">
-                <a:solidFill>
-                  <a:schemeClr val="accent6"/>
-                </a:solidFill>
-                <a:latin typeface="Consolas" charset="0"/>
-                <a:ea typeface="Consolas" charset="0"/>
-                <a:cs typeface="Consolas" charset="0"/>
-              </a:rPr>
-              <a:t>top</a:t>
-            </a:r>
-            <a:r>
-              <a:rPr lang="en-US" sz="2800" dirty="0">
-                <a:latin typeface="Consolas" charset="0"/>
-                <a:ea typeface="Consolas" charset="0"/>
-                <a:cs typeface="Consolas" charset="0"/>
-              </a:rPr>
-              <a:t>)</a:t>
-            </a:r>
-          </a:p>
-          <a:p>
-            <a:pPr lvl="1"/>
-            <a:r>
-              <a:rPr lang="en-US" sz="2400" dirty="0">
-                <a:latin typeface="Consolas" charset="0"/>
-                <a:ea typeface="Consolas" charset="0"/>
-                <a:cs typeface="Consolas" charset="0"/>
-              </a:rPr>
-              <a:t>Descriptive</a:t>
-            </a:r>
-          </a:p>
-          <a:p>
-            <a:pPr lvl="1"/>
-            <a:r>
-              <a:rPr lang="en-US" sz="2400" dirty="0">
-                <a:latin typeface="Consolas" charset="0"/>
-                <a:ea typeface="Consolas" charset="0"/>
-                <a:cs typeface="Consolas" charset="0"/>
-              </a:rPr>
-              <a:t>First Letter of Each Word in CAPS</a:t>
-            </a:r>
-          </a:p>
-          <a:p>
-            <a:pPr lvl="1"/>
-            <a:r>
-              <a:rPr lang="en-US" sz="2400" dirty="0">
-                <a:latin typeface="Consolas" charset="0"/>
-                <a:ea typeface="Consolas" charset="0"/>
-                <a:cs typeface="Consolas" charset="0"/>
-              </a:rPr>
-              <a:t>No period at the end</a:t>
-            </a:r>
-          </a:p>
-          <a:p>
-            <a:pPr lvl="1"/>
-            <a:r>
-              <a:rPr lang="en-US" sz="2400" dirty="0">
-                <a:latin typeface="Consolas" charset="0"/>
-                <a:ea typeface="Consolas" charset="0"/>
-                <a:cs typeface="Consolas" charset="0"/>
-              </a:rPr>
-              <a:t>Appears on row below “Table 1”</a:t>
-            </a:r>
-          </a:p>
-          <a:p>
-            <a:pPr lvl="1"/>
-            <a:r>
-              <a:rPr lang="en-US" sz="2400" dirty="0">
-                <a:latin typeface="Consolas" charset="0"/>
-                <a:ea typeface="Consolas" charset="0"/>
-                <a:cs typeface="Consolas" charset="0"/>
-              </a:rPr>
-              <a:t>Title may be italicized</a:t>
-            </a:r>
-          </a:p>
-        </p:txBody>
-      </p:sp>
-      <p:sp>
-        <p:nvSpPr>
-          <p:cNvPr id="6" name="Rectangle 5"/>
-          <p:cNvSpPr/>
-          <p:nvPr/>
-        </p:nvSpPr>
-        <p:spPr>
-          <a:xfrm>
-            <a:off x="5765800" y="1690688"/>
-            <a:ext cx="6096000" cy="4124206"/>
-          </a:xfrm>
-          <a:prstGeom prst="rect">
-            <a:avLst/>
-          </a:prstGeom>
-        </p:spPr>
-        <p:txBody>
-          <a:bodyPr>
-            <a:spAutoFit/>
-          </a:bodyPr>
-          <a:lstStyle/>
-          <a:p>
-            <a:r>
-              <a:rPr lang="en-US" sz="2800" dirty="0">
-                <a:latin typeface="Consolas" charset="0"/>
-                <a:ea typeface="Consolas" charset="0"/>
-                <a:cs typeface="Consolas" charset="0"/>
-              </a:rPr>
-              <a:t>Caption and Notes (</a:t>
-            </a:r>
-            <a:r>
-              <a:rPr lang="en-US" sz="2800" b="1" dirty="0">
-                <a:solidFill>
-                  <a:schemeClr val="accent6"/>
-                </a:solidFill>
-                <a:latin typeface="Consolas" charset="0"/>
-                <a:ea typeface="Consolas" charset="0"/>
-                <a:cs typeface="Consolas" charset="0"/>
-              </a:rPr>
-              <a:t>bottom</a:t>
-            </a:r>
-            <a:r>
-              <a:rPr lang="en-US" sz="2800" dirty="0">
-                <a:latin typeface="Consolas" charset="0"/>
-                <a:ea typeface="Consolas" charset="0"/>
-                <a:cs typeface="Consolas" charset="0"/>
-              </a:rPr>
-              <a:t>)</a:t>
-            </a:r>
-          </a:p>
-          <a:p>
-            <a:pPr lvl="1"/>
-            <a:r>
-              <a:rPr lang="en-US" sz="2400" dirty="0">
-                <a:latin typeface="Consolas" charset="0"/>
-                <a:ea typeface="Consolas" charset="0"/>
-                <a:cs typeface="Consolas" charset="0"/>
-              </a:rPr>
-              <a:t>General Note</a:t>
-            </a:r>
-          </a:p>
-          <a:p>
-            <a:pPr lvl="2"/>
-            <a:r>
-              <a:rPr lang="en-US" dirty="0">
-                <a:latin typeface="Consolas" charset="0"/>
-                <a:ea typeface="Consolas" charset="0"/>
-                <a:cs typeface="Consolas" charset="0"/>
-              </a:rPr>
-              <a:t>Explains/qualifies info in table, symbols, abbreviations</a:t>
-            </a:r>
-          </a:p>
-          <a:p>
-            <a:pPr lvl="2"/>
-            <a:r>
-              <a:rPr lang="en-US" dirty="0">
-                <a:latin typeface="Consolas" charset="0"/>
-                <a:ea typeface="Consolas" charset="0"/>
-                <a:cs typeface="Consolas" charset="0"/>
-              </a:rPr>
-              <a:t>No explanation for basic stats (M, SD, no. N, n)</a:t>
-            </a:r>
-          </a:p>
-          <a:p>
-            <a:pPr lvl="1"/>
-            <a:r>
-              <a:rPr lang="en-US" sz="2400" dirty="0">
-                <a:latin typeface="Consolas" charset="0"/>
-                <a:ea typeface="Consolas" charset="0"/>
-                <a:cs typeface="Consolas" charset="0"/>
-              </a:rPr>
-              <a:t>Specific Note</a:t>
-            </a:r>
-          </a:p>
-          <a:p>
-            <a:pPr lvl="2"/>
-            <a:r>
-              <a:rPr lang="en-US" dirty="0">
-                <a:latin typeface="Consolas" charset="0"/>
-                <a:ea typeface="Consolas" charset="0"/>
-                <a:cs typeface="Consolas" charset="0"/>
-              </a:rPr>
-              <a:t>Begin on a new line, flush left</a:t>
-            </a:r>
-          </a:p>
-          <a:p>
-            <a:pPr lvl="2"/>
-            <a:r>
-              <a:rPr lang="en-US" dirty="0">
-                <a:latin typeface="Consolas" charset="0"/>
-                <a:ea typeface="Consolas" charset="0"/>
-                <a:cs typeface="Consolas" charset="0"/>
-              </a:rPr>
-              <a:t>Define superscripts </a:t>
-            </a:r>
-            <a:r>
-              <a:rPr lang="en-US" baseline="30000" dirty="0">
-                <a:latin typeface="Consolas" charset="0"/>
-                <a:ea typeface="Consolas" charset="0"/>
-                <a:cs typeface="Consolas" charset="0"/>
-              </a:rPr>
-              <a:t>a, b, c</a:t>
-            </a:r>
-            <a:endParaRPr lang="en-US" dirty="0">
-              <a:latin typeface="Consolas" charset="0"/>
-              <a:ea typeface="Consolas" charset="0"/>
-              <a:cs typeface="Consolas" charset="0"/>
-            </a:endParaRPr>
-          </a:p>
-          <a:p>
-            <a:pPr lvl="1"/>
-            <a:r>
-              <a:rPr lang="en-US" sz="2400" dirty="0">
-                <a:latin typeface="Consolas" charset="0"/>
-                <a:ea typeface="Consolas" charset="0"/>
-                <a:cs typeface="Consolas" charset="0"/>
-              </a:rPr>
-              <a:t>Probability note</a:t>
-            </a:r>
-          </a:p>
-          <a:p>
-            <a:pPr lvl="2"/>
-            <a:r>
-              <a:rPr lang="en-US" dirty="0">
-                <a:latin typeface="Consolas" charset="0"/>
-                <a:ea typeface="Consolas" charset="0"/>
-                <a:cs typeface="Consolas" charset="0"/>
-              </a:rPr>
-              <a:t>Begin on a new line, flush left</a:t>
-            </a:r>
-          </a:p>
-          <a:p>
-            <a:pPr lvl="2"/>
-            <a:r>
-              <a:rPr lang="en-US" dirty="0">
-                <a:latin typeface="Consolas" charset="0"/>
-                <a:ea typeface="Consolas" charset="0"/>
-                <a:cs typeface="Consolas" charset="0"/>
-              </a:rPr>
-              <a:t>* p &lt; 0.05, ** p &lt; 0.01, *** p &lt; 0.001, **** p &lt; 0.0001</a:t>
-            </a:r>
-          </a:p>
-        </p:txBody>
-      </p:sp>
-    </p:spTree>
-    <p:extLst>
-      <p:ext uri="{BB962C8B-B14F-4D97-AF65-F5344CB8AC3E}">
-        <p14:creationId xmlns:p14="http://schemas.microsoft.com/office/powerpoint/2010/main" val="3210726610"/>
-      </p:ext>
-    </p:extLst>
-  </p:cSld>
-  <p:clrMapOvr>
-    <a:masterClrMapping/>
-  </p:clrMapOvr>
-</p:sld>
-</file>
-
-<file path=ppt/slides/slide13.xml><?xml version="1.0" encoding="utf-8"?>
-<p:sld xmlns:a="http://schemas.openxmlformats.org/drawingml/2006/main" xmlns:r="http://schemas.openxmlformats.org/officeDocument/2006/relationships" xmlns:p="http://schemas.openxmlformats.org/presentationml/2006/main">
-  <p:cSld>
-    <p:spTree>
-      <p:nvGrpSpPr>
-        <p:cNvPr id="1" name=""/>
-        <p:cNvGrpSpPr/>
-        <p:nvPr/>
-      </p:nvGrpSpPr>
-      <p:grpSpPr>
-        <a:xfrm>
-          <a:off x="0" y="0"/>
-          <a:ext cx="0" cy="0"/>
-          <a:chOff x="0" y="0"/>
-          <a:chExt cx="0" cy="0"/>
-        </a:xfrm>
-      </p:grpSpPr>
-      <p:sp>
-        <p:nvSpPr>
-          <p:cNvPr id="2" name="Title 1"/>
-          <p:cNvSpPr>
-            <a:spLocks noGrp="1"/>
-          </p:cNvSpPr>
-          <p:nvPr>
-            <p:ph type="title"/>
-          </p:nvPr>
-        </p:nvSpPr>
-        <p:spPr/>
-        <p:txBody>
-          <a:bodyPr/>
-          <a:lstStyle/>
-          <a:p>
-            <a:r>
-              <a:rPr lang="en-US" dirty="0">
-                <a:latin typeface="Consolas" charset="0"/>
-                <a:ea typeface="Consolas" charset="0"/>
-                <a:cs typeface="Consolas" charset="0"/>
-              </a:rPr>
-              <a:t>APA format: Tables - Examples</a:t>
-            </a:r>
-          </a:p>
-        </p:txBody>
-      </p:sp>
-      <p:pic>
-        <p:nvPicPr>
-          <p:cNvPr id="3" name="Picture 2"/>
-          <p:cNvPicPr>
-            <a:picLocks noChangeAspect="1"/>
-          </p:cNvPicPr>
-          <p:nvPr/>
-        </p:nvPicPr>
-        <p:blipFill>
-          <a:blip r:embed="rId2"/>
-          <a:stretch>
-            <a:fillRect/>
-          </a:stretch>
-        </p:blipFill>
-        <p:spPr>
-          <a:xfrm>
-            <a:off x="381388" y="1903736"/>
-            <a:ext cx="11391900" cy="3629025"/>
-          </a:xfrm>
-          <a:prstGeom prst="rect">
-            <a:avLst/>
-          </a:prstGeom>
-        </p:spPr>
-      </p:pic>
-    </p:spTree>
-    <p:extLst>
-      <p:ext uri="{BB962C8B-B14F-4D97-AF65-F5344CB8AC3E}">
-        <p14:creationId xmlns:p14="http://schemas.microsoft.com/office/powerpoint/2010/main" val="4145343862"/>
-      </p:ext>
-    </p:extLst>
-  </p:cSld>
-  <p:clrMapOvr>
-    <a:masterClrMapping/>
-  </p:clrMapOvr>
-</p:sld>
-</file>
-
-<file path=ppt/slides/slide14.xml><?xml version="1.0" encoding="utf-8"?>
-<p:sld xmlns:a="http://schemas.openxmlformats.org/drawingml/2006/main" xmlns:r="http://schemas.openxmlformats.org/officeDocument/2006/relationships" xmlns:p="http://schemas.openxmlformats.org/presentationml/2006/main">
-  <p:cSld>
-    <p:spTree>
-      <p:nvGrpSpPr>
-        <p:cNvPr id="1" name=""/>
-        <p:cNvGrpSpPr/>
-        <p:nvPr/>
-      </p:nvGrpSpPr>
-      <p:grpSpPr>
-        <a:xfrm>
-          <a:off x="0" y="0"/>
-          <a:ext cx="0" cy="0"/>
-          <a:chOff x="0" y="0"/>
-          <a:chExt cx="0" cy="0"/>
-        </a:xfrm>
-      </p:grpSpPr>
-      <p:sp>
-        <p:nvSpPr>
-          <p:cNvPr id="2" name="Title 1"/>
-          <p:cNvSpPr>
-            <a:spLocks noGrp="1"/>
-          </p:cNvSpPr>
-          <p:nvPr>
-            <p:ph type="title"/>
-          </p:nvPr>
-        </p:nvSpPr>
         <p:spPr/>
         <p:txBody>
           <a:bodyPr/>
@@ -4099,7 +3669,7 @@
 </p:sld>
 </file>
 
-<file path=ppt/slides/slide15.xml><?xml version="1.0" encoding="utf-8"?>
+<file path=ppt/slides/slide11.xml><?xml version="1.0" encoding="utf-8"?>
 <p:sld xmlns:a="http://schemas.openxmlformats.org/drawingml/2006/main" xmlns:r="http://schemas.openxmlformats.org/officeDocument/2006/relationships" xmlns:p="http://schemas.openxmlformats.org/presentationml/2006/main">
   <p:cSld>
     <p:spTree>
@@ -4347,7 +3917,7 @@
 </p:sld>
 </file>
 
-<file path=ppt/slides/slide16.xml><?xml version="1.0" encoding="utf-8"?>
+<file path=ppt/slides/slide12.xml><?xml version="1.0" encoding="utf-8"?>
 <p:sld xmlns:a="http://schemas.openxmlformats.org/drawingml/2006/main" xmlns:r="http://schemas.openxmlformats.org/officeDocument/2006/relationships" xmlns:p="http://schemas.openxmlformats.org/presentationml/2006/main">
   <p:cSld>
     <p:spTree>
@@ -4730,16 +4300,32 @@
           </a:lstStyle>
           <a:p>
             <a:r>
-              <a:rPr lang="en-US" sz="3200" dirty="0">
-                <a:latin typeface="Consolas" charset="0"/>
-                <a:ea typeface="Consolas" charset="0"/>
-                <a:cs typeface="Consolas" charset="0"/>
-              </a:rPr>
-              <a:t>Now using the 7th edition</a:t>
-            </a:r>
-          </a:p>
-          <a:p>
-            <a:endParaRPr lang="en-US" sz="1200" dirty="0">
+              <a:rPr lang="en-US" sz="3200">
+                <a:latin typeface="Consolas" charset="0"/>
+                <a:ea typeface="Consolas" charset="0"/>
+                <a:cs typeface="Consolas" charset="0"/>
+              </a:rPr>
+              <a:t>Now using the </a:t>
+            </a:r>
+            <a:r>
+              <a:rPr lang="en-US" sz="3200" b="1">
+                <a:latin typeface="Consolas" charset="0"/>
+                <a:ea typeface="Consolas" charset="0"/>
+                <a:cs typeface="Consolas" charset="0"/>
+              </a:rPr>
+              <a:t>7th</a:t>
+            </a:r>
+            <a:r>
+              <a:rPr lang="en-US" sz="3200">
+                <a:latin typeface="Consolas" charset="0"/>
+                <a:ea typeface="Consolas" charset="0"/>
+                <a:cs typeface="Consolas" charset="0"/>
+              </a:rPr>
+              <a:t> edition</a:t>
+            </a:r>
+          </a:p>
+          <a:p>
+            <a:endParaRPr lang="en-US" sz="1200">
               <a:latin typeface="Consolas" charset="0"/>
               <a:ea typeface="Consolas" charset="0"/>
               <a:cs typeface="Consolas" charset="0"/>
@@ -4747,7 +4333,7 @@
           </a:p>
           <a:p>
             <a:r>
-              <a:rPr lang="en-US" sz="3200" dirty="0">
+              <a:rPr lang="en-US" sz="3200">
                 <a:latin typeface="Consolas" charset="0"/>
                 <a:ea typeface="Consolas" charset="0"/>
                 <a:cs typeface="Consolas" charset="0"/>
@@ -4758,7 +4344,7 @@
           <a:p>
             <a:pPr lvl="2" algn="l"/>
             <a:r>
-              <a:rPr lang="en-US" sz="2800" dirty="0">
+              <a:rPr lang="en-US" sz="2800">
                 <a:solidFill>
                   <a:schemeClr val="accent6"/>
                 </a:solidFill>
@@ -4772,7 +4358,7 @@
           <a:p>
             <a:pPr lvl="2" algn="l"/>
             <a:r>
-              <a:rPr lang="en-US" sz="2800" dirty="0">
+              <a:rPr lang="en-US" sz="2800">
                 <a:solidFill>
                   <a:schemeClr val="accent5"/>
                 </a:solidFill>
@@ -4786,7 +4372,7 @@
           <a:p>
             <a:pPr lvl="2" algn="l"/>
             <a:r>
-              <a:rPr lang="en-US" sz="2800" dirty="0">
+              <a:rPr lang="en-US" sz="2800">
                 <a:latin typeface="Consolas" charset="0"/>
                 <a:ea typeface="Consolas" charset="0"/>
                 <a:cs typeface="Consolas" charset="0"/>
@@ -4794,7 +4380,7 @@
               <a:t>Paper/Journal </a:t>
             </a:r>
             <a:r>
-              <a:rPr lang="en-US" sz="2800" dirty="0">
+              <a:rPr lang="en-US" sz="2800">
                 <a:solidFill>
                   <a:schemeClr val="accent1"/>
                 </a:solidFill>
@@ -4808,7 +4394,7 @@
           <a:p>
             <a:pPr lvl="2" algn="l"/>
             <a:r>
-              <a:rPr lang="en-US" sz="2800" dirty="0">
+              <a:rPr lang="en-US" sz="2800">
                 <a:solidFill>
                   <a:schemeClr val="accent3"/>
                 </a:solidFill>
@@ -4822,7 +4408,7 @@
           <a:p>
             <a:pPr lvl="2" algn="l"/>
             <a:r>
-              <a:rPr lang="en-US" sz="2800" dirty="0">
+              <a:rPr lang="en-US" sz="2800">
                 <a:solidFill>
                   <a:schemeClr val="accent2"/>
                 </a:solidFill>
@@ -4833,13 +4419,18 @@
               <a:t>Homework</a:t>
             </a:r>
             <a:r>
-              <a:rPr lang="en-US" sz="2800" dirty="0">
+              <a:rPr lang="en-US" sz="2800">
                 <a:latin typeface="Consolas" charset="0"/>
                 <a:ea typeface="Consolas" charset="0"/>
                 <a:cs typeface="Consolas" charset="0"/>
               </a:rPr>
               <a:t> for this course (most importantly!)</a:t>
             </a:r>
+            <a:endParaRPr lang="en-US" sz="2800" dirty="0">
+              <a:latin typeface="Consolas" charset="0"/>
+              <a:ea typeface="Consolas" charset="0"/>
+              <a:cs typeface="Consolas" charset="0"/>
+            </a:endParaRPr>
           </a:p>
         </p:txBody>
       </p:sp>
@@ -4955,8 +4546,57 @@
                 <a:ea typeface="Consolas" charset="0"/>
                 <a:cs typeface="Consolas" charset="0"/>
               </a:rPr>
-              <a:t>APA Format: numbers</a:t>
-            </a:r>
+              <a:t>APA Format: numbers </a:t>
+            </a:r>
+            <a:r>
+              <a:rPr lang="en-US" sz="2400" dirty="0">
+                <a:solidFill>
+                  <a:schemeClr val="accent2">
+                    <a:lumMod val="75000"/>
+                  </a:schemeClr>
+                </a:solidFill>
+                <a:latin typeface="Consolas" charset="0"/>
+                <a:ea typeface="Consolas" charset="0"/>
+                <a:cs typeface="Consolas" charset="0"/>
+              </a:rPr>
+              <a:t>(</a:t>
+            </a:r>
+            <a:r>
+              <a:rPr lang="en-US" sz="2400" dirty="0" err="1">
+                <a:solidFill>
+                  <a:schemeClr val="accent2">
+                    <a:lumMod val="75000"/>
+                  </a:schemeClr>
+                </a:solidFill>
+                <a:latin typeface="Consolas" charset="0"/>
+                <a:ea typeface="Consolas" charset="0"/>
+                <a:cs typeface="Consolas" charset="0"/>
+              </a:rPr>
+              <a:t>pg</a:t>
+            </a:r>
+            <a:r>
+              <a:rPr lang="en-US" sz="2400" dirty="0">
+                <a:solidFill>
+                  <a:schemeClr val="accent2">
+                    <a:lumMod val="75000"/>
+                  </a:schemeClr>
+                </a:solidFill>
+                <a:latin typeface="Consolas" charset="0"/>
+                <a:ea typeface="Consolas" charset="0"/>
+                <a:cs typeface="Consolas" charset="0"/>
+              </a:rPr>
+              <a:t> 178-179)</a:t>
+            </a:r>
+            <a:endParaRPr lang="en-US" dirty="0">
+              <a:solidFill>
+                <a:schemeClr val="accent2">
+                  <a:lumMod val="75000"/>
+                </a:schemeClr>
+              </a:solidFill>
+              <a:latin typeface="Consolas" charset="0"/>
+              <a:ea typeface="Consolas" charset="0"/>
+              <a:cs typeface="Consolas" charset="0"/>
+            </a:endParaRPr>
           </a:p>
         </p:txBody>
       </p:sp>
@@ -5014,7 +4654,23 @@
                 <a:ea typeface="Consolas" charset="0"/>
                 <a:cs typeface="Consolas" charset="0"/>
               </a:rPr>
-              <a:t>Use zero “0” before decimal  ( 0.25 instead of .25)</a:t>
+              <a:t>Use </a:t>
+            </a:r>
+            <a:r>
+              <a:rPr lang="en-US" sz="2400" b="1" dirty="0">
+                <a:latin typeface="Consolas" charset="0"/>
+                <a:ea typeface="Consolas" charset="0"/>
+                <a:cs typeface="Consolas" charset="0"/>
+              </a:rPr>
+              <a:t>zero “0” before decimal  </a:t>
+            </a:r>
+            <a:r>
+              <a:rPr lang="en-US" sz="2400" dirty="0">
+                <a:latin typeface="Consolas" charset="0"/>
+                <a:ea typeface="Consolas" charset="0"/>
+                <a:cs typeface="Consolas" charset="0"/>
+              </a:rPr>
+              <a:t>( 0.25 instead of .25)</a:t>
             </a:r>
           </a:p>
           <a:p>
@@ -5050,7 +4706,31 @@
                 <a:ea typeface="Consolas" charset="0"/>
                 <a:cs typeface="Consolas" charset="0"/>
               </a:rPr>
-              <a:t>Report exact p-values (unless less than .001 then report p &lt; .001)</a:t>
+              <a:t>Report exact p-values (unless less than .001 then report </a:t>
+            </a:r>
+            <a:r>
+              <a:rPr lang="en-US" sz="2400" b="1" i="1" dirty="0">
+                <a:latin typeface="Consolas" charset="0"/>
+                <a:ea typeface="Consolas" charset="0"/>
+                <a:cs typeface="Consolas" charset="0"/>
+              </a:rPr>
+              <a:t>p</a:t>
+            </a:r>
+            <a:r>
+              <a:rPr lang="en-US" sz="2400" b="1" dirty="0">
+                <a:latin typeface="Consolas" charset="0"/>
+                <a:ea typeface="Consolas" charset="0"/>
+                <a:cs typeface="Consolas" charset="0"/>
+              </a:rPr>
+              <a:t> &lt; .001</a:t>
+            </a:r>
+            <a:r>
+              <a:rPr lang="en-US" sz="2400" dirty="0">
+                <a:latin typeface="Consolas" charset="0"/>
+                <a:ea typeface="Consolas" charset="0"/>
+                <a:cs typeface="Consolas" charset="0"/>
+              </a:rPr>
+              <a:t>)</a:t>
             </a:r>
           </a:p>
           <a:p>
@@ -5064,11 +4744,87 @@
             </a:pPr>
             <a:r>
               <a:rPr lang="en-US" sz="2400" dirty="0">
-                <a:latin typeface="Consolas" charset="0"/>
-                <a:ea typeface="Consolas" charset="0"/>
-                <a:cs typeface="Consolas" charset="0"/>
-              </a:rPr>
-              <a:t>No leading zero on p-values (p = .006 not p = 0.006)</a:t>
+                <a:solidFill>
+                  <a:srgbClr val="FF0000"/>
+                </a:solidFill>
+                <a:highlight>
+                  <a:srgbClr val="FFFF00"/>
+                </a:highlight>
+                <a:latin typeface="Consolas" charset="0"/>
+                <a:ea typeface="Consolas" charset="0"/>
+                <a:cs typeface="Consolas" charset="0"/>
+              </a:rPr>
+              <a:t>No leading zero on p-values (</a:t>
+            </a:r>
+            <a:r>
+              <a:rPr lang="en-US" sz="2400" b="1" i="1" dirty="0">
+                <a:solidFill>
+                  <a:srgbClr val="FF0000"/>
+                </a:solidFill>
+                <a:highlight>
+                  <a:srgbClr val="FFFF00"/>
+                </a:highlight>
+                <a:latin typeface="Consolas" charset="0"/>
+                <a:ea typeface="Consolas" charset="0"/>
+                <a:cs typeface="Consolas" charset="0"/>
+              </a:rPr>
+              <a:t>p</a:t>
+            </a:r>
+            <a:r>
+              <a:rPr lang="en-US" sz="2400" b="1" dirty="0">
+                <a:solidFill>
+                  <a:srgbClr val="FF0000"/>
+                </a:solidFill>
+                <a:highlight>
+                  <a:srgbClr val="FFFF00"/>
+                </a:highlight>
+                <a:latin typeface="Consolas" charset="0"/>
+                <a:ea typeface="Consolas" charset="0"/>
+                <a:cs typeface="Consolas" charset="0"/>
+              </a:rPr>
+              <a:t> = .006</a:t>
+            </a:r>
+            <a:r>
+              <a:rPr lang="en-US" sz="2400" dirty="0">
+                <a:solidFill>
+                  <a:srgbClr val="FF0000"/>
+                </a:solidFill>
+                <a:highlight>
+                  <a:srgbClr val="FFFF00"/>
+                </a:highlight>
+                <a:latin typeface="Consolas" charset="0"/>
+                <a:ea typeface="Consolas" charset="0"/>
+                <a:cs typeface="Consolas" charset="0"/>
+              </a:rPr>
+              <a:t>, not </a:t>
+            </a:r>
+            <a:r>
+              <a:rPr lang="en-US" sz="2400" i="1" dirty="0">
+                <a:solidFill>
+                  <a:srgbClr val="FF0000"/>
+                </a:solidFill>
+                <a:highlight>
+                  <a:srgbClr val="FFFF00"/>
+                </a:highlight>
+                <a:latin typeface="Consolas" charset="0"/>
+                <a:ea typeface="Consolas" charset="0"/>
+                <a:cs typeface="Consolas" charset="0"/>
+              </a:rPr>
+              <a:t>p</a:t>
+            </a:r>
+            <a:r>
+              <a:rPr lang="en-US" sz="2400" dirty="0">
+                <a:solidFill>
+                  <a:srgbClr val="FF0000"/>
+                </a:solidFill>
+                <a:highlight>
+                  <a:srgbClr val="FFFF00"/>
+                </a:highlight>
+                <a:latin typeface="Consolas" charset="0"/>
+                <a:ea typeface="Consolas" charset="0"/>
+                <a:cs typeface="Consolas" charset="0"/>
+              </a:rPr>
+              <a:t> = 0.006)</a:t>
             </a:r>
           </a:p>
         </p:txBody>
@@ -5140,7 +4896,7 @@
         <p:spPr>
           <a:xfrm>
             <a:off x="1005467" y="221322"/>
-            <a:ext cx="9720072" cy="1499616"/>
+            <a:ext cx="10986236" cy="1499616"/>
           </a:xfrm>
         </p:spPr>
         <p:txBody>
@@ -5155,6 +4911,63 @@
               </a:rPr>
               <a:t>APA format: Abbreviations</a:t>
             </a:r>
+            <a:r>
+              <a:rPr lang="en-US" sz="4400" dirty="0">
+                <a:solidFill>
+                  <a:schemeClr val="accent2">
+                    <a:lumMod val="75000"/>
+                  </a:schemeClr>
+                </a:solidFill>
+                <a:latin typeface="Consolas" charset="0"/>
+                <a:ea typeface="Consolas" charset="0"/>
+                <a:cs typeface="Consolas" charset="0"/>
+              </a:rPr>
+              <a:t> </a:t>
+            </a:r>
+            <a:r>
+              <a:rPr lang="en-US" sz="2400" dirty="0">
+                <a:solidFill>
+                  <a:schemeClr val="accent2">
+                    <a:lumMod val="75000"/>
+                  </a:schemeClr>
+                </a:solidFill>
+                <a:latin typeface="Consolas" charset="0"/>
+                <a:ea typeface="Consolas" charset="0"/>
+                <a:cs typeface="Consolas" charset="0"/>
+              </a:rPr>
+              <a:t>(</a:t>
+            </a:r>
+            <a:r>
+              <a:rPr lang="en-US" sz="2400" dirty="0" err="1">
+                <a:solidFill>
+                  <a:schemeClr val="accent2">
+                    <a:lumMod val="75000"/>
+                  </a:schemeClr>
+                </a:solidFill>
+                <a:latin typeface="Consolas" charset="0"/>
+                <a:ea typeface="Consolas" charset="0"/>
+                <a:cs typeface="Consolas" charset="0"/>
+              </a:rPr>
+              <a:t>pg</a:t>
+            </a:r>
+            <a:r>
+              <a:rPr lang="en-US" sz="2400" dirty="0">
+                <a:solidFill>
+                  <a:schemeClr val="accent2">
+                    <a:lumMod val="75000"/>
+                  </a:schemeClr>
+                </a:solidFill>
+                <a:latin typeface="Consolas" charset="0"/>
+                <a:ea typeface="Consolas" charset="0"/>
+                <a:cs typeface="Consolas" charset="0"/>
+              </a:rPr>
+              <a:t> 182-187)</a:t>
+            </a:r>
+            <a:endParaRPr lang="en-US" dirty="0">
+              <a:latin typeface="Consolas" charset="0"/>
+              <a:ea typeface="Consolas" charset="0"/>
+              <a:cs typeface="Consolas" charset="0"/>
+            </a:endParaRPr>
           </a:p>
         </p:txBody>
       </p:sp>
@@ -5233,13 +5046,18 @@
           <a:lstStyle/>
           <a:p>
             <a:r>
-              <a:rPr lang="en-US" dirty="0">
+              <a:rPr lang="en-US">
                 <a:latin typeface="Consolas" charset="0"/>
                 <a:ea typeface="Consolas" charset="0"/>
                 <a:cs typeface="Consolas" charset="0"/>
               </a:rPr>
               <a:t>APA format: analysis</a:t>
             </a:r>
+            <a:endParaRPr lang="en-US" dirty="0">
+              <a:latin typeface="Consolas" charset="0"/>
+              <a:ea typeface="Consolas" charset="0"/>
+              <a:cs typeface="Consolas" charset="0"/>
+            </a:endParaRPr>
           </a:p>
         </p:txBody>
       </p:sp>
@@ -5266,7 +5084,7 @@
           <a:lstStyle/>
           <a:p>
             <a:r>
-              <a:rPr lang="en-US" sz="2400" dirty="0">
+              <a:rPr lang="en-US" sz="2400">
                 <a:latin typeface="Consolas" charset="0"/>
                 <a:ea typeface="Consolas" charset="0"/>
                 <a:cs typeface="Consolas" charset="0"/>
@@ -5277,7 +5095,7 @@
           <a:p>
             <a:pPr lvl="1"/>
             <a:r>
-              <a:rPr lang="en-US" sz="2000" dirty="0">
+              <a:rPr lang="en-US" sz="2000">
                 <a:latin typeface="Consolas" charset="0"/>
                 <a:ea typeface="Consolas" charset="0"/>
                 <a:cs typeface="Consolas" charset="0"/>
@@ -5288,7 +5106,7 @@
           <a:p>
             <a:pPr lvl="1"/>
             <a:r>
-              <a:rPr lang="en-US" sz="2000" dirty="0">
+              <a:rPr lang="en-US" sz="2000">
                 <a:latin typeface="Consolas" charset="0"/>
                 <a:ea typeface="Consolas" charset="0"/>
                 <a:cs typeface="Consolas" charset="0"/>
@@ -5298,119 +5116,108 @@
           </a:p>
           <a:p>
             <a:pPr lvl="1"/>
+            <a:endParaRPr lang="en-US" sz="2000">
+              <a:latin typeface="Consolas" charset="0"/>
+              <a:ea typeface="Consolas" charset="0"/>
+              <a:cs typeface="Consolas" charset="0"/>
+            </a:endParaRPr>
+          </a:p>
+          <a:p>
+            <a:r>
+              <a:rPr lang="en-US" sz="2400">
+                <a:latin typeface="Consolas" charset="0"/>
+                <a:ea typeface="Consolas" charset="0"/>
+                <a:cs typeface="Consolas" charset="0"/>
+              </a:rPr>
+              <a:t>Descriptive statistics:</a:t>
+            </a:r>
+          </a:p>
+          <a:p>
+            <a:pPr lvl="1"/>
+            <a:r>
+              <a:rPr lang="en-US" sz="2000">
+                <a:latin typeface="Consolas" charset="0"/>
+                <a:ea typeface="Consolas" charset="0"/>
+                <a:cs typeface="Consolas" charset="0"/>
+              </a:rPr>
+              <a:t>Abbreviations (spell out if not followed by stats)</a:t>
+            </a:r>
+          </a:p>
+          <a:p>
+            <a:pPr lvl="2">
+              <a:buFont typeface="Courier New" panose="02070309020205020404" pitchFamily="49" charset="0"/>
+              <a:buChar char="o"/>
+            </a:pPr>
+            <a:r>
+              <a:rPr lang="en-US" sz="1600">
+                <a:latin typeface="Consolas" charset="0"/>
+                <a:ea typeface="Consolas" charset="0"/>
+                <a:cs typeface="Consolas" charset="0"/>
+              </a:rPr>
+              <a:t>  OKAY:  …scores were higher for males (M = 5, SD = 6)…</a:t>
+            </a:r>
+          </a:p>
+          <a:p>
+            <a:pPr lvl="2">
+              <a:buFont typeface="Courier New" panose="02070309020205020404" pitchFamily="49" charset="0"/>
+              <a:buChar char="o"/>
+            </a:pPr>
+            <a:r>
+              <a:rPr lang="en-US" sz="1600">
+                <a:latin typeface="Consolas" charset="0"/>
+                <a:ea typeface="Consolas" charset="0"/>
+                <a:cs typeface="Consolas" charset="0"/>
+              </a:rPr>
+              <a:t>  NOT:  …the M was higher for males…</a:t>
+            </a:r>
+          </a:p>
+          <a:p>
+            <a:pPr lvl="2">
+              <a:buFont typeface="Courier New" panose="02070309020205020404" pitchFamily="49" charset="0"/>
+              <a:buChar char="o"/>
+            </a:pPr>
+            <a:endParaRPr lang="en-US" sz="1600">
+              <a:latin typeface="Consolas" charset="0"/>
+              <a:ea typeface="Consolas" charset="0"/>
+              <a:cs typeface="Consolas" charset="0"/>
+            </a:endParaRPr>
+          </a:p>
+          <a:p>
+            <a:r>
+              <a:rPr lang="en-US" sz="2400">
+                <a:latin typeface="Consolas" charset="0"/>
+                <a:ea typeface="Consolas" charset="0"/>
+                <a:cs typeface="Consolas" charset="0"/>
+              </a:rPr>
+              <a:t>Inferential statistics :</a:t>
+            </a:r>
+          </a:p>
+          <a:p>
+            <a:pPr lvl="1"/>
+            <a:r>
+              <a:rPr lang="en-US" sz="2000">
+                <a:latin typeface="Consolas" charset="0"/>
+                <a:ea typeface="Consolas" charset="0"/>
+                <a:cs typeface="Consolas" charset="0"/>
+              </a:rPr>
+              <a:t>Distributions, df, N (sometimes), tests statistics, p-values, effect size, …</a:t>
+            </a:r>
+          </a:p>
+          <a:p>
+            <a:pPr lvl="1"/>
+            <a:r>
+              <a:rPr lang="en-US" sz="2000">
+                <a:latin typeface="Consolas" charset="0"/>
+                <a:ea typeface="Consolas" charset="0"/>
+                <a:cs typeface="Consolas" charset="0"/>
+              </a:rPr>
+              <a:t>t(32) = 4.75, p &lt; 0.05, Cohen’s d = 0.87</a:t>
+            </a:r>
             <a:endParaRPr lang="en-US" sz="2000" dirty="0">
               <a:latin typeface="Consolas" charset="0"/>
               <a:ea typeface="Consolas" charset="0"/>
               <a:cs typeface="Consolas" charset="0"/>
             </a:endParaRPr>
-          </a:p>
-          <a:p>
-            <a:r>
-              <a:rPr lang="en-US" sz="2400" dirty="0">
-                <a:latin typeface="Consolas" charset="0"/>
-                <a:ea typeface="Consolas" charset="0"/>
-                <a:cs typeface="Consolas" charset="0"/>
-              </a:rPr>
-              <a:t>Descriptive statistics:</a:t>
-            </a:r>
-          </a:p>
-          <a:p>
-            <a:pPr lvl="1"/>
-            <a:r>
-              <a:rPr lang="en-US" sz="2000" dirty="0">
-                <a:latin typeface="Consolas" charset="0"/>
-                <a:ea typeface="Consolas" charset="0"/>
-                <a:cs typeface="Consolas" charset="0"/>
-              </a:rPr>
-              <a:t>Abbreviations (spell out if not followed by stats)</a:t>
-            </a:r>
-          </a:p>
-          <a:p>
-            <a:pPr lvl="2">
-              <a:buFont typeface="Courier New" panose="02070309020205020404" pitchFamily="49" charset="0"/>
-              <a:buChar char="o"/>
-            </a:pPr>
-            <a:r>
-              <a:rPr lang="en-US" sz="1600" dirty="0">
-                <a:latin typeface="Consolas" charset="0"/>
-                <a:ea typeface="Consolas" charset="0"/>
-                <a:cs typeface="Consolas" charset="0"/>
-              </a:rPr>
-              <a:t>  OKAY:  …scores were higher for males (M = 5, SD = 6)…</a:t>
-            </a:r>
-          </a:p>
-          <a:p>
-            <a:pPr lvl="2">
-              <a:buFont typeface="Courier New" panose="02070309020205020404" pitchFamily="49" charset="0"/>
-              <a:buChar char="o"/>
-            </a:pPr>
-            <a:r>
-              <a:rPr lang="en-US" sz="1600" dirty="0">
-                <a:latin typeface="Consolas" charset="0"/>
-                <a:ea typeface="Consolas" charset="0"/>
-                <a:cs typeface="Consolas" charset="0"/>
-              </a:rPr>
-              <a:t>  NOT:  …the M was higher for males…</a:t>
-            </a:r>
-          </a:p>
-          <a:p>
-            <a:pPr lvl="2">
-              <a:buFont typeface="Courier New" panose="02070309020205020404" pitchFamily="49" charset="0"/>
-              <a:buChar char="o"/>
-            </a:pPr>
-            <a:endParaRPr lang="en-US" sz="1600" dirty="0">
-              <a:latin typeface="Consolas" charset="0"/>
-              <a:ea typeface="Consolas" charset="0"/>
-              <a:cs typeface="Consolas" charset="0"/>
-            </a:endParaRPr>
-          </a:p>
-          <a:p>
-            <a:r>
-              <a:rPr lang="en-US" sz="2400" dirty="0">
-                <a:latin typeface="Consolas" charset="0"/>
-                <a:ea typeface="Consolas" charset="0"/>
-                <a:cs typeface="Consolas" charset="0"/>
-              </a:rPr>
-              <a:t>Inferential statistics :</a:t>
-            </a:r>
-          </a:p>
-          <a:p>
-            <a:pPr lvl="1"/>
-            <a:r>
-              <a:rPr lang="en-US" sz="2000" dirty="0">
-                <a:latin typeface="Consolas" charset="0"/>
-                <a:ea typeface="Consolas" charset="0"/>
-                <a:cs typeface="Consolas" charset="0"/>
-              </a:rPr>
-              <a:t>Distributions, </a:t>
-            </a:r>
-            <a:r>
-              <a:rPr lang="en-US" sz="2000" dirty="0" err="1">
-                <a:latin typeface="Consolas" charset="0"/>
-                <a:ea typeface="Consolas" charset="0"/>
-                <a:cs typeface="Consolas" charset="0"/>
-              </a:rPr>
-              <a:t>df</a:t>
-            </a:r>
-            <a:r>
-              <a:rPr lang="en-US" sz="2000" dirty="0">
-                <a:latin typeface="Consolas" charset="0"/>
-                <a:ea typeface="Consolas" charset="0"/>
-                <a:cs typeface="Consolas" charset="0"/>
-              </a:rPr>
-              <a:t>, N (sometimes), tests statistics, p-values, effect size, …</a:t>
-            </a:r>
-          </a:p>
-          <a:p>
-            <a:pPr lvl="1"/>
-            <a:r>
-              <a:rPr lang="en-US" sz="2000" dirty="0">
-                <a:latin typeface="Consolas" charset="0"/>
-                <a:ea typeface="Consolas" charset="0"/>
-                <a:cs typeface="Consolas" charset="0"/>
-              </a:rPr>
-              <a:t>t(32) = 4.75, p &lt; 0.05, Cohen’s d = 0.87</a:t>
-            </a:r>
           </a:p>
         </p:txBody>
       </p:sp>
@@ -5465,63 +5272,190 @@
                 <a:ea typeface="Consolas" charset="0"/>
                 <a:cs typeface="Consolas" charset="0"/>
               </a:rPr>
-              <a:t>APA format: Analysis -examples</a:t>
-            </a:r>
-          </a:p>
-        </p:txBody>
-      </p:sp>
-      <p:pic>
-        <p:nvPicPr>
-          <p:cNvPr id="4" name="Picture 3"/>
-          <p:cNvPicPr>
-            <a:picLocks noChangeAspect="1"/>
-          </p:cNvPicPr>
-          <p:nvPr/>
-        </p:nvPicPr>
-        <p:blipFill>
-          <a:blip r:embed="rId2"/>
-          <a:stretch>
-            <a:fillRect/>
-          </a:stretch>
-        </p:blipFill>
+              <a:t>APA format: </a:t>
+            </a:r>
+            <a:r>
+              <a:rPr lang="en-US" dirty="0">
+                <a:solidFill>
+                  <a:schemeClr val="accent3"/>
+                </a:solidFill>
+                <a:latin typeface="Consolas" charset="0"/>
+                <a:ea typeface="Consolas" charset="0"/>
+                <a:cs typeface="Consolas" charset="0"/>
+              </a:rPr>
+              <a:t>results</a:t>
+            </a:r>
+          </a:p>
+        </p:txBody>
+      </p:sp>
+      <p:sp>
+        <p:nvSpPr>
+          <p:cNvPr id="3" name="Content Placeholder 2"/>
+          <p:cNvSpPr>
+            <a:spLocks noGrp="1"/>
+          </p:cNvSpPr>
+          <p:nvPr>
+            <p:ph idx="1"/>
+          </p:nvPr>
+        </p:nvSpPr>
         <p:spPr>
           <a:xfrm>
-            <a:off x="481012" y="1971770"/>
-            <a:ext cx="11229975" cy="2447925"/>
+            <a:off x="1024128" y="1670180"/>
+            <a:ext cx="9720071" cy="4639180"/>
           </a:xfrm>
-          <a:prstGeom prst="rect">
-            <a:avLst/>
-          </a:prstGeom>
         </p:spPr>
-      </p:pic>
-      <p:pic>
-        <p:nvPicPr>
-          <p:cNvPr id="5" name="Picture 4"/>
-          <p:cNvPicPr>
-            <a:picLocks noChangeAspect="1"/>
-          </p:cNvPicPr>
-          <p:nvPr/>
-        </p:nvPicPr>
-        <p:blipFill>
-          <a:blip r:embed="rId3"/>
-          <a:stretch>
-            <a:fillRect/>
-          </a:stretch>
-        </p:blipFill>
-        <p:spPr>
-          <a:xfrm>
-            <a:off x="481012" y="4773167"/>
-            <a:ext cx="11096625" cy="1933575"/>
-          </a:xfrm>
-          <a:prstGeom prst="rect">
-            <a:avLst/>
-          </a:prstGeom>
-        </p:spPr>
-      </p:pic>
+        <p:txBody>
+          <a:bodyPr>
+            <a:normAutofit fontScale="92500"/>
+          </a:bodyPr>
+          <a:lstStyle/>
+          <a:p>
+            <a:r>
+              <a:rPr lang="en-US" sz="2800" dirty="0">
+                <a:latin typeface="Consolas" charset="0"/>
+                <a:ea typeface="Consolas" charset="0"/>
+                <a:cs typeface="Consolas" charset="0"/>
+              </a:rPr>
+              <a:t>Results may presented as: text, tables, or figures</a:t>
+            </a:r>
+          </a:p>
+          <a:p>
+            <a:r>
+              <a:rPr lang="en-US" sz="2800" dirty="0">
+                <a:latin typeface="Consolas" charset="0"/>
+                <a:ea typeface="Consolas" charset="0"/>
+                <a:cs typeface="Consolas" charset="0"/>
+              </a:rPr>
+              <a:t>Rules of thumb: (</a:t>
+            </a:r>
+            <a:r>
+              <a:rPr lang="en-US" sz="2800" dirty="0" err="1">
+                <a:latin typeface="Consolas" charset="0"/>
+                <a:ea typeface="Consolas" charset="0"/>
+                <a:cs typeface="Consolas" charset="0"/>
+              </a:rPr>
+              <a:t>pg</a:t>
+            </a:r>
+            <a:r>
+              <a:rPr lang="en-US" sz="2800" dirty="0">
+                <a:latin typeface="Consolas" charset="0"/>
+                <a:ea typeface="Consolas" charset="0"/>
+                <a:cs typeface="Consolas" charset="0"/>
+              </a:rPr>
+              <a:t> 181)</a:t>
+            </a:r>
+          </a:p>
+          <a:p>
+            <a:pPr lvl="1"/>
+            <a:r>
+              <a:rPr lang="en-US" sz="2400" dirty="0">
+                <a:latin typeface="Consolas" charset="0"/>
+                <a:ea typeface="Consolas" charset="0"/>
+                <a:cs typeface="Consolas" charset="0"/>
+              </a:rPr>
+              <a:t>TEXT if &lt; 4 numbers/statistics</a:t>
+            </a:r>
+          </a:p>
+          <a:p>
+            <a:pPr lvl="1"/>
+            <a:r>
+              <a:rPr lang="en-US" sz="2400" dirty="0">
+                <a:latin typeface="Consolas" charset="0"/>
+                <a:ea typeface="Consolas" charset="0"/>
+                <a:cs typeface="Consolas" charset="0"/>
+              </a:rPr>
+              <a:t>TABLE if 4 to 20 numbers/statistics</a:t>
+            </a:r>
+          </a:p>
+          <a:p>
+            <a:pPr lvl="1"/>
+            <a:r>
+              <a:rPr lang="en-US" sz="2400" dirty="0">
+                <a:latin typeface="Consolas" charset="0"/>
+                <a:ea typeface="Consolas" charset="0"/>
+                <a:cs typeface="Consolas" charset="0"/>
+              </a:rPr>
+              <a:t>FIGURE if 20+ numbers/statistics</a:t>
+            </a:r>
+          </a:p>
+          <a:p>
+            <a:r>
+              <a:rPr lang="en-US" sz="2800" b="1" dirty="0">
+                <a:solidFill>
+                  <a:schemeClr val="accent6"/>
+                </a:solidFill>
+                <a:latin typeface="Consolas" charset="0"/>
+                <a:ea typeface="Consolas" charset="0"/>
+                <a:cs typeface="Consolas" charset="0"/>
+              </a:rPr>
+              <a:t>Pick the method that best communicates the results/message</a:t>
+            </a:r>
+          </a:p>
+          <a:p>
+            <a:r>
+              <a:rPr lang="en-US" sz="2800" dirty="0">
+                <a:latin typeface="Consolas" charset="0"/>
+                <a:ea typeface="Consolas" charset="0"/>
+                <a:cs typeface="Consolas" charset="0"/>
+              </a:rPr>
+              <a:t>Symbols &amp; abbreviations</a:t>
+            </a:r>
+          </a:p>
+          <a:p>
+            <a:pPr lvl="1"/>
+            <a:r>
+              <a:rPr lang="en-US" sz="2400" dirty="0">
+                <a:latin typeface="Consolas" charset="0"/>
+                <a:ea typeface="Consolas" charset="0"/>
+                <a:cs typeface="Consolas" charset="0"/>
+              </a:rPr>
+              <a:t>N vs. n</a:t>
+            </a:r>
+          </a:p>
+          <a:p>
+            <a:pPr lvl="1"/>
+            <a:r>
+              <a:rPr lang="en-US" sz="2400" dirty="0">
+                <a:latin typeface="Consolas" charset="0"/>
+                <a:ea typeface="Consolas" charset="0"/>
+                <a:cs typeface="Consolas" charset="0"/>
+              </a:rPr>
+              <a:t>Italicized</a:t>
+            </a:r>
+          </a:p>
+          <a:p>
+            <a:pPr lvl="1"/>
+            <a:r>
+              <a:rPr lang="en-US" sz="2400" i="1" dirty="0">
+                <a:latin typeface="Consolas" charset="0"/>
+                <a:ea typeface="Consolas" charset="0"/>
+                <a:cs typeface="Consolas" charset="0"/>
+              </a:rPr>
+              <a:t>See pages 170-178 of APA publication manual (7</a:t>
+            </a:r>
+            <a:r>
+              <a:rPr lang="en-US" sz="2400" i="1" baseline="30000" dirty="0">
+                <a:latin typeface="Consolas" charset="0"/>
+                <a:ea typeface="Consolas" charset="0"/>
+                <a:cs typeface="Consolas" charset="0"/>
+              </a:rPr>
+              <a:t>th</a:t>
+            </a:r>
+            <a:r>
+              <a:rPr lang="en-US" sz="2400" i="1" dirty="0">
+                <a:latin typeface="Consolas" charset="0"/>
+                <a:ea typeface="Consolas" charset="0"/>
+                <a:cs typeface="Consolas" charset="0"/>
+              </a:rPr>
+              <a:t> ed)</a:t>
+            </a:r>
+          </a:p>
+        </p:txBody>
+      </p:sp>
     </p:spTree>
     <p:extLst>
       <p:ext uri="{BB962C8B-B14F-4D97-AF65-F5344CB8AC3E}">
-        <p14:creationId xmlns:p14="http://schemas.microsoft.com/office/powerpoint/2010/main" val="2559483350"/>
+        <p14:creationId xmlns:p14="http://schemas.microsoft.com/office/powerpoint/2010/main" val="3940340223"/>
       </p:ext>
     </p:extLst>
   </p:cSld>
@@ -5569,39 +5503,294 @@
                 <a:ea typeface="Consolas" charset="0"/>
                 <a:cs typeface="Consolas" charset="0"/>
               </a:rPr>
-              <a:t>APA format: Analysis -examples</a:t>
-            </a:r>
-          </a:p>
-        </p:txBody>
-      </p:sp>
-      <p:pic>
-        <p:nvPicPr>
-          <p:cNvPr id="3" name="Picture 2"/>
-          <p:cNvPicPr>
-            <a:picLocks noChangeAspect="1"/>
-          </p:cNvPicPr>
-          <p:nvPr/>
-        </p:nvPicPr>
-        <p:blipFill>
-          <a:blip r:embed="rId2"/>
-          <a:stretch>
-            <a:fillRect/>
-          </a:stretch>
-        </p:blipFill>
+              <a:t>APA format: </a:t>
+            </a:r>
+            <a:r>
+              <a:rPr lang="en-US" dirty="0">
+                <a:solidFill>
+                  <a:schemeClr val="accent3"/>
+                </a:solidFill>
+                <a:latin typeface="Consolas" charset="0"/>
+                <a:ea typeface="Consolas" charset="0"/>
+                <a:cs typeface="Consolas" charset="0"/>
+              </a:rPr>
+              <a:t>Tables</a:t>
+            </a:r>
+          </a:p>
+        </p:txBody>
+      </p:sp>
+      <p:sp>
+        <p:nvSpPr>
+          <p:cNvPr id="3" name="Content Placeholder 2"/>
+          <p:cNvSpPr>
+            <a:spLocks noGrp="1"/>
+          </p:cNvSpPr>
+          <p:nvPr>
+            <p:ph idx="1"/>
+          </p:nvPr>
+        </p:nvSpPr>
         <p:spPr>
           <a:xfrm>
-            <a:off x="898071" y="1782827"/>
-            <a:ext cx="10134600" cy="4505325"/>
+            <a:off x="531223" y="1521514"/>
+            <a:ext cx="11129554" cy="4572000"/>
           </a:xfrm>
-          <a:prstGeom prst="rect">
-            <a:avLst/>
-          </a:prstGeom>
         </p:spPr>
-      </p:pic>
+        <p:txBody>
+          <a:bodyPr>
+            <a:normAutofit/>
+          </a:bodyPr>
+          <a:lstStyle/>
+          <a:p>
+            <a:r>
+              <a:rPr lang="en-US" sz="2400" b="1" dirty="0">
+                <a:solidFill>
+                  <a:schemeClr val="accent6"/>
+                </a:solidFill>
+                <a:latin typeface="Consolas" charset="0"/>
+                <a:ea typeface="Consolas" charset="0"/>
+                <a:cs typeface="Consolas" charset="0"/>
+              </a:rPr>
+              <a:t>Must be able to stand on its own</a:t>
+            </a:r>
+          </a:p>
+          <a:p>
+            <a:r>
+              <a:rPr lang="en-US" sz="2400" dirty="0">
+                <a:latin typeface="Consolas" charset="0"/>
+                <a:ea typeface="Consolas" charset="0"/>
+                <a:cs typeface="Consolas" charset="0"/>
+              </a:rPr>
+              <a:t>Number tables </a:t>
+            </a:r>
+            <a:r>
+              <a:rPr lang="en-US" sz="2400" dirty="0">
+                <a:solidFill>
+                  <a:schemeClr val="accent3"/>
+                </a:solidFill>
+                <a:latin typeface="Consolas" charset="0"/>
+                <a:ea typeface="Consolas" charset="0"/>
+                <a:cs typeface="Consolas" charset="0"/>
+              </a:rPr>
+              <a:t>sequentially </a:t>
+            </a:r>
+            <a:r>
+              <a:rPr lang="en-US" sz="2400" dirty="0">
+                <a:latin typeface="Consolas" charset="0"/>
+                <a:ea typeface="Consolas" charset="0"/>
+                <a:cs typeface="Consolas" charset="0"/>
+              </a:rPr>
+              <a:t>in text (Table 1, Table 2, </a:t>
+            </a:r>
+            <a:r>
+              <a:rPr lang="en-US" sz="2400" dirty="0" err="1">
+                <a:latin typeface="Consolas" charset="0"/>
+                <a:ea typeface="Consolas" charset="0"/>
+                <a:cs typeface="Consolas" charset="0"/>
+              </a:rPr>
+              <a:t>ect</a:t>
+            </a:r>
+            <a:r>
+              <a:rPr lang="en-US" sz="2400" dirty="0">
+                <a:latin typeface="Consolas" charset="0"/>
+                <a:ea typeface="Consolas" charset="0"/>
+                <a:cs typeface="Consolas" charset="0"/>
+              </a:rPr>
+              <a:t>.)</a:t>
+            </a:r>
+          </a:p>
+          <a:p>
+            <a:r>
+              <a:rPr lang="en-US" sz="2400" dirty="0">
+                <a:latin typeface="Consolas" charset="0"/>
+                <a:ea typeface="Consolas" charset="0"/>
+                <a:cs typeface="Consolas" charset="0"/>
+              </a:rPr>
+              <a:t>Only </a:t>
+            </a:r>
+            <a:r>
+              <a:rPr lang="en-US" sz="2400" dirty="0">
+                <a:solidFill>
+                  <a:schemeClr val="accent5"/>
+                </a:solidFill>
+                <a:latin typeface="Consolas" charset="0"/>
+                <a:ea typeface="Consolas" charset="0"/>
+                <a:cs typeface="Consolas" charset="0"/>
+              </a:rPr>
+              <a:t>3-4</a:t>
+            </a:r>
+            <a:r>
+              <a:rPr lang="en-US" sz="2400" dirty="0">
+                <a:latin typeface="Consolas" charset="0"/>
+                <a:ea typeface="Consolas" charset="0"/>
+                <a:cs typeface="Consolas" charset="0"/>
+              </a:rPr>
+              <a:t> tables per manuscript (different for theses/</a:t>
+            </a:r>
+            <a:r>
+              <a:rPr lang="en-US" sz="2400" dirty="0" err="1">
+                <a:latin typeface="Consolas" charset="0"/>
+                <a:ea typeface="Consolas" charset="0"/>
+                <a:cs typeface="Consolas" charset="0"/>
+              </a:rPr>
+              <a:t>disertations</a:t>
+            </a:r>
+            <a:r>
+              <a:rPr lang="en-US" sz="2400" dirty="0">
+                <a:latin typeface="Consolas" charset="0"/>
+                <a:ea typeface="Consolas" charset="0"/>
+                <a:cs typeface="Consolas" charset="0"/>
+              </a:rPr>
+              <a:t>)</a:t>
+            </a:r>
+          </a:p>
+          <a:p>
+            <a:r>
+              <a:rPr lang="en-US" sz="2400" dirty="0">
+                <a:latin typeface="Consolas" charset="0"/>
+                <a:ea typeface="Consolas" charset="0"/>
+                <a:cs typeface="Consolas" charset="0"/>
+              </a:rPr>
+              <a:t>Results Table types</a:t>
+            </a:r>
+          </a:p>
+          <a:p>
+            <a:pPr lvl="1"/>
+            <a:r>
+              <a:rPr lang="en-US" sz="2000" dirty="0">
+                <a:solidFill>
+                  <a:schemeClr val="accent6"/>
+                </a:solidFill>
+                <a:latin typeface="Consolas" charset="0"/>
+                <a:ea typeface="Consolas" charset="0"/>
+                <a:cs typeface="Consolas" charset="0"/>
+              </a:rPr>
+              <a:t>Descriptive </a:t>
+            </a:r>
+            <a:r>
+              <a:rPr lang="en-US" sz="2000" dirty="0">
+                <a:latin typeface="Consolas" charset="0"/>
+                <a:ea typeface="Consolas" charset="0"/>
+                <a:cs typeface="Consolas" charset="0"/>
+              </a:rPr>
+              <a:t>statistics for N  or n (or both)</a:t>
+            </a:r>
+          </a:p>
+          <a:p>
+            <a:pPr lvl="1"/>
+            <a:r>
+              <a:rPr lang="en-US" sz="2000" dirty="0">
+                <a:solidFill>
+                  <a:schemeClr val="accent6"/>
+                </a:solidFill>
+                <a:latin typeface="Consolas" charset="0"/>
+                <a:ea typeface="Consolas" charset="0"/>
+                <a:cs typeface="Consolas" charset="0"/>
+              </a:rPr>
+              <a:t>Inferential </a:t>
+            </a:r>
+            <a:r>
+              <a:rPr lang="en-US" sz="2000" dirty="0">
+                <a:latin typeface="Consolas" charset="0"/>
+                <a:ea typeface="Consolas" charset="0"/>
+                <a:cs typeface="Consolas" charset="0"/>
+              </a:rPr>
+              <a:t>statistics for ANOVA, MLR, </a:t>
+            </a:r>
+            <a:r>
+              <a:rPr lang="en-US" sz="2000" dirty="0" err="1">
+                <a:latin typeface="Consolas" charset="0"/>
+                <a:ea typeface="Consolas" charset="0"/>
+                <a:cs typeface="Consolas" charset="0"/>
+              </a:rPr>
+              <a:t>ect</a:t>
+            </a:r>
+            <a:r>
+              <a:rPr lang="en-US" sz="2000" dirty="0">
+                <a:latin typeface="Consolas" charset="0"/>
+                <a:ea typeface="Consolas" charset="0"/>
+                <a:cs typeface="Consolas" charset="0"/>
+              </a:rPr>
+              <a:t>.</a:t>
+            </a:r>
+          </a:p>
+          <a:p>
+            <a:pPr lvl="1"/>
+            <a:r>
+              <a:rPr lang="en-US" sz="2000" dirty="0">
+                <a:latin typeface="Consolas" charset="0"/>
+                <a:ea typeface="Consolas" charset="0"/>
+                <a:cs typeface="Consolas" charset="0"/>
+              </a:rPr>
+              <a:t>Both descriptive AND inferential info in the same table -&gt; </a:t>
+            </a:r>
+            <a:r>
+              <a:rPr lang="en-US" sz="2000" dirty="0">
+                <a:solidFill>
+                  <a:schemeClr val="accent1"/>
+                </a:solidFill>
+                <a:latin typeface="Consolas" charset="0"/>
+                <a:ea typeface="Consolas" charset="0"/>
+                <a:cs typeface="Consolas" charset="0"/>
+              </a:rPr>
+              <a:t>USE HEADINGS </a:t>
+            </a:r>
+            <a:r>
+              <a:rPr lang="en-US" sz="2000" dirty="0">
+                <a:latin typeface="Consolas" charset="0"/>
+                <a:ea typeface="Consolas" charset="0"/>
+                <a:cs typeface="Consolas" charset="0"/>
+              </a:rPr>
+              <a:t>to organize</a:t>
+            </a:r>
+          </a:p>
+          <a:p>
+            <a:r>
+              <a:rPr lang="en-US" sz="2400" dirty="0">
+                <a:latin typeface="Consolas" charset="0"/>
+                <a:ea typeface="Consolas" charset="0"/>
+                <a:cs typeface="Consolas" charset="0"/>
+              </a:rPr>
+              <a:t>Data not applicable: leave </a:t>
+            </a:r>
+            <a:r>
+              <a:rPr lang="en-US" sz="2400" dirty="0">
+                <a:solidFill>
+                  <a:schemeClr val="accent2"/>
+                </a:solidFill>
+                <a:latin typeface="Consolas" charset="0"/>
+                <a:ea typeface="Consolas" charset="0"/>
+                <a:cs typeface="Consolas" charset="0"/>
+              </a:rPr>
+              <a:t>blank</a:t>
+            </a:r>
+          </a:p>
+          <a:p>
+            <a:r>
+              <a:rPr lang="en-US" sz="2400" dirty="0">
+                <a:latin typeface="Consolas" charset="0"/>
+                <a:ea typeface="Consolas" charset="0"/>
+                <a:cs typeface="Consolas" charset="0"/>
+              </a:rPr>
+              <a:t>Data not obtained/not computable: use a dash </a:t>
+            </a:r>
+            <a:r>
+              <a:rPr lang="en-US" sz="2400" dirty="0">
+                <a:solidFill>
+                  <a:schemeClr val="tx2"/>
+                </a:solidFill>
+                <a:latin typeface="Consolas" charset="0"/>
+                <a:ea typeface="Consolas" charset="0"/>
+                <a:cs typeface="Consolas" charset="0"/>
+              </a:rPr>
+              <a:t>“-”</a:t>
+            </a:r>
+          </a:p>
+        </p:txBody>
+      </p:sp>
     </p:spTree>
     <p:extLst>
       <p:ext uri="{BB962C8B-B14F-4D97-AF65-F5344CB8AC3E}">
-        <p14:creationId xmlns:p14="http://schemas.microsoft.com/office/powerpoint/2010/main" val="3043933722"/>
+        <p14:creationId xmlns:p14="http://schemas.microsoft.com/office/powerpoint/2010/main" val="3993618965"/>
       </p:ext>
     </p:extLst>
   </p:cSld>
@@ -5660,30 +5849,29 @@
                 <a:ea typeface="Consolas" charset="0"/>
                 <a:cs typeface="Consolas" charset="0"/>
               </a:rPr>
-              <a:t>results</a:t>
-            </a:r>
-          </a:p>
-        </p:txBody>
-      </p:sp>
-      <p:sp>
-        <p:nvSpPr>
-          <p:cNvPr id="3" name="Content Placeholder 2"/>
-          <p:cNvSpPr>
-            <a:spLocks noGrp="1"/>
-          </p:cNvSpPr>
-          <p:nvPr>
-            <p:ph idx="1"/>
-          </p:nvPr>
+              <a:t>Tables</a:t>
+            </a:r>
+          </a:p>
+        </p:txBody>
+      </p:sp>
+      <p:sp>
+        <p:nvSpPr>
+          <p:cNvPr id="4" name="Rectangle 3"/>
+          <p:cNvSpPr/>
+          <p:nvPr/>
         </p:nvSpPr>
         <p:spPr>
           <a:xfrm>
-            <a:off x="1024128" y="1670180"/>
-            <a:ext cx="9720071" cy="4639180"/>
+            <a:off x="838200" y="1690688"/>
+            <a:ext cx="4597400" cy="3108543"/>
           </a:xfrm>
+          <a:prstGeom prst="rect">
+            <a:avLst/>
+          </a:prstGeom>
         </p:spPr>
         <p:txBody>
-          <a:bodyPr>
-            <a:normAutofit fontScale="92500" lnSpcReduction="10000"/>
+          <a:bodyPr wrap="square">
+            <a:spAutoFit/>
           </a:bodyPr>
           <a:lstStyle/>
           <a:p>
@@ -5693,53 +5881,8 @@
                 <a:ea typeface="Consolas" charset="0"/>
                 <a:cs typeface="Consolas" charset="0"/>
               </a:rPr>
-              <a:t>Results may presented as: text, tables, or figures</a:t>
-            </a:r>
-          </a:p>
-          <a:p>
-            <a:r>
-              <a:rPr lang="en-US" sz="2800" dirty="0">
-                <a:latin typeface="Consolas" charset="0"/>
-                <a:ea typeface="Consolas" charset="0"/>
-                <a:cs typeface="Consolas" charset="0"/>
-              </a:rPr>
-              <a:t>Rules of thumb:</a:t>
-            </a:r>
-          </a:p>
-          <a:p>
-            <a:pPr lvl="1"/>
-            <a:r>
-              <a:rPr lang="en-US" sz="2400" dirty="0">
-                <a:latin typeface="Consolas" charset="0"/>
-                <a:ea typeface="Consolas" charset="0"/>
-                <a:cs typeface="Consolas" charset="0"/>
-              </a:rPr>
-              <a:t>TEXT if &lt; 4 numbers/statistics</a:t>
-            </a:r>
-          </a:p>
-          <a:p>
-            <a:pPr lvl="1"/>
-            <a:r>
-              <a:rPr lang="en-US" sz="2400" dirty="0">
-                <a:latin typeface="Consolas" charset="0"/>
-                <a:ea typeface="Consolas" charset="0"/>
-                <a:cs typeface="Consolas" charset="0"/>
-              </a:rPr>
-              <a:t>TABLE if 4 to 20 numbers/statistics</a:t>
-            </a:r>
-          </a:p>
-          <a:p>
-            <a:pPr lvl="1"/>
-            <a:r>
-              <a:rPr lang="en-US" sz="2400" dirty="0">
-                <a:latin typeface="Consolas" charset="0"/>
-                <a:ea typeface="Consolas" charset="0"/>
-                <a:cs typeface="Consolas" charset="0"/>
-              </a:rPr>
-              <a:t>FIGURE if 20+ numbers/statistics</a:t>
-            </a:r>
-          </a:p>
-          <a:p>
+              <a:t>Title (</a:t>
+            </a:r>
             <a:r>
               <a:rPr lang="en-US" sz="2800" b="1" dirty="0">
                 <a:solidFill>
@@ -5749,17 +5892,15 @@
                 <a:ea typeface="Consolas" charset="0"/>
                 <a:cs typeface="Consolas" charset="0"/>
               </a:rPr>
-              <a:t>Pick the method that best communicates the results/message</a:t>
-            </a:r>
-          </a:p>
-          <a:p>
+              <a:t>top</a:t>
+            </a:r>
             <a:r>
               <a:rPr lang="en-US" sz="2800" dirty="0">
                 <a:latin typeface="Consolas" charset="0"/>
                 <a:ea typeface="Consolas" charset="0"/>
                 <a:cs typeface="Consolas" charset="0"/>
               </a:rPr>
-              <a:t>Symbols &amp; abbreviations</a:t>
+              <a:t>)</a:t>
             </a:r>
           </a:p>
           <a:p>
@@ -5770,7 +5911,7 @@
                 <a:ea typeface="Consolas" charset="0"/>
                 <a:cs typeface="Consolas" charset="0"/>
               </a:rPr>
-              <a:t>N vs. n</a:t>
+              <a:t>Descriptive</a:t>
             </a:r>
           </a:p>
           <a:p>
@@ -5781,18 +5922,203 @@
                 <a:ea typeface="Consolas" charset="0"/>
                 <a:cs typeface="Consolas" charset="0"/>
               </a:rPr>
-              <a:t>Italicized</a:t>
+              <a:t>First Letter of Each Word in CAPS</a:t>
             </a:r>
           </a:p>
           <a:p>
             <a:pPr lvl="1"/>
             <a:r>
-              <a:rPr lang="en-US" sz="2400" i="1" dirty="0">
-                <a:latin typeface="Consolas" charset="0"/>
-                <a:ea typeface="Consolas" charset="0"/>
-                <a:cs typeface="Consolas" charset="0"/>
-              </a:rPr>
-              <a:t>See pages 141-144 of APA publication manual (reading “AR2” p 20-23)</a:t>
+              <a:rPr lang="en-US" sz="2400" dirty="0">
+                <a:latin typeface="Consolas" charset="0"/>
+                <a:ea typeface="Consolas" charset="0"/>
+                <a:cs typeface="Consolas" charset="0"/>
+              </a:rPr>
+              <a:t>No period at the end</a:t>
+            </a:r>
+          </a:p>
+          <a:p>
+            <a:pPr lvl="1"/>
+            <a:r>
+              <a:rPr lang="en-US" sz="2400" dirty="0">
+                <a:latin typeface="Consolas" charset="0"/>
+                <a:ea typeface="Consolas" charset="0"/>
+                <a:cs typeface="Consolas" charset="0"/>
+              </a:rPr>
+              <a:t>Appears on row below “Table 1”</a:t>
+            </a:r>
+          </a:p>
+          <a:p>
+            <a:pPr lvl="1"/>
+            <a:r>
+              <a:rPr lang="en-US" sz="2400" dirty="0">
+                <a:latin typeface="Consolas" charset="0"/>
+                <a:ea typeface="Consolas" charset="0"/>
+                <a:cs typeface="Consolas" charset="0"/>
+              </a:rPr>
+              <a:t>Title may be italicized</a:t>
+            </a:r>
+          </a:p>
+        </p:txBody>
+      </p:sp>
+      <p:sp>
+        <p:nvSpPr>
+          <p:cNvPr id="6" name="Rectangle 5"/>
+          <p:cNvSpPr/>
+          <p:nvPr/>
+        </p:nvSpPr>
+        <p:spPr>
+          <a:xfrm>
+            <a:off x="5765800" y="1690688"/>
+            <a:ext cx="6096000" cy="4124206"/>
+          </a:xfrm>
+          <a:prstGeom prst="rect">
+            <a:avLst/>
+          </a:prstGeom>
+        </p:spPr>
+        <p:txBody>
+          <a:bodyPr>
+            <a:spAutoFit/>
+          </a:bodyPr>
+          <a:lstStyle/>
+          <a:p>
+            <a:r>
+              <a:rPr lang="en-US" sz="2800" dirty="0">
+                <a:latin typeface="Consolas" charset="0"/>
+                <a:ea typeface="Consolas" charset="0"/>
+                <a:cs typeface="Consolas" charset="0"/>
+              </a:rPr>
+              <a:t>Caption and Notes (</a:t>
+            </a:r>
+            <a:r>
+              <a:rPr lang="en-US" sz="2800" b="1" dirty="0">
+                <a:solidFill>
+                  <a:schemeClr val="accent6"/>
+                </a:solidFill>
+                <a:latin typeface="Consolas" charset="0"/>
+                <a:ea typeface="Consolas" charset="0"/>
+                <a:cs typeface="Consolas" charset="0"/>
+              </a:rPr>
+              <a:t>bottom</a:t>
+            </a:r>
+            <a:r>
+              <a:rPr lang="en-US" sz="2800" dirty="0">
+                <a:latin typeface="Consolas" charset="0"/>
+                <a:ea typeface="Consolas" charset="0"/>
+                <a:cs typeface="Consolas" charset="0"/>
+              </a:rPr>
+              <a:t>)</a:t>
+            </a:r>
+          </a:p>
+          <a:p>
+            <a:pPr lvl="1"/>
+            <a:r>
+              <a:rPr lang="en-US" sz="2400" dirty="0">
+                <a:latin typeface="Consolas" charset="0"/>
+                <a:ea typeface="Consolas" charset="0"/>
+                <a:cs typeface="Consolas" charset="0"/>
+              </a:rPr>
+              <a:t>General Note</a:t>
+            </a:r>
+          </a:p>
+          <a:p>
+            <a:pPr lvl="2"/>
+            <a:r>
+              <a:rPr lang="en-US" dirty="0">
+                <a:latin typeface="Consolas" charset="0"/>
+                <a:ea typeface="Consolas" charset="0"/>
+                <a:cs typeface="Consolas" charset="0"/>
+              </a:rPr>
+              <a:t>Explains/qualifies info in table, symbols, abbreviations</a:t>
+            </a:r>
+          </a:p>
+          <a:p>
+            <a:pPr lvl="2"/>
+            <a:r>
+              <a:rPr lang="en-US" dirty="0">
+                <a:latin typeface="Consolas" charset="0"/>
+                <a:ea typeface="Consolas" charset="0"/>
+                <a:cs typeface="Consolas" charset="0"/>
+              </a:rPr>
+              <a:t>No explanation for basic stats (M, SD, no. N, n)</a:t>
+            </a:r>
+          </a:p>
+          <a:p>
+            <a:pPr lvl="1"/>
+            <a:r>
+              <a:rPr lang="en-US" sz="2400" dirty="0">
+                <a:latin typeface="Consolas" charset="0"/>
+                <a:ea typeface="Consolas" charset="0"/>
+                <a:cs typeface="Consolas" charset="0"/>
+              </a:rPr>
+              <a:t>Specific Note</a:t>
+            </a:r>
+          </a:p>
+          <a:p>
+            <a:pPr lvl="2"/>
+            <a:r>
+              <a:rPr lang="en-US" dirty="0">
+                <a:latin typeface="Consolas" charset="0"/>
+                <a:ea typeface="Consolas" charset="0"/>
+                <a:cs typeface="Consolas" charset="0"/>
+              </a:rPr>
+              <a:t>Begin on a new line, flush left</a:t>
+            </a:r>
+          </a:p>
+          <a:p>
+            <a:pPr lvl="2"/>
+            <a:r>
+              <a:rPr lang="en-US" dirty="0">
+                <a:latin typeface="Consolas" charset="0"/>
+                <a:ea typeface="Consolas" charset="0"/>
+                <a:cs typeface="Consolas" charset="0"/>
+              </a:rPr>
+              <a:t>Define superscripts </a:t>
+            </a:r>
+            <a:r>
+              <a:rPr lang="en-US" baseline="30000" dirty="0">
+                <a:latin typeface="Consolas" charset="0"/>
+                <a:ea typeface="Consolas" charset="0"/>
+                <a:cs typeface="Consolas" charset="0"/>
+              </a:rPr>
+              <a:t>a, b, c</a:t>
+            </a:r>
+            <a:endParaRPr lang="en-US" dirty="0">
+              <a:latin typeface="Consolas" charset="0"/>
+              <a:ea typeface="Consolas" charset="0"/>
+              <a:cs typeface="Consolas" charset="0"/>
+            </a:endParaRPr>
+          </a:p>
+          <a:p>
+            <a:pPr lvl="1"/>
+            <a:r>
+              <a:rPr lang="en-US" sz="2400" dirty="0">
+                <a:latin typeface="Consolas" charset="0"/>
+                <a:ea typeface="Consolas" charset="0"/>
+                <a:cs typeface="Consolas" charset="0"/>
+              </a:rPr>
+              <a:t>Probability note</a:t>
+            </a:r>
+          </a:p>
+          <a:p>
+            <a:pPr lvl="2"/>
+            <a:r>
+              <a:rPr lang="en-US" dirty="0">
+                <a:latin typeface="Consolas" charset="0"/>
+                <a:ea typeface="Consolas" charset="0"/>
+                <a:cs typeface="Consolas" charset="0"/>
+              </a:rPr>
+              <a:t>Begin on a new line, flush left</a:t>
+            </a:r>
+          </a:p>
+          <a:p>
+            <a:pPr lvl="2"/>
+            <a:r>
+              <a:rPr lang="en-US" dirty="0">
+                <a:latin typeface="Consolas" charset="0"/>
+                <a:ea typeface="Consolas" charset="0"/>
+                <a:cs typeface="Consolas" charset="0"/>
+              </a:rPr>
+              <a:t>* p &lt; 0.05, ** p &lt; 0.01, *** p &lt; 0.001, **** p &lt; 0.0001</a:t>
             </a:r>
           </a:p>
         </p:txBody>
@@ -5800,7 +6126,7 @@
     </p:spTree>
     <p:extLst>
       <p:ext uri="{BB962C8B-B14F-4D97-AF65-F5344CB8AC3E}">
-        <p14:creationId xmlns:p14="http://schemas.microsoft.com/office/powerpoint/2010/main" val="3940340223"/>
+        <p14:creationId xmlns:p14="http://schemas.microsoft.com/office/powerpoint/2010/main" val="3210726610"/>
       </p:ext>
     </p:extLst>
   </p:cSld>
@@ -5848,14 +6174,14 @@
                 <a:ea typeface="Consolas" charset="0"/>
                 <a:cs typeface="Consolas" charset="0"/>
               </a:rPr>
-              <a:t>APA format: results - Examples</a:t>
+              <a:t>APA format: Tables - Examples</a:t>
             </a:r>
           </a:p>
         </p:txBody>
       </p:sp>
       <p:pic>
         <p:nvPicPr>
-          <p:cNvPr id="6" name="Picture 5"/>
+          <p:cNvPr id="3" name="Picture 2"/>
           <p:cNvPicPr>
             <a:picLocks noChangeAspect="1"/>
           </p:cNvPicPr>
@@ -5869,32 +6195,8 @@
         </p:blipFill>
         <p:spPr>
           <a:xfrm>
-            <a:off x="594145" y="1848530"/>
-            <a:ext cx="11115675" cy="2638425"/>
-          </a:xfrm>
-          <a:prstGeom prst="rect">
-            <a:avLst/>
-          </a:prstGeom>
-        </p:spPr>
-      </p:pic>
-      <p:pic>
-        <p:nvPicPr>
-          <p:cNvPr id="7" name="Picture 6"/>
-          <p:cNvPicPr>
-            <a:picLocks noChangeAspect="1"/>
-          </p:cNvPicPr>
-          <p:nvPr/>
-        </p:nvPicPr>
-        <p:blipFill>
-          <a:blip r:embed="rId3"/>
-          <a:stretch>
-            <a:fillRect/>
-          </a:stretch>
-        </p:blipFill>
-        <p:spPr>
-          <a:xfrm>
-            <a:off x="594145" y="4562377"/>
-            <a:ext cx="11229975" cy="1857375"/>
+            <a:off x="381388" y="1903736"/>
+            <a:ext cx="11391900" cy="3629025"/>
           </a:xfrm>
           <a:prstGeom prst="rect">
             <a:avLst/>
@@ -5904,7 +6206,7 @@
     </p:spTree>
     <p:extLst>
       <p:ext uri="{BB962C8B-B14F-4D97-AF65-F5344CB8AC3E}">
-        <p14:creationId xmlns:p14="http://schemas.microsoft.com/office/powerpoint/2010/main" val="2210255715"/>
+        <p14:creationId xmlns:p14="http://schemas.microsoft.com/office/powerpoint/2010/main" val="4145343862"/>
       </p:ext>
     </p:extLst>
   </p:cSld>
@@ -5917,45 +6219,45 @@
 <file path=ppt/theme/theme1.xml><?xml version="1.0" encoding="utf-8"?>
 <a:theme xmlns:a="http://schemas.openxmlformats.org/drawingml/2006/main" name="Office Theme">
   <a:themeElements>
-    <a:clrScheme name="Marquee">
+    <a:clrScheme name="Office">
       <a:dk1>
-        <a:srgbClr val="000000"/>
+        <a:sysClr val="windowText" lastClr="000000"/>
       </a:dk1>
       <a:lt1>
         <a:sysClr val="window" lastClr="FFFFFF"/>
       </a:lt1>
       <a:dk2>
-        <a:srgbClr val="5E5E5E"/>
+        <a:srgbClr val="44546A"/>
       </a:dk2>
       <a:lt2>
-        <a:srgbClr val="DDDDDD"/>
+        <a:srgbClr val="E7E6E6"/>
       </a:lt2>
       <a:accent1>
-        <a:srgbClr val="418AB3"/>
+        <a:srgbClr val="4472C4"/>
       </a:accent1>
       <a:accent2>
-        <a:srgbClr val="A6B727"/>
+        <a:srgbClr val="ED7D31"/>
       </a:accent2>
       <a:accent3>
-        <a:srgbClr val="F69200"/>
+        <a:srgbClr val="A5A5A5"/>
       </a:accent3>
       <a:accent4>
-        <a:srgbClr val="838383"/>
+        <a:srgbClr val="FFC000"/>
       </a:accent4>
       <a:accent5>
-        <a:srgbClr val="FEC306"/>
+        <a:srgbClr val="5B9BD5"/>
       </a:accent5>
       <a:accent6>
-        <a:srgbClr val="DF5327"/>
+        <a:srgbClr val="70AD47"/>
       </a:accent6>
       <a:hlink>
-        <a:srgbClr val="F59E00"/>
+        <a:srgbClr val="0563C1"/>
       </a:hlink>
       <a:folHlink>
-        <a:srgbClr val="B2B2B2"/>
+        <a:srgbClr val="954F72"/>
       </a:folHlink>
     </a:clrScheme>
-    <a:fontScheme name="Office Theme">
+    <a:fontScheme name="Office">
       <a:majorFont>
         <a:latin typeface="Calibri Light" panose="020F0302020204030204"/>
         <a:ea typeface=""/>
@@ -5990,6 +6292,23 @@
         <a:font script="Viet" typeface="Times New Roman"/>
         <a:font script="Uigh" typeface="Microsoft Uighur"/>
         <a:font script="Geor" typeface="Sylfaen"/>
+        <a:font script="Armn" typeface="Arial"/>
+        <a:font script="Bugi" typeface="Leelawadee UI"/>
+        <a:font script="Bopo" typeface="Microsoft JhengHei"/>
+        <a:font script="Java" typeface="Javanese Text"/>
+        <a:font script="Lisu" typeface="Segoe UI"/>
+        <a:font script="Mymr" typeface="Myanmar Text"/>
+        <a:font script="Nkoo" typeface="Ebrima"/>
+        <a:font script="Olck" typeface="Nirmala UI"/>
+        <a:font script="Osma" typeface="Ebrima"/>
+        <a:font script="Phag" typeface="Phagspa"/>
+        <a:font script="Syrn" typeface="Estrangelo Edessa"/>
+        <a:font script="Syrj" typeface="Estrangelo Edessa"/>
+        <a:font script="Syre" typeface="Estrangelo Edessa"/>
+        <a:font script="Sora" typeface="Nirmala UI"/>
+        <a:font script="Tale" typeface="Microsoft Tai Le"/>
+        <a:font script="Talu" typeface="Microsoft New Tai Lue"/>
+        <a:font script="Tfng" typeface="Ebrima"/>
       </a:majorFont>
       <a:minorFont>
         <a:latin typeface="Calibri" panose="020F0502020204030204"/>
@@ -6025,9 +6344,26 @@
         <a:font script="Viet" typeface="Arial"/>
         <a:font script="Uigh" typeface="Microsoft Uighur"/>
         <a:font script="Geor" typeface="Sylfaen"/>
+        <a:font script="Armn" typeface="Arial"/>
+        <a:font script="Bugi" typeface="Leelawadee UI"/>
+        <a:font script="Bopo" typeface="Microsoft JhengHei"/>
+        <a:font script="Java" typeface="Javanese Text"/>
+        <a:font script="Lisu" typeface="Segoe UI"/>
+        <a:font script="Mymr" typeface="Myanmar Text"/>
+        <a:font script="Nkoo" typeface="Ebrima"/>
+        <a:font script="Olck" typeface="Nirmala UI"/>
+        <a:font script="Osma" typeface="Ebrima"/>
+        <a:font script="Phag" typeface="Phagspa"/>
+        <a:font script="Syrn" typeface="Estrangelo Edessa"/>
+        <a:font script="Syrj" typeface="Estrangelo Edessa"/>
+        <a:font script="Syre" typeface="Estrangelo Edessa"/>
+        <a:font script="Sora" typeface="Nirmala UI"/>
+        <a:font script="Tale" typeface="Microsoft Tai Le"/>
+        <a:font script="Talu" typeface="Microsoft New Tai Lue"/>
+        <a:font script="Tfng" typeface="Ebrima"/>
       </a:minorFont>
     </a:fontScheme>
-    <a:fmtScheme name="Office Theme">
+    <a:fmtScheme name="Office">
       <a:fillStyleLst>
         <a:solidFill>
           <a:schemeClr val="phClr"/>
@@ -6169,7 +6505,7 @@
   <a:extraClrSchemeLst/>
   <a:extLst>
     <a:ext uri="{05A4C25C-085E-4340-85A3-A5531E510DB2}">
-      <thm15:themeFamily xmlns:thm15="http://schemas.microsoft.com/office/thememl/2012/main" name="Office Theme" id="{62F939B6-93AF-4DB8-9C6B-D6C7DFDC589F}" vid="{AE6F2518-B084-4896-AF52-66CC2144AA26}"/>
+      <thm15:themeFamily xmlns:thm15="http://schemas.microsoft.com/office/thememl/2012/main" name="Office Theme" id="{62F939B6-93AF-4DB8-9C6B-D6C7DFDC589F}" vid="{4A3C46E8-61CC-4603-A589-7422A47A8E4A}"/>
     </a:ext>
   </a:extLst>
 </a:theme>

</xml_diff>